<commit_message>
Fixed broken polling and MSP430 music links.  Updated Lsn13 slides with 281 slide showing Voh and Vol to provide motivation for pull up/down resistors.
</commit_message>
<xml_diff>
--- a/notes/L13/Lsn13.pptx
+++ b/notes/L13/Lsn13.pptx
@@ -5,10 +5,10 @@
     <p:sldMasterId id="2147483648" r:id="rId1"/>
   </p:sldMasterIdLst>
   <p:notesMasterIdLst>
-    <p:notesMasterId r:id="rId16"/>
+    <p:notesMasterId r:id="rId17"/>
   </p:notesMasterIdLst>
   <p:handoutMasterIdLst>
-    <p:handoutMasterId r:id="rId17"/>
+    <p:handoutMasterId r:id="rId18"/>
   </p:handoutMasterIdLst>
   <p:sldIdLst>
     <p:sldId id="282" r:id="rId2"/>
@@ -17,14 +17,15 @@
     <p:sldId id="353" r:id="rId5"/>
     <p:sldId id="356" r:id="rId6"/>
     <p:sldId id="342" r:id="rId7"/>
-    <p:sldId id="343" r:id="rId8"/>
-    <p:sldId id="357" r:id="rId9"/>
-    <p:sldId id="358" r:id="rId10"/>
-    <p:sldId id="347" r:id="rId11"/>
-    <p:sldId id="348" r:id="rId12"/>
-    <p:sldId id="355" r:id="rId13"/>
-    <p:sldId id="359" r:id="rId14"/>
-    <p:sldId id="360" r:id="rId15"/>
+    <p:sldId id="355" r:id="rId8"/>
+    <p:sldId id="359" r:id="rId9"/>
+    <p:sldId id="343" r:id="rId10"/>
+    <p:sldId id="357" r:id="rId11"/>
+    <p:sldId id="358" r:id="rId12"/>
+    <p:sldId id="347" r:id="rId13"/>
+    <p:sldId id="364" r:id="rId14"/>
+    <p:sldId id="348" r:id="rId15"/>
+    <p:sldId id="360" r:id="rId16"/>
   </p:sldIdLst>
   <p:sldSz cx="9144000" cy="6858000" type="screen4x3"/>
   <p:notesSz cx="6985000" cy="9283700"/>
@@ -4044,6 +4045,1057 @@
           <a:p>
             <a:r>
               <a:rPr lang="en-US" b="1" dirty="0" smtClean="0"/>
+              <a:t>How do we talk to Ports? Do I/O?</a:t>
+            </a:r>
+            <a:endParaRPr lang="en-US" dirty="0"/>
+          </a:p>
+        </p:txBody>
+      </p:sp>
+      <p:sp>
+        <p:nvSpPr>
+          <p:cNvPr id="3" name="Content Placeholder 2"/>
+          <p:cNvSpPr>
+            <a:spLocks noGrp="1"/>
+          </p:cNvSpPr>
+          <p:nvPr>
+            <p:ph idx="1"/>
+          </p:nvPr>
+        </p:nvSpPr>
+        <p:spPr>
+          <a:xfrm>
+            <a:off x="395177" y="669852"/>
+            <a:ext cx="8493642" cy="4724400"/>
+          </a:xfrm>
+        </p:spPr>
+        <p:txBody>
+          <a:bodyPr/>
+          <a:lstStyle/>
+          <a:p>
+            <a:r>
+              <a:rPr lang="en-US" sz="2000" dirty="0" smtClean="0">
+                <a:solidFill>
+                  <a:schemeClr val="accent2"/>
+                </a:solidFill>
+              </a:rPr>
+              <a:t>Port-Mapped </a:t>
+            </a:r>
+            <a:r>
+              <a:rPr lang="en-US" sz="2000" dirty="0">
+                <a:solidFill>
+                  <a:schemeClr val="accent2"/>
+                </a:solidFill>
+              </a:rPr>
+              <a:t>I/O </a:t>
+            </a:r>
+            <a:r>
+              <a:rPr lang="en-US" sz="2000" dirty="0" smtClean="0">
+                <a:solidFill>
+                  <a:schemeClr val="accent2"/>
+                </a:solidFill>
+              </a:rPr>
+              <a:t>   </a:t>
+            </a:r>
+            <a:r>
+              <a:rPr lang="en-US" sz="2000" dirty="0" smtClean="0"/>
+              <a:t>(Intel)</a:t>
+            </a:r>
+          </a:p>
+          <a:p>
+            <a:pPr lvl="1"/>
+            <a:r>
+              <a:rPr lang="en-US" sz="2000" dirty="0" smtClean="0"/>
+              <a:t>I/O and memory have their own separate address space</a:t>
+            </a:r>
+          </a:p>
+          <a:p>
+            <a:pPr lvl="1"/>
+            <a:r>
+              <a:rPr lang="en-US" sz="2000" dirty="0" smtClean="0"/>
+              <a:t>Advantage</a:t>
+            </a:r>
+          </a:p>
+          <a:p>
+            <a:pPr lvl="2"/>
+            <a:r>
+              <a:rPr lang="en-US" sz="1800" dirty="0" smtClean="0"/>
+              <a:t>Don't </a:t>
+            </a:r>
+            <a:r>
+              <a:rPr lang="en-US" sz="1800" dirty="0"/>
+              <a:t>lose memory for IO.</a:t>
+            </a:r>
+          </a:p>
+          <a:p>
+            <a:pPr lvl="2"/>
+            <a:r>
+              <a:rPr lang="en-US" sz="1800" dirty="0" smtClean="0"/>
+              <a:t>Protects </a:t>
+            </a:r>
+            <a:r>
+              <a:rPr lang="en-US" sz="1800" dirty="0"/>
+              <a:t>coder from mistakes.</a:t>
+            </a:r>
+          </a:p>
+          <a:p>
+            <a:pPr lvl="1"/>
+            <a:r>
+              <a:rPr lang="en-US" sz="2200" dirty="0" smtClean="0"/>
+              <a:t>Disadvantage</a:t>
+            </a:r>
+          </a:p>
+          <a:p>
+            <a:pPr lvl="2"/>
+            <a:r>
+              <a:rPr lang="en-US" sz="1800" dirty="0" smtClean="0"/>
+              <a:t>Need More Instructions (like In/Out)</a:t>
+            </a:r>
+          </a:p>
+          <a:p>
+            <a:pPr lvl="2"/>
+            <a:r>
+              <a:rPr lang="en-US" sz="1800" dirty="0" smtClean="0"/>
+              <a:t>More restrictive addressing modes</a:t>
+            </a:r>
+          </a:p>
+          <a:p>
+            <a:pPr lvl="1"/>
+            <a:r>
+              <a:rPr lang="en-US" sz="2200" dirty="0" smtClean="0"/>
+              <a:t>How to use</a:t>
+            </a:r>
+          </a:p>
+          <a:p>
+            <a:pPr lvl="2"/>
+            <a:r>
+              <a:rPr lang="en-US" sz="1800" dirty="0" smtClean="0"/>
+              <a:t>Out #0x55, &amp;PORT1</a:t>
+            </a:r>
+          </a:p>
+          <a:p>
+            <a:pPr lvl="1"/>
+            <a:r>
+              <a:rPr lang="en-US" sz="2200" dirty="0" smtClean="0">
+                <a:solidFill>
+                  <a:schemeClr val="accent2"/>
+                </a:solidFill>
+              </a:rPr>
+              <a:t>Does Port-Mapped cheat?</a:t>
+            </a:r>
+          </a:p>
+          <a:p>
+            <a:pPr lvl="1"/>
+            <a:endParaRPr lang="en-US" sz="2200" dirty="0"/>
+          </a:p>
+          <a:p>
+            <a:endParaRPr lang="en-US" sz="2000" dirty="0">
+              <a:solidFill>
+                <a:schemeClr val="accent2"/>
+              </a:solidFill>
+            </a:endParaRPr>
+          </a:p>
+        </p:txBody>
+      </p:sp>
+    </p:spTree>
+    <p:extLst>
+      <p:ext uri="{BB962C8B-B14F-4D97-AF65-F5344CB8AC3E}">
+        <p14:creationId xmlns:p14="http://schemas.microsoft.com/office/powerpoint/2010/main" val="645359394"/>
+      </p:ext>
+    </p:extLst>
+  </p:cSld>
+  <p:clrMapOvr>
+    <a:masterClrMapping/>
+  </p:clrMapOvr>
+  <p:timing>
+    <p:tnLst>
+      <p:par>
+        <p:cTn id="1" dur="indefinite" restart="never" nodeType="tmRoot"/>
+      </p:par>
+    </p:tnLst>
+  </p:timing>
+</p:sld>
+</file>
+
+<file path=ppt/slides/slide11.xml><?xml version="1.0" encoding="utf-8"?>
+<p:sld xmlns:a="http://schemas.openxmlformats.org/drawingml/2006/main" xmlns:r="http://schemas.openxmlformats.org/officeDocument/2006/relationships" xmlns:p="http://schemas.openxmlformats.org/presentationml/2006/main">
+  <p:cSld>
+    <p:spTree>
+      <p:nvGrpSpPr>
+        <p:cNvPr id="1" name=""/>
+        <p:cNvGrpSpPr/>
+        <p:nvPr/>
+      </p:nvGrpSpPr>
+      <p:grpSpPr>
+        <a:xfrm>
+          <a:off x="0" y="0"/>
+          <a:ext cx="0" cy="0"/>
+          <a:chOff x="0" y="0"/>
+          <a:chExt cx="0" cy="0"/>
+        </a:xfrm>
+      </p:grpSpPr>
+      <p:sp>
+        <p:nvSpPr>
+          <p:cNvPr id="2" name="Title 1"/>
+          <p:cNvSpPr>
+            <a:spLocks noGrp="1"/>
+          </p:cNvSpPr>
+          <p:nvPr>
+            <p:ph type="title"/>
+          </p:nvPr>
+        </p:nvSpPr>
+        <p:spPr/>
+        <p:txBody>
+          <a:bodyPr/>
+          <a:lstStyle/>
+          <a:p>
+            <a:r>
+              <a:rPr lang="en-US" b="1" dirty="0"/>
+              <a:t>General Purpose Input Output (GPIO)</a:t>
+            </a:r>
+            <a:endParaRPr lang="en-US" dirty="0"/>
+          </a:p>
+        </p:txBody>
+      </p:sp>
+      <p:sp>
+        <p:nvSpPr>
+          <p:cNvPr id="3" name="Content Placeholder 2"/>
+          <p:cNvSpPr>
+            <a:spLocks noGrp="1"/>
+          </p:cNvSpPr>
+          <p:nvPr>
+            <p:ph idx="1"/>
+          </p:nvPr>
+        </p:nvSpPr>
+        <p:spPr>
+          <a:xfrm>
+            <a:off x="395177" y="669852"/>
+            <a:ext cx="8493642" cy="4724400"/>
+          </a:xfrm>
+        </p:spPr>
+        <p:txBody>
+          <a:bodyPr/>
+          <a:lstStyle/>
+          <a:p>
+            <a:r>
+              <a:rPr lang="en-US" sz="2000" dirty="0">
+                <a:solidFill>
+                  <a:schemeClr val="accent2"/>
+                </a:solidFill>
+              </a:rPr>
+              <a:t>The registers used to configure GPIO are </a:t>
+            </a:r>
+            <a:r>
+              <a:rPr lang="en-US" sz="2000" dirty="0" err="1">
+                <a:solidFill>
+                  <a:schemeClr val="accent2"/>
+                </a:solidFill>
+              </a:rPr>
+              <a:t>PxDIR</a:t>
+            </a:r>
+            <a:r>
+              <a:rPr lang="en-US" sz="2000" dirty="0" smtClean="0">
+                <a:solidFill>
+                  <a:schemeClr val="accent2"/>
+                </a:solidFill>
+              </a:rPr>
+              <a:t>, </a:t>
+            </a:r>
+            <a:r>
+              <a:rPr lang="en-US" sz="2000" dirty="0" err="1" smtClean="0">
+                <a:solidFill>
+                  <a:schemeClr val="accent2"/>
+                </a:solidFill>
+              </a:rPr>
+              <a:t>PxREN</a:t>
+            </a:r>
+            <a:r>
+              <a:rPr lang="en-US" sz="2000" dirty="0" smtClean="0">
+                <a:solidFill>
+                  <a:schemeClr val="accent2"/>
+                </a:solidFill>
+              </a:rPr>
+              <a:t>, </a:t>
+            </a:r>
+            <a:r>
+              <a:rPr lang="en-US" sz="2000" dirty="0" err="1">
+                <a:solidFill>
+                  <a:schemeClr val="accent2"/>
+                </a:solidFill>
+              </a:rPr>
+              <a:t>PxOUT</a:t>
+            </a:r>
+            <a:r>
+              <a:rPr lang="en-US" sz="2000" dirty="0">
+                <a:solidFill>
+                  <a:schemeClr val="accent2"/>
+                </a:solidFill>
+              </a:rPr>
+              <a:t>, and </a:t>
+            </a:r>
+            <a:r>
+              <a:rPr lang="en-US" sz="2000" dirty="0" err="1" smtClean="0">
+                <a:solidFill>
+                  <a:schemeClr val="accent2"/>
+                </a:solidFill>
+              </a:rPr>
+              <a:t>PxIN</a:t>
+            </a:r>
+            <a:endParaRPr lang="en-US" sz="2000" dirty="0" smtClean="0">
+              <a:solidFill>
+                <a:schemeClr val="accent2"/>
+              </a:solidFill>
+            </a:endParaRPr>
+          </a:p>
+          <a:p>
+            <a:pPr lvl="1"/>
+            <a:r>
+              <a:rPr lang="en-US" sz="1800" dirty="0" err="1" smtClean="0"/>
+              <a:t>PxDIR</a:t>
+            </a:r>
+            <a:r>
+              <a:rPr lang="en-US" sz="1800" dirty="0" smtClean="0"/>
+              <a:t> </a:t>
+            </a:r>
+            <a:r>
+              <a:rPr lang="en-US" sz="1800" dirty="0"/>
+              <a:t>configures which pins are input and which pins are output </a:t>
+            </a:r>
+          </a:p>
+          <a:p>
+            <a:pPr lvl="2"/>
+            <a:r>
+              <a:rPr lang="en-US" sz="1400" dirty="0" smtClean="0"/>
+              <a:t>1 </a:t>
+            </a:r>
+            <a:r>
+              <a:rPr lang="en-US" sz="1400" dirty="0"/>
+              <a:t>corresponds to output, 0 to input</a:t>
+            </a:r>
+          </a:p>
+          <a:p>
+            <a:pPr lvl="1"/>
+            <a:r>
+              <a:rPr lang="en-US" sz="1800" dirty="0" err="1"/>
+              <a:t>PxREN</a:t>
+            </a:r>
+            <a:r>
+              <a:rPr lang="en-US" sz="1800" dirty="0"/>
+              <a:t> controls pull up / pull down resistors to avoid floating inputs</a:t>
+            </a:r>
+            <a:r>
+              <a:rPr lang="en-US" sz="1800" dirty="0" smtClean="0"/>
+              <a:t>.</a:t>
+            </a:r>
+          </a:p>
+          <a:p>
+            <a:pPr lvl="1"/>
+            <a:r>
+              <a:rPr lang="en-US" sz="1800" dirty="0" smtClean="0"/>
+              <a:t>Writing </a:t>
+            </a:r>
+            <a:r>
+              <a:rPr lang="en-US" sz="1800" dirty="0"/>
+              <a:t>to </a:t>
+            </a:r>
+            <a:r>
+              <a:rPr lang="en-US" sz="1800" dirty="0" err="1"/>
+              <a:t>PxOUT</a:t>
+            </a:r>
+            <a:r>
+              <a:rPr lang="en-US" sz="1800" dirty="0"/>
+              <a:t> controls the output of each pin</a:t>
+            </a:r>
+          </a:p>
+          <a:p>
+            <a:pPr lvl="1"/>
+            <a:r>
+              <a:rPr lang="en-US" sz="1800" dirty="0" err="1" smtClean="0"/>
+              <a:t>PxIN</a:t>
+            </a:r>
+            <a:r>
+              <a:rPr lang="en-US" sz="1800" dirty="0" smtClean="0"/>
+              <a:t> </a:t>
+            </a:r>
+            <a:r>
+              <a:rPr lang="en-US" sz="1800" dirty="0"/>
+              <a:t>allows you to read the values on these </a:t>
+            </a:r>
+            <a:r>
+              <a:rPr lang="en-US" sz="1800" dirty="0" smtClean="0"/>
+              <a:t>pins</a:t>
+            </a:r>
+          </a:p>
+          <a:p>
+            <a:pPr lvl="1"/>
+            <a:endParaRPr lang="en-US" sz="1800" dirty="0"/>
+          </a:p>
+          <a:p>
+            <a:pPr marL="0" indent="0">
+              <a:buNone/>
+            </a:pPr>
+            <a:r>
+              <a:rPr lang="en-US" sz="1800" dirty="0"/>
+              <a:t>Let's write a program that controls the onboard LEDs with the onboard push button</a:t>
+            </a:r>
+            <a:r>
+              <a:rPr lang="en-US" sz="1800" dirty="0">
+                <a:solidFill>
+                  <a:schemeClr val="accent2"/>
+                </a:solidFill>
+                <a:latin typeface="Courier New" pitchFamily="49" charset="0"/>
+                <a:cs typeface="Courier New" pitchFamily="49" charset="0"/>
+              </a:rPr>
+              <a:t>  </a:t>
+            </a:r>
+          </a:p>
+          <a:p>
+            <a:pPr marL="0" indent="0">
+              <a:buNone/>
+            </a:pPr>
+            <a:endParaRPr lang="en-US" sz="1400" dirty="0">
+              <a:solidFill>
+                <a:schemeClr val="accent2"/>
+              </a:solidFill>
+              <a:latin typeface="Courier New" pitchFamily="49" charset="0"/>
+              <a:cs typeface="Courier New" pitchFamily="49" charset="0"/>
+            </a:endParaRPr>
+          </a:p>
+          <a:p>
+            <a:pPr marL="0" indent="0">
+              <a:buNone/>
+            </a:pPr>
+            <a:r>
+              <a:rPr lang="en-US" sz="1400" dirty="0">
+                <a:solidFill>
+                  <a:schemeClr val="accent2"/>
+                </a:solidFill>
+                <a:latin typeface="Courier New" pitchFamily="49" charset="0"/>
+                <a:cs typeface="Courier New" pitchFamily="49" charset="0"/>
+              </a:rPr>
+              <a:t>              </a:t>
+            </a:r>
+            <a:r>
+              <a:rPr lang="en-US" sz="1400" dirty="0" err="1">
+                <a:solidFill>
+                  <a:schemeClr val="accent2"/>
+                </a:solidFill>
+                <a:latin typeface="Courier New" pitchFamily="49" charset="0"/>
+                <a:cs typeface="Courier New" pitchFamily="49" charset="0"/>
+              </a:rPr>
+              <a:t>bis.b</a:t>
+            </a:r>
+            <a:r>
+              <a:rPr lang="en-US" sz="1400" dirty="0">
+                <a:solidFill>
+                  <a:schemeClr val="accent2"/>
+                </a:solidFill>
+                <a:latin typeface="Courier New" pitchFamily="49" charset="0"/>
+                <a:cs typeface="Courier New" pitchFamily="49" charset="0"/>
+              </a:rPr>
+              <a:t>  #BIT0|BIT6, &amp;P1DIR</a:t>
+            </a:r>
+          </a:p>
+          <a:p>
+            <a:pPr marL="0" indent="0">
+              <a:buNone/>
+            </a:pPr>
+            <a:r>
+              <a:rPr lang="en-US" sz="1400" dirty="0">
+                <a:solidFill>
+                  <a:schemeClr val="accent2"/>
+                </a:solidFill>
+                <a:latin typeface="Courier New" pitchFamily="49" charset="0"/>
+                <a:cs typeface="Courier New" pitchFamily="49" charset="0"/>
+              </a:rPr>
+              <a:t>              </a:t>
+            </a:r>
+            <a:r>
+              <a:rPr lang="en-US" sz="1400" dirty="0" err="1">
+                <a:solidFill>
+                  <a:schemeClr val="accent2"/>
+                </a:solidFill>
+                <a:latin typeface="Courier New" pitchFamily="49" charset="0"/>
+                <a:cs typeface="Courier New" pitchFamily="49" charset="0"/>
+              </a:rPr>
+              <a:t>bic.b</a:t>
+            </a:r>
+            <a:r>
+              <a:rPr lang="en-US" sz="1400" dirty="0">
+                <a:solidFill>
+                  <a:schemeClr val="accent2"/>
+                </a:solidFill>
+                <a:latin typeface="Courier New" pitchFamily="49" charset="0"/>
+                <a:cs typeface="Courier New" pitchFamily="49" charset="0"/>
+              </a:rPr>
+              <a:t>  #BIT3, &amp;P1DIR</a:t>
+            </a:r>
+          </a:p>
+          <a:p>
+            <a:pPr marL="0" indent="0">
+              <a:buNone/>
+            </a:pPr>
+            <a:endParaRPr lang="en-US" sz="1400" dirty="0">
+              <a:solidFill>
+                <a:schemeClr val="accent2"/>
+              </a:solidFill>
+              <a:latin typeface="Courier New" pitchFamily="49" charset="0"/>
+              <a:cs typeface="Courier New" pitchFamily="49" charset="0"/>
+            </a:endParaRPr>
+          </a:p>
+          <a:p>
+            <a:pPr marL="0" indent="0">
+              <a:buNone/>
+            </a:pPr>
+            <a:r>
+              <a:rPr lang="en-US" sz="1400" dirty="0" err="1">
+                <a:solidFill>
+                  <a:schemeClr val="accent2"/>
+                </a:solidFill>
+                <a:latin typeface="Courier New" pitchFamily="49" charset="0"/>
+                <a:cs typeface="Courier New" pitchFamily="49" charset="0"/>
+              </a:rPr>
+              <a:t>check_btn</a:t>
+            </a:r>
+            <a:r>
+              <a:rPr lang="en-US" sz="1400" dirty="0">
+                <a:solidFill>
+                  <a:schemeClr val="accent2"/>
+                </a:solidFill>
+                <a:latin typeface="Courier New" pitchFamily="49" charset="0"/>
+                <a:cs typeface="Courier New" pitchFamily="49" charset="0"/>
+              </a:rPr>
+              <a:t>:    </a:t>
+            </a:r>
+            <a:r>
+              <a:rPr lang="en-US" sz="1400" dirty="0" err="1">
+                <a:solidFill>
+                  <a:schemeClr val="accent2"/>
+                </a:solidFill>
+                <a:latin typeface="Courier New" pitchFamily="49" charset="0"/>
+                <a:cs typeface="Courier New" pitchFamily="49" charset="0"/>
+              </a:rPr>
+              <a:t>bit.b</a:t>
+            </a:r>
+            <a:r>
+              <a:rPr lang="en-US" sz="1400" dirty="0">
+                <a:solidFill>
+                  <a:schemeClr val="accent2"/>
+                </a:solidFill>
+                <a:latin typeface="Courier New" pitchFamily="49" charset="0"/>
+                <a:cs typeface="Courier New" pitchFamily="49" charset="0"/>
+              </a:rPr>
+              <a:t>  #BIT3, &amp;</a:t>
+            </a:r>
+            <a:r>
+              <a:rPr lang="en-US" sz="1400" dirty="0" smtClean="0">
+                <a:solidFill>
+                  <a:schemeClr val="accent2"/>
+                </a:solidFill>
+                <a:latin typeface="Courier New" pitchFamily="49" charset="0"/>
+                <a:cs typeface="Courier New" pitchFamily="49" charset="0"/>
+              </a:rPr>
+              <a:t>P1IN</a:t>
+            </a:r>
+            <a:r>
+              <a:rPr lang="en-US" sz="1400" dirty="0">
+                <a:solidFill>
+                  <a:schemeClr val="accent2"/>
+                </a:solidFill>
+                <a:latin typeface="Courier New" pitchFamily="49" charset="0"/>
+                <a:cs typeface="Courier New" pitchFamily="49" charset="0"/>
+              </a:rPr>
+              <a:t> </a:t>
+            </a:r>
+            <a:r>
+              <a:rPr lang="en-US" sz="1400" dirty="0" smtClean="0">
+                <a:solidFill>
+                  <a:schemeClr val="accent2"/>
+                </a:solidFill>
+                <a:latin typeface="Courier New" pitchFamily="49" charset="0"/>
+                <a:cs typeface="Courier New" pitchFamily="49" charset="0"/>
+              </a:rPr>
+              <a:t>          </a:t>
+            </a:r>
+            <a:r>
+              <a:rPr lang="en-US" sz="1400" dirty="0" smtClean="0">
+                <a:solidFill>
+                  <a:srgbClr val="00B050"/>
+                </a:solidFill>
+                <a:latin typeface="Courier New" pitchFamily="49" charset="0"/>
+                <a:cs typeface="Courier New" pitchFamily="49" charset="0"/>
+              </a:rPr>
+              <a:t>;</a:t>
+            </a:r>
+            <a:r>
+              <a:rPr lang="en-US" sz="1400" dirty="0">
+                <a:solidFill>
+                  <a:srgbClr val="00B050"/>
+                </a:solidFill>
+                <a:latin typeface="Courier New" pitchFamily="49" charset="0"/>
+                <a:cs typeface="Courier New" pitchFamily="49" charset="0"/>
+              </a:rPr>
+              <a:t>push button is LOW on push</a:t>
+            </a:r>
+            <a:endParaRPr lang="en-US" sz="1400" dirty="0">
+              <a:solidFill>
+                <a:schemeClr val="accent2"/>
+              </a:solidFill>
+              <a:latin typeface="Courier New" pitchFamily="49" charset="0"/>
+              <a:cs typeface="Courier New" pitchFamily="49" charset="0"/>
+            </a:endParaRPr>
+          </a:p>
+          <a:p>
+            <a:pPr marL="0" indent="0">
+              <a:buNone/>
+            </a:pPr>
+            <a:r>
+              <a:rPr lang="en-US" sz="1400" dirty="0">
+                <a:solidFill>
+                  <a:schemeClr val="accent2"/>
+                </a:solidFill>
+                <a:latin typeface="Courier New" pitchFamily="49" charset="0"/>
+                <a:cs typeface="Courier New" pitchFamily="49" charset="0"/>
+              </a:rPr>
+              <a:t>              </a:t>
+            </a:r>
+            <a:r>
+              <a:rPr lang="en-US" sz="1400" dirty="0" err="1">
+                <a:solidFill>
+                  <a:schemeClr val="accent2"/>
+                </a:solidFill>
+                <a:latin typeface="Courier New" pitchFamily="49" charset="0"/>
+                <a:cs typeface="Courier New" pitchFamily="49" charset="0"/>
+              </a:rPr>
+              <a:t>jz</a:t>
+            </a:r>
+            <a:r>
+              <a:rPr lang="en-US" sz="1400" dirty="0">
+                <a:solidFill>
+                  <a:schemeClr val="accent2"/>
+                </a:solidFill>
+                <a:latin typeface="Courier New" pitchFamily="49" charset="0"/>
+                <a:cs typeface="Courier New" pitchFamily="49" charset="0"/>
+              </a:rPr>
+              <a:t>     </a:t>
+            </a:r>
+            <a:r>
+              <a:rPr lang="en-US" sz="1400" dirty="0" err="1">
+                <a:solidFill>
+                  <a:schemeClr val="accent2"/>
+                </a:solidFill>
+                <a:latin typeface="Courier New" pitchFamily="49" charset="0"/>
+                <a:cs typeface="Courier New" pitchFamily="49" charset="0"/>
+              </a:rPr>
+              <a:t>set_lights</a:t>
+            </a:r>
+            <a:endParaRPr lang="en-US" sz="1400" dirty="0">
+              <a:solidFill>
+                <a:schemeClr val="accent2"/>
+              </a:solidFill>
+              <a:latin typeface="Courier New" pitchFamily="49" charset="0"/>
+              <a:cs typeface="Courier New" pitchFamily="49" charset="0"/>
+            </a:endParaRPr>
+          </a:p>
+          <a:p>
+            <a:pPr marL="0" indent="0">
+              <a:buNone/>
+            </a:pPr>
+            <a:r>
+              <a:rPr lang="en-US" sz="1400" dirty="0">
+                <a:solidFill>
+                  <a:schemeClr val="accent2"/>
+                </a:solidFill>
+                <a:latin typeface="Courier New" pitchFamily="49" charset="0"/>
+                <a:cs typeface="Courier New" pitchFamily="49" charset="0"/>
+              </a:rPr>
+              <a:t>              </a:t>
+            </a:r>
+            <a:r>
+              <a:rPr lang="en-US" sz="1400" dirty="0" err="1">
+                <a:solidFill>
+                  <a:schemeClr val="accent2"/>
+                </a:solidFill>
+                <a:latin typeface="Courier New" pitchFamily="49" charset="0"/>
+                <a:cs typeface="Courier New" pitchFamily="49" charset="0"/>
+              </a:rPr>
+              <a:t>bic.b</a:t>
+            </a:r>
+            <a:r>
+              <a:rPr lang="en-US" sz="1400" dirty="0">
+                <a:solidFill>
+                  <a:schemeClr val="accent2"/>
+                </a:solidFill>
+                <a:latin typeface="Courier New" pitchFamily="49" charset="0"/>
+                <a:cs typeface="Courier New" pitchFamily="49" charset="0"/>
+              </a:rPr>
+              <a:t>  #BIT0|BIT6, &amp;P1OUT</a:t>
+            </a:r>
+          </a:p>
+          <a:p>
+            <a:pPr marL="0" indent="0">
+              <a:buNone/>
+            </a:pPr>
+            <a:r>
+              <a:rPr lang="en-US" sz="1400" dirty="0">
+                <a:solidFill>
+                  <a:schemeClr val="accent2"/>
+                </a:solidFill>
+                <a:latin typeface="Courier New" pitchFamily="49" charset="0"/>
+                <a:cs typeface="Courier New" pitchFamily="49" charset="0"/>
+              </a:rPr>
+              <a:t>              </a:t>
+            </a:r>
+            <a:r>
+              <a:rPr lang="en-US" sz="1400" dirty="0" err="1">
+                <a:solidFill>
+                  <a:schemeClr val="accent2"/>
+                </a:solidFill>
+                <a:latin typeface="Courier New" pitchFamily="49" charset="0"/>
+                <a:cs typeface="Courier New" pitchFamily="49" charset="0"/>
+              </a:rPr>
+              <a:t>jmp</a:t>
+            </a:r>
+            <a:r>
+              <a:rPr lang="en-US" sz="1400" dirty="0">
+                <a:solidFill>
+                  <a:schemeClr val="accent2"/>
+                </a:solidFill>
+                <a:latin typeface="Courier New" pitchFamily="49" charset="0"/>
+                <a:cs typeface="Courier New" pitchFamily="49" charset="0"/>
+              </a:rPr>
+              <a:t>    </a:t>
+            </a:r>
+            <a:r>
+              <a:rPr lang="en-US" sz="1400" dirty="0" err="1">
+                <a:solidFill>
+                  <a:schemeClr val="accent2"/>
+                </a:solidFill>
+                <a:latin typeface="Courier New" pitchFamily="49" charset="0"/>
+                <a:cs typeface="Courier New" pitchFamily="49" charset="0"/>
+              </a:rPr>
+              <a:t>check_btn</a:t>
+            </a:r>
+            <a:endParaRPr lang="en-US" sz="1400" dirty="0">
+              <a:solidFill>
+                <a:schemeClr val="accent2"/>
+              </a:solidFill>
+              <a:latin typeface="Courier New" pitchFamily="49" charset="0"/>
+              <a:cs typeface="Courier New" pitchFamily="49" charset="0"/>
+            </a:endParaRPr>
+          </a:p>
+          <a:p>
+            <a:pPr marL="0" indent="0">
+              <a:buNone/>
+            </a:pPr>
+            <a:r>
+              <a:rPr lang="en-US" sz="1400" dirty="0" err="1">
+                <a:solidFill>
+                  <a:schemeClr val="accent2"/>
+                </a:solidFill>
+                <a:latin typeface="Courier New" pitchFamily="49" charset="0"/>
+                <a:cs typeface="Courier New" pitchFamily="49" charset="0"/>
+              </a:rPr>
+              <a:t>set_lights</a:t>
+            </a:r>
+            <a:r>
+              <a:rPr lang="en-US" sz="1400" dirty="0">
+                <a:solidFill>
+                  <a:schemeClr val="accent2"/>
+                </a:solidFill>
+                <a:latin typeface="Courier New" pitchFamily="49" charset="0"/>
+                <a:cs typeface="Courier New" pitchFamily="49" charset="0"/>
+              </a:rPr>
+              <a:t>:   </a:t>
+            </a:r>
+            <a:r>
+              <a:rPr lang="en-US" sz="1400" dirty="0" err="1">
+                <a:solidFill>
+                  <a:schemeClr val="accent2"/>
+                </a:solidFill>
+                <a:latin typeface="Courier New" pitchFamily="49" charset="0"/>
+                <a:cs typeface="Courier New" pitchFamily="49" charset="0"/>
+              </a:rPr>
+              <a:t>bis.b</a:t>
+            </a:r>
+            <a:r>
+              <a:rPr lang="en-US" sz="1400" dirty="0">
+                <a:solidFill>
+                  <a:schemeClr val="accent2"/>
+                </a:solidFill>
+                <a:latin typeface="Courier New" pitchFamily="49" charset="0"/>
+                <a:cs typeface="Courier New" pitchFamily="49" charset="0"/>
+              </a:rPr>
+              <a:t>  #BIT0|BIT6, &amp;P1OUT</a:t>
+            </a:r>
+          </a:p>
+          <a:p>
+            <a:pPr marL="0" indent="0">
+              <a:buNone/>
+            </a:pPr>
+            <a:r>
+              <a:rPr lang="en-US" sz="1400" dirty="0">
+                <a:solidFill>
+                  <a:schemeClr val="accent2"/>
+                </a:solidFill>
+                <a:latin typeface="Courier New" pitchFamily="49" charset="0"/>
+                <a:cs typeface="Courier New" pitchFamily="49" charset="0"/>
+              </a:rPr>
+              <a:t>              </a:t>
+            </a:r>
+            <a:r>
+              <a:rPr lang="en-US" sz="1400" dirty="0" err="1">
+                <a:solidFill>
+                  <a:schemeClr val="accent2"/>
+                </a:solidFill>
+                <a:latin typeface="Courier New" pitchFamily="49" charset="0"/>
+                <a:cs typeface="Courier New" pitchFamily="49" charset="0"/>
+              </a:rPr>
+              <a:t>jmp</a:t>
+            </a:r>
+            <a:r>
+              <a:rPr lang="en-US" sz="1400" dirty="0">
+                <a:solidFill>
+                  <a:schemeClr val="accent2"/>
+                </a:solidFill>
+                <a:latin typeface="Courier New" pitchFamily="49" charset="0"/>
+                <a:cs typeface="Courier New" pitchFamily="49" charset="0"/>
+              </a:rPr>
+              <a:t>    </a:t>
+            </a:r>
+            <a:r>
+              <a:rPr lang="en-US" sz="1400" dirty="0" err="1">
+                <a:solidFill>
+                  <a:schemeClr val="accent2"/>
+                </a:solidFill>
+                <a:latin typeface="Courier New" pitchFamily="49" charset="0"/>
+                <a:cs typeface="Courier New" pitchFamily="49" charset="0"/>
+              </a:rPr>
+              <a:t>check_btn</a:t>
+            </a:r>
+            <a:endParaRPr lang="en-US" sz="1400" dirty="0">
+              <a:solidFill>
+                <a:schemeClr val="accent2"/>
+              </a:solidFill>
+              <a:latin typeface="Courier New" pitchFamily="49" charset="0"/>
+              <a:cs typeface="Courier New" pitchFamily="49" charset="0"/>
+            </a:endParaRPr>
+          </a:p>
+          <a:p>
+            <a:pPr marL="0" indent="0">
+              <a:buNone/>
+            </a:pPr>
+            <a:endParaRPr lang="en-US" sz="1400" dirty="0">
+              <a:solidFill>
+                <a:schemeClr val="accent2"/>
+              </a:solidFill>
+              <a:latin typeface="Courier New" pitchFamily="49" charset="0"/>
+              <a:cs typeface="Courier New" pitchFamily="49" charset="0"/>
+            </a:endParaRPr>
+          </a:p>
+          <a:p>
+            <a:pPr marL="0" indent="0">
+              <a:buNone/>
+            </a:pPr>
+            <a:endParaRPr lang="en-US" sz="1400" dirty="0">
+              <a:solidFill>
+                <a:schemeClr val="accent2"/>
+              </a:solidFill>
+              <a:latin typeface="Courier New" pitchFamily="49" charset="0"/>
+              <a:cs typeface="Courier New" pitchFamily="49" charset="0"/>
+            </a:endParaRPr>
+          </a:p>
+          <a:p>
+            <a:pPr marL="0" indent="0">
+              <a:buNone/>
+            </a:pPr>
+            <a:r>
+              <a:rPr lang="en-US" sz="2000" dirty="0"/>
+              <a:t>Any problem with this code?</a:t>
+            </a:r>
+            <a:endParaRPr lang="en-US" sz="2000" dirty="0">
+              <a:solidFill>
+                <a:schemeClr val="accent2"/>
+              </a:solidFill>
+              <a:latin typeface="Courier New" pitchFamily="49" charset="0"/>
+              <a:cs typeface="Courier New" pitchFamily="49" charset="0"/>
+            </a:endParaRPr>
+          </a:p>
+          <a:p>
+            <a:pPr lvl="1"/>
+            <a:endParaRPr lang="en-US" sz="1600" dirty="0"/>
+          </a:p>
+          <a:p>
+            <a:pPr lvl="1"/>
+            <a:endParaRPr lang="en-US" sz="2200" dirty="0"/>
+          </a:p>
+          <a:p>
+            <a:endParaRPr lang="en-US" sz="2000" dirty="0">
+              <a:solidFill>
+                <a:schemeClr val="accent2"/>
+              </a:solidFill>
+            </a:endParaRPr>
+          </a:p>
+        </p:txBody>
+      </p:sp>
+      <p:sp>
+        <p:nvSpPr>
+          <p:cNvPr id="4" name="TextBox 3"/>
+          <p:cNvSpPr txBox="1"/>
+          <p:nvPr/>
+        </p:nvSpPr>
+        <p:spPr>
+          <a:xfrm>
+            <a:off x="5813949" y="1940673"/>
+            <a:ext cx="3616657" cy="1015663"/>
+          </a:xfrm>
+          <a:prstGeom prst="rect">
+            <a:avLst/>
+          </a:prstGeom>
+          <a:noFill/>
+        </p:spPr>
+        <p:txBody>
+          <a:bodyPr wrap="square" rtlCol="0">
+            <a:spAutoFit/>
+          </a:bodyPr>
+          <a:lstStyle/>
+          <a:p>
+            <a:r>
+              <a:rPr lang="en-US" dirty="0" smtClean="0"/>
+              <a:t>Family Users Guide p 328</a:t>
+            </a:r>
+          </a:p>
+          <a:p>
+            <a:r>
+              <a:rPr lang="en-US" dirty="0" smtClean="0"/>
+              <a:t>Blue Book pp 38</a:t>
+            </a:r>
+          </a:p>
+        </p:txBody>
+      </p:sp>
+    </p:spTree>
+    <p:extLst>
+      <p:ext uri="{BB962C8B-B14F-4D97-AF65-F5344CB8AC3E}">
+        <p14:creationId xmlns:p14="http://schemas.microsoft.com/office/powerpoint/2010/main" val="2697282666"/>
+      </p:ext>
+    </p:extLst>
+  </p:cSld>
+  <p:clrMapOvr>
+    <a:masterClrMapping/>
+  </p:clrMapOvr>
+  <p:timing>
+    <p:tnLst>
+      <p:par>
+        <p:cTn id="1" dur="indefinite" restart="never" nodeType="tmRoot">
+          <p:childTnLst>
+            <p:seq concurrent="1" nextAc="seek">
+              <p:cTn id="2" dur="indefinite" nodeType="mainSeq">
+                <p:childTnLst>
+                  <p:par>
+                    <p:cTn id="3" fill="hold">
+                      <p:stCondLst>
+                        <p:cond delay="indefinite"/>
+                      </p:stCondLst>
+                      <p:childTnLst>
+                        <p:par>
+                          <p:cTn id="4" fill="hold">
+                            <p:stCondLst>
+                              <p:cond delay="0"/>
+                            </p:stCondLst>
+                            <p:childTnLst>
+                              <p:par>
+                                <p:cTn id="5" presetID="1" presetClass="entr" presetSubtype="0" fill="hold" grpId="0" nodeType="clickEffect">
+                                  <p:stCondLst>
+                                    <p:cond delay="0"/>
+                                  </p:stCondLst>
+                                  <p:childTnLst>
+                                    <p:set>
+                                      <p:cBhvr>
+                                        <p:cTn id="6" dur="1" fill="hold">
+                                          <p:stCondLst>
+                                            <p:cond delay="0"/>
+                                          </p:stCondLst>
+                                        </p:cTn>
+                                        <p:tgtEl>
+                                          <p:spTgt spid="4"/>
+                                        </p:tgtEl>
+                                        <p:attrNameLst>
+                                          <p:attrName>style.visibility</p:attrName>
+                                        </p:attrNameLst>
+                                      </p:cBhvr>
+                                      <p:to>
+                                        <p:strVal val="visible"/>
+                                      </p:to>
+                                    </p:set>
+                                  </p:childTnLst>
+                                </p:cTn>
+                              </p:par>
+                            </p:childTnLst>
+                          </p:cTn>
+                        </p:par>
+                      </p:childTnLst>
+                    </p:cTn>
+                  </p:par>
+                </p:childTnLst>
+              </p:cTn>
+              <p:prevCondLst>
+                <p:cond evt="onPrev" delay="0">
+                  <p:tgtEl>
+                    <p:sldTgt/>
+                  </p:tgtEl>
+                </p:cond>
+              </p:prevCondLst>
+              <p:nextCondLst>
+                <p:cond evt="onNext" delay="0">
+                  <p:tgtEl>
+                    <p:sldTgt/>
+                  </p:tgtEl>
+                </p:cond>
+              </p:nextCondLst>
+            </p:seq>
+          </p:childTnLst>
+        </p:cTn>
+      </p:par>
+    </p:tnLst>
+    <p:bldLst>
+      <p:bldP spid="4" grpId="0"/>
+    </p:bldLst>
+  </p:timing>
+</p:sld>
+</file>
+
+<file path=ppt/slides/slide12.xml><?xml version="1.0" encoding="utf-8"?>
+<p:sld xmlns:a="http://schemas.openxmlformats.org/drawingml/2006/main" xmlns:r="http://schemas.openxmlformats.org/officeDocument/2006/relationships" xmlns:p="http://schemas.openxmlformats.org/presentationml/2006/main">
+  <p:cSld>
+    <p:spTree>
+      <p:nvGrpSpPr>
+        <p:cNvPr id="1" name=""/>
+        <p:cNvGrpSpPr/>
+        <p:nvPr/>
+      </p:nvGrpSpPr>
+      <p:grpSpPr>
+        <a:xfrm>
+          <a:off x="0" y="0"/>
+          <a:ext cx="0" cy="0"/>
+          <a:chOff x="0" y="0"/>
+          <a:chExt cx="0" cy="0"/>
+        </a:xfrm>
+      </p:grpSpPr>
+      <p:sp>
+        <p:nvSpPr>
+          <p:cNvPr id="2" name="Title 1"/>
+          <p:cNvSpPr>
+            <a:spLocks noGrp="1"/>
+          </p:cNvSpPr>
+          <p:nvPr>
+            <p:ph type="title"/>
+          </p:nvPr>
+        </p:nvSpPr>
+        <p:spPr/>
+        <p:txBody>
+          <a:bodyPr/>
+          <a:lstStyle/>
+          <a:p>
+            <a:r>
+              <a:rPr lang="en-US" b="1" dirty="0" smtClean="0"/>
               <a:t>Example Program</a:t>
             </a:r>
             <a:endParaRPr lang="en-US" dirty="0"/>
@@ -4997,527 +6049,6 @@
 </p:sld>
 </file>
 
-<file path=ppt/slides/slide11.xml><?xml version="1.0" encoding="utf-8"?>
-<p:sld xmlns:a="http://schemas.openxmlformats.org/drawingml/2006/main" xmlns:r="http://schemas.openxmlformats.org/officeDocument/2006/relationships" xmlns:p="http://schemas.openxmlformats.org/presentationml/2006/main">
-  <p:cSld>
-    <p:spTree>
-      <p:nvGrpSpPr>
-        <p:cNvPr id="1" name=""/>
-        <p:cNvGrpSpPr/>
-        <p:nvPr/>
-      </p:nvGrpSpPr>
-      <p:grpSpPr>
-        <a:xfrm>
-          <a:off x="0" y="0"/>
-          <a:ext cx="0" cy="0"/>
-          <a:chOff x="0" y="0"/>
-          <a:chExt cx="0" cy="0"/>
-        </a:xfrm>
-      </p:grpSpPr>
-      <p:sp>
-        <p:nvSpPr>
-          <p:cNvPr id="2" name="Title 1"/>
-          <p:cNvSpPr>
-            <a:spLocks noGrp="1"/>
-          </p:cNvSpPr>
-          <p:nvPr>
-            <p:ph type="title"/>
-          </p:nvPr>
-        </p:nvSpPr>
-        <p:spPr/>
-        <p:txBody>
-          <a:bodyPr/>
-          <a:lstStyle/>
-          <a:p>
-            <a:r>
-              <a:rPr lang="en-US" b="1" dirty="0" smtClean="0"/>
-              <a:t>Pitfall !!!</a:t>
-            </a:r>
-            <a:endParaRPr lang="en-US" dirty="0"/>
-          </a:p>
-        </p:txBody>
-      </p:sp>
-      <p:sp>
-        <p:nvSpPr>
-          <p:cNvPr id="3" name="Content Placeholder 2"/>
-          <p:cNvSpPr>
-            <a:spLocks noGrp="1"/>
-          </p:cNvSpPr>
-          <p:nvPr>
-            <p:ph idx="1"/>
-          </p:nvPr>
-        </p:nvSpPr>
-        <p:spPr>
-          <a:xfrm>
-            <a:off x="395177" y="669852"/>
-            <a:ext cx="8493642" cy="4724400"/>
-          </a:xfrm>
-        </p:spPr>
-        <p:txBody>
-          <a:bodyPr/>
-          <a:lstStyle/>
-          <a:p>
-            <a:endParaRPr lang="en-US" sz="2000" dirty="0" smtClean="0">
-              <a:solidFill>
-                <a:schemeClr val="accent2"/>
-              </a:solidFill>
-            </a:endParaRPr>
-          </a:p>
-          <a:p>
-            <a:endParaRPr lang="en-US" sz="2000" dirty="0" smtClean="0">
-              <a:solidFill>
-                <a:schemeClr val="accent2"/>
-              </a:solidFill>
-            </a:endParaRPr>
-          </a:p>
-          <a:p>
-            <a:r>
-              <a:rPr lang="en-US" sz="2000" dirty="0" smtClean="0">
-                <a:solidFill>
-                  <a:schemeClr val="accent2"/>
-                </a:solidFill>
-              </a:rPr>
-              <a:t>Anything wrong with this?</a:t>
-            </a:r>
-          </a:p>
-          <a:p>
-            <a:endParaRPr lang="en-US" sz="2000" dirty="0" smtClean="0">
-              <a:solidFill>
-                <a:schemeClr val="accent2"/>
-              </a:solidFill>
-            </a:endParaRPr>
-          </a:p>
-          <a:p>
-            <a:pPr lvl="1"/>
-            <a:r>
-              <a:rPr lang="en-US" sz="1600" dirty="0" err="1" smtClean="0">
-                <a:latin typeface="Courier New" pitchFamily="49" charset="0"/>
-                <a:cs typeface="Courier New" pitchFamily="49" charset="0"/>
-              </a:rPr>
-              <a:t>mov.b</a:t>
-            </a:r>
-            <a:r>
-              <a:rPr lang="en-US" sz="1600" dirty="0" smtClean="0">
-                <a:latin typeface="Courier New" pitchFamily="49" charset="0"/>
-                <a:cs typeface="Courier New" pitchFamily="49" charset="0"/>
-              </a:rPr>
-              <a:t>  #0xff, P1DIR</a:t>
-            </a:r>
-            <a:endParaRPr lang="en-US" sz="1600" dirty="0"/>
-          </a:p>
-          <a:p>
-            <a:endParaRPr lang="en-US" sz="2000" dirty="0" smtClean="0">
-              <a:solidFill>
-                <a:schemeClr val="accent2"/>
-              </a:solidFill>
-            </a:endParaRPr>
-          </a:p>
-          <a:p>
-            <a:r>
-              <a:rPr lang="en-US" sz="2000" dirty="0" smtClean="0">
-                <a:solidFill>
-                  <a:schemeClr val="accent2"/>
-                </a:solidFill>
-              </a:rPr>
-              <a:t>What do these commands do?</a:t>
-            </a:r>
-            <a:endParaRPr lang="en-US" sz="2000" dirty="0">
-              <a:solidFill>
-                <a:schemeClr val="accent2"/>
-              </a:solidFill>
-            </a:endParaRPr>
-          </a:p>
-          <a:p>
-            <a:pPr lvl="1"/>
-            <a:r>
-              <a:rPr lang="en-US" sz="1600" dirty="0" err="1" smtClean="0">
-                <a:latin typeface="Courier New" pitchFamily="49" charset="0"/>
-                <a:cs typeface="Courier New" pitchFamily="49" charset="0"/>
-              </a:rPr>
-              <a:t>mov.b</a:t>
-            </a:r>
-            <a:r>
-              <a:rPr lang="en-US" sz="1600" dirty="0" smtClean="0">
-                <a:latin typeface="Courier New" pitchFamily="49" charset="0"/>
-                <a:cs typeface="Courier New" pitchFamily="49" charset="0"/>
-              </a:rPr>
-              <a:t>  </a:t>
-            </a:r>
-            <a:r>
-              <a:rPr lang="en-US" sz="1600" dirty="0">
-                <a:latin typeface="Courier New" pitchFamily="49" charset="0"/>
-                <a:cs typeface="Courier New" pitchFamily="49" charset="0"/>
-              </a:rPr>
-              <a:t>#</a:t>
-            </a:r>
-            <a:r>
-              <a:rPr lang="en-US" sz="1600" dirty="0" smtClean="0">
-                <a:latin typeface="Courier New" pitchFamily="49" charset="0"/>
-                <a:cs typeface="Courier New" pitchFamily="49" charset="0"/>
-              </a:rPr>
-              <a:t>0b00001111, &amp;P1DIR</a:t>
-            </a:r>
-          </a:p>
-          <a:p>
-            <a:pPr lvl="1"/>
-            <a:r>
-              <a:rPr lang="en-US" sz="1600" dirty="0" err="1" smtClean="0">
-                <a:latin typeface="Courier New" pitchFamily="49" charset="0"/>
-                <a:cs typeface="Courier New" pitchFamily="49" charset="0"/>
-              </a:rPr>
-              <a:t>bis.b</a:t>
-            </a:r>
-            <a:r>
-              <a:rPr lang="en-US" sz="1600" dirty="0" smtClean="0">
-                <a:latin typeface="Courier New" pitchFamily="49" charset="0"/>
-                <a:cs typeface="Courier New" pitchFamily="49" charset="0"/>
-              </a:rPr>
-              <a:t>  </a:t>
-            </a:r>
-            <a:r>
-              <a:rPr lang="en-US" sz="1600" dirty="0">
-                <a:latin typeface="Courier New" pitchFamily="49" charset="0"/>
-                <a:cs typeface="Courier New" pitchFamily="49" charset="0"/>
-              </a:rPr>
-              <a:t>#0b00001111, &amp;</a:t>
-            </a:r>
-            <a:r>
-              <a:rPr lang="en-US" sz="1600" dirty="0" smtClean="0">
-                <a:latin typeface="Courier New" pitchFamily="49" charset="0"/>
-                <a:cs typeface="Courier New" pitchFamily="49" charset="0"/>
-              </a:rPr>
-              <a:t>P1OUT</a:t>
-            </a:r>
-          </a:p>
-          <a:p>
-            <a:pPr lvl="1"/>
-            <a:r>
-              <a:rPr lang="en-US" sz="1600" dirty="0" err="1" smtClean="0">
-                <a:latin typeface="Courier New" pitchFamily="49" charset="0"/>
-                <a:cs typeface="Courier New" pitchFamily="49" charset="0"/>
-              </a:rPr>
-              <a:t>mov.b</a:t>
-            </a:r>
-            <a:r>
-              <a:rPr lang="en-US" sz="1600" dirty="0" smtClean="0">
-                <a:latin typeface="Courier New" pitchFamily="49" charset="0"/>
-                <a:cs typeface="Courier New" pitchFamily="49" charset="0"/>
-              </a:rPr>
-              <a:t>  #0xff, </a:t>
-            </a:r>
-            <a:r>
-              <a:rPr lang="en-US" sz="1600" dirty="0">
-                <a:latin typeface="Courier New" pitchFamily="49" charset="0"/>
-                <a:cs typeface="Courier New" pitchFamily="49" charset="0"/>
-              </a:rPr>
-              <a:t>&amp;</a:t>
-            </a:r>
-            <a:r>
-              <a:rPr lang="en-US" sz="1600" dirty="0" smtClean="0">
-                <a:latin typeface="Courier New" pitchFamily="49" charset="0"/>
-                <a:cs typeface="Courier New" pitchFamily="49" charset="0"/>
-              </a:rPr>
-              <a:t>P1OUT</a:t>
-            </a:r>
-          </a:p>
-          <a:p>
-            <a:pPr lvl="1"/>
-            <a:r>
-              <a:rPr lang="en-US" sz="1600" dirty="0" err="1" smtClean="0">
-                <a:latin typeface="Courier New" pitchFamily="49" charset="0"/>
-                <a:cs typeface="Courier New" pitchFamily="49" charset="0"/>
-              </a:rPr>
-              <a:t>mov.b</a:t>
-            </a:r>
-            <a:r>
-              <a:rPr lang="en-US" sz="1600" dirty="0" smtClean="0">
-                <a:latin typeface="Courier New" pitchFamily="49" charset="0"/>
-                <a:cs typeface="Courier New" pitchFamily="49" charset="0"/>
-              </a:rPr>
-              <a:t>  &amp;P1IN, r5 </a:t>
-            </a:r>
-            <a:endParaRPr lang="en-US" sz="1600" dirty="0">
-              <a:latin typeface="Courier New" pitchFamily="49" charset="0"/>
-              <a:cs typeface="Courier New" pitchFamily="49" charset="0"/>
-            </a:endParaRPr>
-          </a:p>
-          <a:p>
-            <a:pPr lvl="1"/>
-            <a:endParaRPr lang="en-US" sz="1600" dirty="0"/>
-          </a:p>
-          <a:p>
-            <a:endParaRPr lang="en-US" sz="2000" dirty="0">
-              <a:solidFill>
-                <a:schemeClr val="accent2"/>
-              </a:solidFill>
-            </a:endParaRPr>
-          </a:p>
-          <a:p>
-            <a:pPr lvl="1"/>
-            <a:endParaRPr lang="en-US" sz="2000" dirty="0" smtClean="0"/>
-          </a:p>
-          <a:p>
-            <a:endParaRPr lang="en-US" sz="2000" dirty="0">
-              <a:solidFill>
-                <a:schemeClr val="accent2"/>
-              </a:solidFill>
-            </a:endParaRPr>
-          </a:p>
-          <a:p>
-            <a:endParaRPr lang="en-US" sz="2000" dirty="0" smtClean="0">
-              <a:solidFill>
-                <a:schemeClr val="accent2"/>
-              </a:solidFill>
-            </a:endParaRPr>
-          </a:p>
-          <a:p>
-            <a:endParaRPr lang="en-US" sz="2000" dirty="0"/>
-          </a:p>
-        </p:txBody>
-      </p:sp>
-    </p:spTree>
-    <p:extLst>
-      <p:ext uri="{BB962C8B-B14F-4D97-AF65-F5344CB8AC3E}">
-        <p14:creationId xmlns:p14="http://schemas.microsoft.com/office/powerpoint/2010/main" val="45763967"/>
-      </p:ext>
-    </p:extLst>
-  </p:cSld>
-  <p:clrMapOvr>
-    <a:masterClrMapping/>
-  </p:clrMapOvr>
-  <p:timing>
-    <p:tnLst>
-      <p:par>
-        <p:cTn id="1" dur="indefinite" restart="never" nodeType="tmRoot"/>
-      </p:par>
-    </p:tnLst>
-  </p:timing>
-</p:sld>
-</file>
-
-<file path=ppt/slides/slide12.xml><?xml version="1.0" encoding="utf-8"?>
-<p:sld xmlns:a="http://schemas.openxmlformats.org/drawingml/2006/main" xmlns:r="http://schemas.openxmlformats.org/officeDocument/2006/relationships" xmlns:p="http://schemas.openxmlformats.org/presentationml/2006/main">
-  <p:cSld>
-    <p:spTree>
-      <p:nvGrpSpPr>
-        <p:cNvPr id="1" name=""/>
-        <p:cNvGrpSpPr/>
-        <p:nvPr/>
-      </p:nvGrpSpPr>
-      <p:grpSpPr>
-        <a:xfrm>
-          <a:off x="0" y="0"/>
-          <a:ext cx="0" cy="0"/>
-          <a:chOff x="0" y="0"/>
-          <a:chExt cx="0" cy="0"/>
-        </a:xfrm>
-      </p:grpSpPr>
-      <p:sp>
-        <p:nvSpPr>
-          <p:cNvPr id="2" name="Title 1"/>
-          <p:cNvSpPr>
-            <a:spLocks noGrp="1"/>
-          </p:cNvSpPr>
-          <p:nvPr>
-            <p:ph type="title"/>
-          </p:nvPr>
-        </p:nvSpPr>
-        <p:spPr/>
-        <p:txBody>
-          <a:bodyPr/>
-          <a:lstStyle/>
-          <a:p>
-            <a:r>
-              <a:rPr lang="en-US" b="1" dirty="0" smtClean="0"/>
-              <a:t>Multiplexing</a:t>
-            </a:r>
-            <a:endParaRPr lang="en-US" dirty="0"/>
-          </a:p>
-        </p:txBody>
-      </p:sp>
-      <p:sp>
-        <p:nvSpPr>
-          <p:cNvPr id="3" name="Content Placeholder 2"/>
-          <p:cNvSpPr>
-            <a:spLocks noGrp="1"/>
-          </p:cNvSpPr>
-          <p:nvPr>
-            <p:ph idx="1"/>
-          </p:nvPr>
-        </p:nvSpPr>
-        <p:spPr>
-          <a:xfrm>
-            <a:off x="395177" y="669852"/>
-            <a:ext cx="8493642" cy="4724400"/>
-          </a:xfrm>
-        </p:spPr>
-        <p:txBody>
-          <a:bodyPr/>
-          <a:lstStyle/>
-          <a:p>
-            <a:r>
-              <a:rPr lang="en-US" sz="2000" dirty="0" smtClean="0">
-                <a:solidFill>
-                  <a:schemeClr val="accent2"/>
-                </a:solidFill>
-              </a:rPr>
-              <a:t>Only 20 Pins !!! But want access to many more signals</a:t>
-            </a:r>
-          </a:p>
-          <a:p>
-            <a:pPr lvl="1"/>
-            <a:r>
-              <a:rPr lang="en-US" sz="1600" dirty="0" smtClean="0"/>
-              <a:t>Therefore, each pin shares several signals </a:t>
-            </a:r>
-            <a:r>
-              <a:rPr lang="en-US" sz="1600" dirty="0" smtClean="0">
-                <a:sym typeface="Wingdings" pitchFamily="2" charset="2"/>
-              </a:rPr>
-              <a:t> multiplexing</a:t>
-            </a:r>
-            <a:endParaRPr lang="en-US" sz="1600" dirty="0" smtClean="0"/>
-          </a:p>
-          <a:p>
-            <a:endParaRPr lang="en-US" sz="2000" dirty="0" smtClean="0">
-              <a:solidFill>
-                <a:schemeClr val="accent2"/>
-              </a:solidFill>
-            </a:endParaRPr>
-          </a:p>
-          <a:p>
-            <a:endParaRPr lang="en-US" sz="2000" dirty="0">
-              <a:solidFill>
-                <a:schemeClr val="accent2"/>
-              </a:solidFill>
-            </a:endParaRPr>
-          </a:p>
-          <a:p>
-            <a:endParaRPr lang="en-US" sz="2000" dirty="0" smtClean="0">
-              <a:solidFill>
-                <a:schemeClr val="accent2"/>
-              </a:solidFill>
-            </a:endParaRPr>
-          </a:p>
-          <a:p>
-            <a:endParaRPr lang="en-US" sz="2000" dirty="0">
-              <a:solidFill>
-                <a:schemeClr val="accent2"/>
-              </a:solidFill>
-            </a:endParaRPr>
-          </a:p>
-          <a:p>
-            <a:endParaRPr lang="en-US" sz="2000" dirty="0" smtClean="0">
-              <a:solidFill>
-                <a:schemeClr val="accent2"/>
-              </a:solidFill>
-            </a:endParaRPr>
-          </a:p>
-          <a:p>
-            <a:endParaRPr lang="en-US" sz="2000" dirty="0" smtClean="0">
-              <a:solidFill>
-                <a:schemeClr val="accent2"/>
-              </a:solidFill>
-            </a:endParaRPr>
-          </a:p>
-          <a:p>
-            <a:endParaRPr lang="en-US" sz="2000" dirty="0">
-              <a:solidFill>
-                <a:schemeClr val="accent2"/>
-              </a:solidFill>
-            </a:endParaRPr>
-          </a:p>
-          <a:p>
-            <a:r>
-              <a:rPr lang="en-US" sz="2000" dirty="0" smtClean="0">
-                <a:solidFill>
-                  <a:schemeClr val="accent2"/>
-                </a:solidFill>
-              </a:rPr>
-              <a:t>Use PxSEL1 and PxSEL2 to select signal for each pin</a:t>
-            </a:r>
-          </a:p>
-          <a:p>
-            <a:pPr lvl="1"/>
-            <a:r>
-              <a:rPr lang="en-US" sz="2000" dirty="0"/>
-              <a:t>The details are in the </a:t>
-            </a:r>
-            <a:r>
-              <a:rPr lang="en-US" sz="2000" dirty="0">
-                <a:hlinkClick r:id="rId2" action="ppaction://hlinkfile"/>
-              </a:rPr>
-              <a:t>MSP430G2x53 2x13 Mixed Signal MCU Datasheet</a:t>
-            </a:r>
-            <a:r>
-              <a:rPr lang="en-US" sz="2000" dirty="0"/>
-              <a:t>.</a:t>
-            </a:r>
-            <a:endParaRPr lang="en-US" sz="1600" dirty="0"/>
-          </a:p>
-        </p:txBody>
-      </p:sp>
-      <p:pic>
-        <p:nvPicPr>
-          <p:cNvPr id="4" name="Picture 2" descr="MSP430G2553 Pinout"/>
-          <p:cNvPicPr>
-            <a:picLocks noChangeAspect="1" noChangeArrowheads="1"/>
-          </p:cNvPicPr>
-          <p:nvPr/>
-        </p:nvPicPr>
-        <p:blipFill>
-          <a:blip r:embed="rId3">
-            <a:extLst>
-              <a:ext uri="{28A0092B-C50C-407E-A947-70E740481C1C}">
-                <a14:useLocalDpi xmlns:a14="http://schemas.microsoft.com/office/drawing/2010/main" val="0"/>
-              </a:ext>
-            </a:extLst>
-          </a:blip>
-          <a:srcRect/>
-          <a:stretch>
-            <a:fillRect/>
-          </a:stretch>
-        </p:blipFill>
-        <p:spPr bwMode="auto">
-          <a:xfrm>
-            <a:off x="1121224" y="1334418"/>
-            <a:ext cx="6543675" cy="2381250"/>
-          </a:xfrm>
-          <a:prstGeom prst="rect">
-            <a:avLst/>
-          </a:prstGeom>
-          <a:noFill/>
-          <a:extLst>
-            <a:ext uri="{909E8E84-426E-40DD-AFC4-6F175D3DCCD1}">
-              <a14:hiddenFill xmlns:a14="http://schemas.microsoft.com/office/drawing/2010/main">
-                <a:solidFill>
-                  <a:srgbClr val="FFFFFF"/>
-                </a:solidFill>
-              </a14:hiddenFill>
-            </a:ext>
-          </a:extLst>
-        </p:spPr>
-      </p:pic>
-    </p:spTree>
-    <p:extLst>
-      <p:ext uri="{BB962C8B-B14F-4D97-AF65-F5344CB8AC3E}">
-        <p14:creationId xmlns:p14="http://schemas.microsoft.com/office/powerpoint/2010/main" val="3207840792"/>
-      </p:ext>
-    </p:extLst>
-  </p:cSld>
-  <p:clrMapOvr>
-    <a:masterClrMapping/>
-  </p:clrMapOvr>
-  <p:timing>
-    <p:tnLst>
-      <p:par>
-        <p:cTn id="1" dur="indefinite" restart="never" nodeType="tmRoot"/>
-      </p:par>
-    </p:tnLst>
-  </p:timing>
-</p:sld>
-</file>
-
 <file path=ppt/slides/slide13.xml><?xml version="1.0" encoding="utf-8"?>
 <p:sld xmlns:a="http://schemas.openxmlformats.org/drawingml/2006/main" xmlns:r="http://schemas.openxmlformats.org/officeDocument/2006/relationships" xmlns:p="http://schemas.openxmlformats.org/presentationml/2006/main">
   <p:cSld>
@@ -5537,251 +6068,162 @@
       </p:grpSpPr>
       <p:sp>
         <p:nvSpPr>
-          <p:cNvPr id="2" name="Title 1"/>
+          <p:cNvPr id="25602" name="Footer Placeholder 1"/>
           <p:cNvSpPr>
             <a:spLocks noGrp="1"/>
           </p:cNvSpPr>
           <p:nvPr>
-            <p:ph type="title"/>
-          </p:nvPr>
-        </p:nvSpPr>
-        <p:spPr/>
-        <p:txBody>
-          <a:bodyPr/>
-          <a:lstStyle/>
-          <a:p>
-            <a:r>
-              <a:rPr lang="en-US" b="1" dirty="0" smtClean="0"/>
-              <a:t>Pitfall !!!</a:t>
-            </a:r>
-            <a:endParaRPr lang="en-US" dirty="0"/>
-          </a:p>
-        </p:txBody>
-      </p:sp>
-      <p:sp>
-        <p:nvSpPr>
-          <p:cNvPr id="3" name="Content Placeholder 2"/>
-          <p:cNvSpPr>
-            <a:spLocks noGrp="1"/>
-          </p:cNvSpPr>
-          <p:nvPr>
-            <p:ph idx="1"/>
+            <p:ph type="ftr" sz="quarter" idx="4294967295"/>
           </p:nvPr>
         </p:nvSpPr>
         <p:spPr>
           <a:xfrm>
-            <a:off x="395177" y="669852"/>
-            <a:ext cx="8493642" cy="4724400"/>
+            <a:off x="95250" y="6267450"/>
+            <a:ext cx="2133600" cy="476250"/>
           </a:xfrm>
+          <a:prstGeom prst="rect">
+            <a:avLst/>
+          </a:prstGeom>
+          <a:noFill/>
+          <a:ln/>
+          <a:extLst>
+            <a:ext uri="{909E8E84-426E-40DD-AFC4-6F175D3DCCD1}">
+              <a14:hiddenFill xmlns:a14="http://schemas.microsoft.com/office/drawing/2010/main">
+                <a:solidFill>
+                  <a:srgbClr val="FFFFFF"/>
+                </a:solidFill>
+              </a14:hiddenFill>
+            </a:ext>
+            <a:ext uri="{91240B29-F687-4F45-9708-019B960494DF}">
+              <a14:hiddenLine xmlns:a14="http://schemas.microsoft.com/office/drawing/2010/main" w="9525">
+                <a:solidFill>
+                  <a:srgbClr val="000000"/>
+                </a:solidFill>
+                <a:miter lim="800000"/>
+                <a:headEnd/>
+                <a:tailEnd/>
+              </a14:hiddenLine>
+            </a:ext>
+          </a:extLst>
         </p:spPr>
         <p:txBody>
           <a:bodyPr/>
-          <a:lstStyle/>
-          <a:p>
-            <a:endParaRPr lang="en-US" sz="2000" dirty="0" smtClean="0">
-              <a:solidFill>
-                <a:schemeClr val="accent2"/>
-              </a:solidFill>
-            </a:endParaRPr>
-          </a:p>
-          <a:p>
-            <a:endParaRPr lang="en-US" sz="2000" dirty="0">
-              <a:solidFill>
-                <a:schemeClr val="accent2"/>
-              </a:solidFill>
-            </a:endParaRPr>
-          </a:p>
-          <a:p>
-            <a:endParaRPr lang="en-US" sz="2000" dirty="0" smtClean="0">
-              <a:solidFill>
-                <a:schemeClr val="accent2"/>
-              </a:solidFill>
-            </a:endParaRPr>
-          </a:p>
-          <a:p>
-            <a:endParaRPr lang="en-US" sz="2000" dirty="0">
-              <a:solidFill>
-                <a:schemeClr val="accent2"/>
-              </a:solidFill>
-            </a:endParaRPr>
-          </a:p>
-          <a:p>
-            <a:endParaRPr lang="en-US" sz="2000" dirty="0" smtClean="0">
-              <a:solidFill>
-                <a:schemeClr val="accent2"/>
-              </a:solidFill>
-            </a:endParaRPr>
-          </a:p>
-          <a:p>
-            <a:endParaRPr lang="en-US" sz="2000" dirty="0">
-              <a:solidFill>
-                <a:schemeClr val="accent2"/>
-              </a:solidFill>
-            </a:endParaRPr>
-          </a:p>
-          <a:p>
-            <a:endParaRPr lang="en-US" sz="2000" dirty="0" smtClean="0">
-              <a:solidFill>
-                <a:schemeClr val="accent2"/>
-              </a:solidFill>
-            </a:endParaRPr>
-          </a:p>
-          <a:p>
-            <a:endParaRPr lang="en-US" sz="2000" dirty="0" smtClean="0">
-              <a:solidFill>
-                <a:schemeClr val="accent2"/>
-              </a:solidFill>
-            </a:endParaRPr>
-          </a:p>
-          <a:p>
-            <a:endParaRPr lang="en-US" sz="2000" dirty="0" smtClean="0">
-              <a:solidFill>
-                <a:schemeClr val="accent2"/>
-              </a:solidFill>
-            </a:endParaRPr>
-          </a:p>
-          <a:p>
-            <a:endParaRPr lang="en-US" sz="2000" dirty="0" smtClean="0">
-              <a:solidFill>
-                <a:schemeClr val="accent2"/>
-              </a:solidFill>
-            </a:endParaRPr>
-          </a:p>
-          <a:p>
-            <a:endParaRPr lang="en-US" sz="2000" dirty="0">
-              <a:solidFill>
-                <a:schemeClr val="accent2"/>
-              </a:solidFill>
-            </a:endParaRPr>
-          </a:p>
-          <a:p>
-            <a:endParaRPr lang="en-US" sz="2000" dirty="0" smtClean="0">
-              <a:solidFill>
-                <a:schemeClr val="accent2"/>
-              </a:solidFill>
-            </a:endParaRPr>
-          </a:p>
-          <a:p>
-            <a:pPr marL="0" indent="0">
-              <a:buNone/>
-            </a:pPr>
-            <a:r>
-              <a:rPr lang="en-US" sz="1800" dirty="0" smtClean="0"/>
-              <a:t>Let's </a:t>
-            </a:r>
-            <a:r>
-              <a:rPr lang="en-US" sz="1800" dirty="0"/>
-              <a:t>say I wanted to make the UCA0SOMI function available on </a:t>
-            </a:r>
-            <a:r>
-              <a:rPr lang="en-US" sz="1800" dirty="0" smtClean="0"/>
-              <a:t>P1.1:</a:t>
-            </a:r>
-          </a:p>
-          <a:p>
-            <a:pPr lvl="1"/>
-            <a:r>
-              <a:rPr lang="en-US" sz="1200" dirty="0">
-                <a:solidFill>
-                  <a:srgbClr val="00B050"/>
-                </a:solidFill>
-                <a:latin typeface="Courier New" pitchFamily="49" charset="0"/>
-                <a:cs typeface="Courier New" pitchFamily="49" charset="0"/>
-              </a:rPr>
-              <a:t>; 'from USCI' means this bit is set automatically by the USCI when enabled</a:t>
-            </a:r>
-          </a:p>
-          <a:p>
-            <a:pPr lvl="1"/>
-            <a:r>
-              <a:rPr lang="en-US" sz="1200" dirty="0">
-                <a:latin typeface="Courier New" pitchFamily="49" charset="0"/>
-                <a:cs typeface="Courier New" pitchFamily="49" charset="0"/>
-              </a:rPr>
-              <a:t>    </a:t>
-            </a:r>
-            <a:r>
-              <a:rPr lang="en-US" sz="1200" dirty="0" err="1">
-                <a:latin typeface="Courier New" pitchFamily="49" charset="0"/>
-                <a:cs typeface="Courier New" pitchFamily="49" charset="0"/>
-              </a:rPr>
-              <a:t>bis.b</a:t>
-            </a:r>
-            <a:r>
-              <a:rPr lang="en-US" sz="1200" dirty="0">
-                <a:latin typeface="Courier New" pitchFamily="49" charset="0"/>
-                <a:cs typeface="Courier New" pitchFamily="49" charset="0"/>
-              </a:rPr>
-              <a:t>   #BIT1, P1SEL   </a:t>
-            </a:r>
-          </a:p>
-          <a:p>
-            <a:pPr lvl="1"/>
-            <a:r>
-              <a:rPr lang="en-US" sz="1200" dirty="0">
-                <a:latin typeface="Courier New" pitchFamily="49" charset="0"/>
-                <a:cs typeface="Courier New" pitchFamily="49" charset="0"/>
-              </a:rPr>
-              <a:t>    </a:t>
-            </a:r>
-            <a:r>
-              <a:rPr lang="en-US" sz="1200" dirty="0" err="1">
-                <a:latin typeface="Courier New" pitchFamily="49" charset="0"/>
-                <a:cs typeface="Courier New" pitchFamily="49" charset="0"/>
-              </a:rPr>
-              <a:t>bis.b</a:t>
-            </a:r>
-            <a:r>
-              <a:rPr lang="en-US" sz="1200" dirty="0">
-                <a:latin typeface="Courier New" pitchFamily="49" charset="0"/>
-                <a:cs typeface="Courier New" pitchFamily="49" charset="0"/>
-              </a:rPr>
-              <a:t>   #BIT1, </a:t>
-            </a:r>
-            <a:r>
-              <a:rPr lang="en-US" sz="1200" dirty="0" smtClean="0">
-                <a:latin typeface="Courier New" pitchFamily="49" charset="0"/>
-                <a:cs typeface="Courier New" pitchFamily="49" charset="0"/>
-              </a:rPr>
-              <a:t>P1SEL2</a:t>
-            </a:r>
-            <a:endParaRPr lang="en-US" sz="1600" dirty="0"/>
-          </a:p>
-          <a:p>
-            <a:endParaRPr lang="en-US" sz="2000" dirty="0">
-              <a:solidFill>
-                <a:schemeClr val="accent2"/>
-              </a:solidFill>
-            </a:endParaRPr>
-          </a:p>
-          <a:p>
-            <a:pPr lvl="1"/>
-            <a:endParaRPr lang="en-US" sz="2000" dirty="0" smtClean="0"/>
-          </a:p>
-          <a:p>
-            <a:endParaRPr lang="en-US" sz="2000" dirty="0">
-              <a:solidFill>
-                <a:schemeClr val="accent2"/>
-              </a:solidFill>
-            </a:endParaRPr>
-          </a:p>
-          <a:p>
-            <a:endParaRPr lang="en-US" sz="2000" dirty="0" smtClean="0">
-              <a:solidFill>
-                <a:schemeClr val="accent2"/>
-              </a:solidFill>
-            </a:endParaRPr>
-          </a:p>
-          <a:p>
-            <a:endParaRPr lang="en-US" sz="2000" dirty="0"/>
+          <a:lstStyle>
+            <a:lvl1pPr eaLnBrk="0" hangingPunct="0">
+              <a:defRPr sz="1200">
+                <a:solidFill>
+                  <a:schemeClr val="tx1"/>
+                </a:solidFill>
+                <a:latin typeface="Arial" charset="0"/>
+              </a:defRPr>
+            </a:lvl1pPr>
+            <a:lvl2pPr marL="742950" indent="-285750" eaLnBrk="0" hangingPunct="0">
+              <a:defRPr sz="1200">
+                <a:solidFill>
+                  <a:schemeClr val="tx1"/>
+                </a:solidFill>
+                <a:latin typeface="Arial" charset="0"/>
+              </a:defRPr>
+            </a:lvl2pPr>
+            <a:lvl3pPr marL="1143000" indent="-228600" eaLnBrk="0" hangingPunct="0">
+              <a:defRPr sz="1200">
+                <a:solidFill>
+                  <a:schemeClr val="tx1"/>
+                </a:solidFill>
+                <a:latin typeface="Arial" charset="0"/>
+              </a:defRPr>
+            </a:lvl3pPr>
+            <a:lvl4pPr marL="1600200" indent="-228600" eaLnBrk="0" hangingPunct="0">
+              <a:defRPr sz="1200">
+                <a:solidFill>
+                  <a:schemeClr val="tx1"/>
+                </a:solidFill>
+                <a:latin typeface="Arial" charset="0"/>
+              </a:defRPr>
+            </a:lvl4pPr>
+            <a:lvl5pPr marL="2057400" indent="-228600" eaLnBrk="0" hangingPunct="0">
+              <a:defRPr sz="1200">
+                <a:solidFill>
+                  <a:schemeClr val="tx1"/>
+                </a:solidFill>
+                <a:latin typeface="Arial" charset="0"/>
+              </a:defRPr>
+            </a:lvl5pPr>
+            <a:lvl6pPr marL="2514600" indent="-228600" eaLnBrk="0" fontAlgn="base" hangingPunct="0">
+              <a:spcBef>
+                <a:spcPct val="0"/>
+              </a:spcBef>
+              <a:spcAft>
+                <a:spcPct val="0"/>
+              </a:spcAft>
+              <a:defRPr sz="1200">
+                <a:solidFill>
+                  <a:schemeClr val="tx1"/>
+                </a:solidFill>
+                <a:latin typeface="Arial" charset="0"/>
+              </a:defRPr>
+            </a:lvl6pPr>
+            <a:lvl7pPr marL="2971800" indent="-228600" eaLnBrk="0" fontAlgn="base" hangingPunct="0">
+              <a:spcBef>
+                <a:spcPct val="0"/>
+              </a:spcBef>
+              <a:spcAft>
+                <a:spcPct val="0"/>
+              </a:spcAft>
+              <a:defRPr sz="1200">
+                <a:solidFill>
+                  <a:schemeClr val="tx1"/>
+                </a:solidFill>
+                <a:latin typeface="Arial" charset="0"/>
+              </a:defRPr>
+            </a:lvl7pPr>
+            <a:lvl8pPr marL="3429000" indent="-228600" eaLnBrk="0" fontAlgn="base" hangingPunct="0">
+              <a:spcBef>
+                <a:spcPct val="0"/>
+              </a:spcBef>
+              <a:spcAft>
+                <a:spcPct val="0"/>
+              </a:spcAft>
+              <a:defRPr sz="1200">
+                <a:solidFill>
+                  <a:schemeClr val="tx1"/>
+                </a:solidFill>
+                <a:latin typeface="Arial" charset="0"/>
+              </a:defRPr>
+            </a:lvl8pPr>
+            <a:lvl9pPr marL="3886200" indent="-228600" eaLnBrk="0" fontAlgn="base" hangingPunct="0">
+              <a:spcBef>
+                <a:spcPct val="0"/>
+              </a:spcBef>
+              <a:spcAft>
+                <a:spcPct val="0"/>
+              </a:spcAft>
+              <a:defRPr sz="1200">
+                <a:solidFill>
+                  <a:schemeClr val="tx1"/>
+                </a:solidFill>
+                <a:latin typeface="Arial" charset="0"/>
+              </a:defRPr>
+            </a:lvl9pPr>
+          </a:lstStyle>
+          <a:p>
+            <a:pPr eaLnBrk="1" hangingPunct="1"/>
+            <a:r>
+              <a:rPr lang="en-US" altLang="en-US" sz="1000" smtClean="0">
+                <a:solidFill>
+                  <a:srgbClr val="000000"/>
+                </a:solidFill>
+              </a:rPr>
+              <a:t>Copyright © 2013 Elsevier Inc. All rights reserved.</a:t>
+            </a:r>
           </a:p>
         </p:txBody>
       </p:sp>
       <p:pic>
         <p:nvPicPr>
-          <p:cNvPr id="3074" name="Picture 2" descr="P1.0-2 Multiplexing Control Bits / Signals"/>
+          <p:cNvPr id="25603" name="Picture 2"/>
           <p:cNvPicPr>
-            <a:picLocks noChangeAspect="1" noChangeArrowheads="1"/>
+            <a:picLocks noChangeAspect="1"/>
           </p:cNvPicPr>
           <p:nvPr/>
         </p:nvPicPr>
@@ -5800,13 +6242,16 @@
         </p:blipFill>
         <p:spPr bwMode="auto">
           <a:xfrm>
-            <a:off x="1183264" y="119695"/>
-            <a:ext cx="6753225" cy="4848225"/>
+            <a:off x="1417638" y="1638300"/>
+            <a:ext cx="6486525" cy="3581400"/>
           </a:xfrm>
           <a:prstGeom prst="rect">
             <a:avLst/>
           </a:prstGeom>
           <a:noFill/>
+          <a:ln>
+            <a:noFill/>
+          </a:ln>
           <a:extLst>
             <a:ext uri="{909E8E84-426E-40DD-AFC4-6F175D3DCCD1}">
               <a14:hiddenFill xmlns:a14="http://schemas.microsoft.com/office/drawing/2010/main">
@@ -5814,14 +6259,363 @@
                   <a:srgbClr val="FFFFFF"/>
                 </a:solidFill>
               </a14:hiddenFill>
+            </a:ext>
+            <a:ext uri="{91240B29-F687-4F45-9708-019B960494DF}">
+              <a14:hiddenLine xmlns:a14="http://schemas.microsoft.com/office/drawing/2010/main" w="9525">
+                <a:solidFill>
+                  <a:srgbClr val="000000"/>
+                </a:solidFill>
+                <a:miter lim="800000"/>
+                <a:headEnd/>
+                <a:tailEnd/>
+              </a14:hiddenLine>
             </a:ext>
           </a:extLst>
         </p:spPr>
       </p:pic>
+      <p:sp>
+        <p:nvSpPr>
+          <p:cNvPr id="25604" name="Rectangle 1"/>
+          <p:cNvSpPr>
+            <a:spLocks noChangeArrowheads="1"/>
+          </p:cNvSpPr>
+          <p:nvPr/>
+        </p:nvSpPr>
+        <p:spPr bwMode="auto">
+          <a:xfrm>
+            <a:off x="762000" y="5562600"/>
+            <a:ext cx="3325813" cy="276225"/>
+          </a:xfrm>
+          <a:prstGeom prst="rect">
+            <a:avLst/>
+          </a:prstGeom>
+          <a:noFill/>
+          <a:ln>
+            <a:noFill/>
+          </a:ln>
+          <a:extLst>
+            <a:ext uri="{909E8E84-426E-40DD-AFC4-6F175D3DCCD1}">
+              <a14:hiddenFill xmlns:a14="http://schemas.microsoft.com/office/drawing/2010/main">
+                <a:solidFill>
+                  <a:srgbClr val="FFFFFF"/>
+                </a:solidFill>
+              </a14:hiddenFill>
+            </a:ext>
+            <a:ext uri="{91240B29-F687-4F45-9708-019B960494DF}">
+              <a14:hiddenLine xmlns:a14="http://schemas.microsoft.com/office/drawing/2010/main" w="9525">
+                <a:solidFill>
+                  <a:srgbClr val="000000"/>
+                </a:solidFill>
+                <a:miter lim="800000"/>
+                <a:headEnd/>
+                <a:tailEnd/>
+              </a14:hiddenLine>
+            </a:ext>
+          </a:extLst>
+        </p:spPr>
+        <p:txBody>
+          <a:bodyPr wrap="none">
+            <a:spAutoFit/>
+          </a:bodyPr>
+          <a:lstStyle>
+            <a:lvl1pPr eaLnBrk="0" hangingPunct="0">
+              <a:defRPr sz="1200">
+                <a:solidFill>
+                  <a:schemeClr val="tx1"/>
+                </a:solidFill>
+                <a:latin typeface="Arial" charset="0"/>
+              </a:defRPr>
+            </a:lvl1pPr>
+            <a:lvl2pPr marL="742950" indent="-285750" eaLnBrk="0" hangingPunct="0">
+              <a:defRPr sz="1200">
+                <a:solidFill>
+                  <a:schemeClr val="tx1"/>
+                </a:solidFill>
+                <a:latin typeface="Arial" charset="0"/>
+              </a:defRPr>
+            </a:lvl2pPr>
+            <a:lvl3pPr marL="1143000" indent="-228600" eaLnBrk="0" hangingPunct="0">
+              <a:defRPr sz="1200">
+                <a:solidFill>
+                  <a:schemeClr val="tx1"/>
+                </a:solidFill>
+                <a:latin typeface="Arial" charset="0"/>
+              </a:defRPr>
+            </a:lvl3pPr>
+            <a:lvl4pPr marL="1600200" indent="-228600" eaLnBrk="0" hangingPunct="0">
+              <a:defRPr sz="1200">
+                <a:solidFill>
+                  <a:schemeClr val="tx1"/>
+                </a:solidFill>
+                <a:latin typeface="Arial" charset="0"/>
+              </a:defRPr>
+            </a:lvl4pPr>
+            <a:lvl5pPr marL="2057400" indent="-228600" eaLnBrk="0" hangingPunct="0">
+              <a:defRPr sz="1200">
+                <a:solidFill>
+                  <a:schemeClr val="tx1"/>
+                </a:solidFill>
+                <a:latin typeface="Arial" charset="0"/>
+              </a:defRPr>
+            </a:lvl5pPr>
+            <a:lvl6pPr marL="2514600" indent="-228600" eaLnBrk="0" fontAlgn="base" hangingPunct="0">
+              <a:spcBef>
+                <a:spcPct val="0"/>
+              </a:spcBef>
+              <a:spcAft>
+                <a:spcPct val="0"/>
+              </a:spcAft>
+              <a:defRPr sz="1200">
+                <a:solidFill>
+                  <a:schemeClr val="tx1"/>
+                </a:solidFill>
+                <a:latin typeface="Arial" charset="0"/>
+              </a:defRPr>
+            </a:lvl6pPr>
+            <a:lvl7pPr marL="2971800" indent="-228600" eaLnBrk="0" fontAlgn="base" hangingPunct="0">
+              <a:spcBef>
+                <a:spcPct val="0"/>
+              </a:spcBef>
+              <a:spcAft>
+                <a:spcPct val="0"/>
+              </a:spcAft>
+              <a:defRPr sz="1200">
+                <a:solidFill>
+                  <a:schemeClr val="tx1"/>
+                </a:solidFill>
+                <a:latin typeface="Arial" charset="0"/>
+              </a:defRPr>
+            </a:lvl7pPr>
+            <a:lvl8pPr marL="3429000" indent="-228600" eaLnBrk="0" fontAlgn="base" hangingPunct="0">
+              <a:spcBef>
+                <a:spcPct val="0"/>
+              </a:spcBef>
+              <a:spcAft>
+                <a:spcPct val="0"/>
+              </a:spcAft>
+              <a:defRPr sz="1200">
+                <a:solidFill>
+                  <a:schemeClr val="tx1"/>
+                </a:solidFill>
+                <a:latin typeface="Arial" charset="0"/>
+              </a:defRPr>
+            </a:lvl8pPr>
+            <a:lvl9pPr marL="3886200" indent="-228600" eaLnBrk="0" fontAlgn="base" hangingPunct="0">
+              <a:spcBef>
+                <a:spcPct val="0"/>
+              </a:spcBef>
+              <a:spcAft>
+                <a:spcPct val="0"/>
+              </a:spcAft>
+              <a:defRPr sz="1200">
+                <a:solidFill>
+                  <a:schemeClr val="tx1"/>
+                </a:solidFill>
+                <a:latin typeface="Arial" charset="0"/>
+              </a:defRPr>
+            </a:lvl9pPr>
+          </a:lstStyle>
+          <a:p>
+            <a:pPr eaLnBrk="1" hangingPunct="1"/>
+            <a:r>
+              <a:rPr lang="en-US" altLang="en-US" b="1"/>
+              <a:t>Figure 1.23 Logic levels and noise margins</a:t>
+            </a:r>
+            <a:endParaRPr lang="en-US" altLang="en-US"/>
+          </a:p>
+        </p:txBody>
+      </p:sp>
+      <p:sp>
+        <p:nvSpPr>
+          <p:cNvPr id="5" name="Title 1"/>
+          <p:cNvSpPr txBox="1">
+            <a:spLocks/>
+          </p:cNvSpPr>
+          <p:nvPr/>
+        </p:nvSpPr>
+        <p:spPr>
+          <a:xfrm>
+            <a:off x="245533" y="76200"/>
+            <a:ext cx="8447617" cy="1143000"/>
+          </a:xfrm>
+          <a:prstGeom prst="rect">
+            <a:avLst/>
+          </a:prstGeom>
+        </p:spPr>
+        <p:txBody>
+          <a:bodyPr/>
+          <a:lstStyle>
+            <a:lvl1pPr algn="r" rtl="0" eaLnBrk="0" fontAlgn="base" hangingPunct="0">
+              <a:spcBef>
+                <a:spcPct val="0"/>
+              </a:spcBef>
+              <a:spcAft>
+                <a:spcPct val="0"/>
+              </a:spcAft>
+              <a:defRPr sz="3600" b="1">
+                <a:solidFill>
+                  <a:srgbClr val="0C2D83"/>
+                </a:solidFill>
+                <a:latin typeface="+mj-lt"/>
+                <a:ea typeface="+mj-ea"/>
+                <a:cs typeface="+mj-cs"/>
+              </a:defRPr>
+            </a:lvl1pPr>
+            <a:lvl2pPr algn="r" rtl="0" eaLnBrk="0" fontAlgn="base" hangingPunct="0">
+              <a:spcBef>
+                <a:spcPct val="0"/>
+              </a:spcBef>
+              <a:spcAft>
+                <a:spcPct val="0"/>
+              </a:spcAft>
+              <a:defRPr sz="3600" b="1">
+                <a:solidFill>
+                  <a:srgbClr val="0C2D83"/>
+                </a:solidFill>
+                <a:latin typeface="Arial" pitchFamily="34" charset="0"/>
+              </a:defRPr>
+            </a:lvl2pPr>
+            <a:lvl3pPr algn="r" rtl="0" eaLnBrk="0" fontAlgn="base" hangingPunct="0">
+              <a:spcBef>
+                <a:spcPct val="0"/>
+              </a:spcBef>
+              <a:spcAft>
+                <a:spcPct val="0"/>
+              </a:spcAft>
+              <a:defRPr sz="3600" b="1">
+                <a:solidFill>
+                  <a:srgbClr val="0C2D83"/>
+                </a:solidFill>
+                <a:latin typeface="Arial" pitchFamily="34" charset="0"/>
+              </a:defRPr>
+            </a:lvl3pPr>
+            <a:lvl4pPr algn="r" rtl="0" eaLnBrk="0" fontAlgn="base" hangingPunct="0">
+              <a:spcBef>
+                <a:spcPct val="0"/>
+              </a:spcBef>
+              <a:spcAft>
+                <a:spcPct val="0"/>
+              </a:spcAft>
+              <a:defRPr sz="3600" b="1">
+                <a:solidFill>
+                  <a:srgbClr val="0C2D83"/>
+                </a:solidFill>
+                <a:latin typeface="Arial" pitchFamily="34" charset="0"/>
+              </a:defRPr>
+            </a:lvl4pPr>
+            <a:lvl5pPr algn="r" rtl="0" eaLnBrk="0" fontAlgn="base" hangingPunct="0">
+              <a:spcBef>
+                <a:spcPct val="0"/>
+              </a:spcBef>
+              <a:spcAft>
+                <a:spcPct val="0"/>
+              </a:spcAft>
+              <a:defRPr sz="3600" b="1">
+                <a:solidFill>
+                  <a:srgbClr val="0C2D83"/>
+                </a:solidFill>
+                <a:latin typeface="Arial" pitchFamily="34" charset="0"/>
+              </a:defRPr>
+            </a:lvl5pPr>
+            <a:lvl6pPr marL="457200" algn="r" rtl="0" eaLnBrk="0" fontAlgn="base" hangingPunct="0">
+              <a:spcBef>
+                <a:spcPct val="0"/>
+              </a:spcBef>
+              <a:spcAft>
+                <a:spcPct val="0"/>
+              </a:spcAft>
+              <a:defRPr sz="3600" b="1">
+                <a:solidFill>
+                  <a:srgbClr val="0C2D83"/>
+                </a:solidFill>
+                <a:latin typeface="Arial" pitchFamily="34" charset="0"/>
+              </a:defRPr>
+            </a:lvl6pPr>
+            <a:lvl7pPr marL="914400" algn="r" rtl="0" eaLnBrk="0" fontAlgn="base" hangingPunct="0">
+              <a:spcBef>
+                <a:spcPct val="0"/>
+              </a:spcBef>
+              <a:spcAft>
+                <a:spcPct val="0"/>
+              </a:spcAft>
+              <a:defRPr sz="3600" b="1">
+                <a:solidFill>
+                  <a:srgbClr val="0C2D83"/>
+                </a:solidFill>
+                <a:latin typeface="Arial" pitchFamily="34" charset="0"/>
+              </a:defRPr>
+            </a:lvl7pPr>
+            <a:lvl8pPr marL="1371600" algn="r" rtl="0" eaLnBrk="0" fontAlgn="base" hangingPunct="0">
+              <a:spcBef>
+                <a:spcPct val="0"/>
+              </a:spcBef>
+              <a:spcAft>
+                <a:spcPct val="0"/>
+              </a:spcAft>
+              <a:defRPr sz="3600" b="1">
+                <a:solidFill>
+                  <a:srgbClr val="0C2D83"/>
+                </a:solidFill>
+                <a:latin typeface="Arial" pitchFamily="34" charset="0"/>
+              </a:defRPr>
+            </a:lvl8pPr>
+            <a:lvl9pPr marL="1828800" algn="r" rtl="0" eaLnBrk="0" fontAlgn="base" hangingPunct="0">
+              <a:spcBef>
+                <a:spcPct val="0"/>
+              </a:spcBef>
+              <a:spcAft>
+                <a:spcPct val="0"/>
+              </a:spcAft>
+              <a:defRPr sz="3600" b="1">
+                <a:solidFill>
+                  <a:srgbClr val="0C2D83"/>
+                </a:solidFill>
+                <a:latin typeface="Arial" pitchFamily="34" charset="0"/>
+              </a:defRPr>
+            </a:lvl9pPr>
+          </a:lstStyle>
+          <a:p>
+            <a:r>
+              <a:rPr lang="en-US" kern="0" dirty="0" smtClean="0"/>
+              <a:t>Why Pullup and Pulldown Resistors are needed</a:t>
+            </a:r>
+            <a:endParaRPr lang="en-US" kern="0" dirty="0"/>
+          </a:p>
+        </p:txBody>
+      </p:sp>
+      <p:sp>
+        <p:nvSpPr>
+          <p:cNvPr id="2" name="Rectangle 1"/>
+          <p:cNvSpPr/>
+          <p:nvPr/>
+        </p:nvSpPr>
+        <p:spPr>
+          <a:xfrm>
+            <a:off x="2232991" y="979666"/>
+            <a:ext cx="4663456" cy="461665"/>
+          </a:xfrm>
+          <a:prstGeom prst="rect">
+            <a:avLst/>
+          </a:prstGeom>
+        </p:spPr>
+        <p:txBody>
+          <a:bodyPr wrap="none">
+            <a:spAutoFit/>
+          </a:bodyPr>
+          <a:lstStyle/>
+          <a:p>
+            <a:r>
+              <a:rPr lang="en-US" b="1" kern="0" dirty="0"/>
+              <a:t>Voltage Levels and Noise Margins</a:t>
+            </a:r>
+            <a:endParaRPr lang="en-US" b="1" dirty="0"/>
+          </a:p>
+        </p:txBody>
+      </p:sp>
     </p:spTree>
     <p:extLst>
       <p:ext uri="{BB962C8B-B14F-4D97-AF65-F5344CB8AC3E}">
-        <p14:creationId xmlns:p14="http://schemas.microsoft.com/office/powerpoint/2010/main" val="307478788"/>
+        <p14:creationId xmlns:p14="http://schemas.microsoft.com/office/powerpoint/2010/main" val="3575718804"/>
       </p:ext>
     </p:extLst>
   </p:cSld>
@@ -5871,6 +6665,304 @@
           <a:lstStyle/>
           <a:p>
             <a:r>
+              <a:rPr lang="en-US" b="1" dirty="0" smtClean="0"/>
+              <a:t>Pitfall !!!</a:t>
+            </a:r>
+            <a:endParaRPr lang="en-US" dirty="0"/>
+          </a:p>
+        </p:txBody>
+      </p:sp>
+      <p:sp>
+        <p:nvSpPr>
+          <p:cNvPr id="3" name="Content Placeholder 2"/>
+          <p:cNvSpPr>
+            <a:spLocks noGrp="1"/>
+          </p:cNvSpPr>
+          <p:nvPr>
+            <p:ph idx="1"/>
+          </p:nvPr>
+        </p:nvSpPr>
+        <p:spPr>
+          <a:xfrm>
+            <a:off x="395177" y="669852"/>
+            <a:ext cx="8493642" cy="4724400"/>
+          </a:xfrm>
+        </p:spPr>
+        <p:txBody>
+          <a:bodyPr/>
+          <a:lstStyle/>
+          <a:p>
+            <a:endParaRPr lang="en-US" sz="2000" dirty="0" smtClean="0">
+              <a:solidFill>
+                <a:schemeClr val="accent2"/>
+              </a:solidFill>
+            </a:endParaRPr>
+          </a:p>
+          <a:p>
+            <a:endParaRPr lang="en-US" sz="2000" dirty="0" smtClean="0">
+              <a:solidFill>
+                <a:schemeClr val="accent2"/>
+              </a:solidFill>
+            </a:endParaRPr>
+          </a:p>
+          <a:p>
+            <a:r>
+              <a:rPr lang="en-US" sz="2000" dirty="0" smtClean="0">
+                <a:solidFill>
+                  <a:schemeClr val="accent2"/>
+                </a:solidFill>
+              </a:rPr>
+              <a:t>Anything wrong with this?</a:t>
+            </a:r>
+          </a:p>
+          <a:p>
+            <a:endParaRPr lang="en-US" sz="2000" dirty="0" smtClean="0">
+              <a:solidFill>
+                <a:schemeClr val="accent2"/>
+              </a:solidFill>
+            </a:endParaRPr>
+          </a:p>
+          <a:p>
+            <a:pPr lvl="1"/>
+            <a:r>
+              <a:rPr lang="en-US" sz="1600" dirty="0" err="1" smtClean="0">
+                <a:latin typeface="Courier New" pitchFamily="49" charset="0"/>
+                <a:cs typeface="Courier New" pitchFamily="49" charset="0"/>
+              </a:rPr>
+              <a:t>mov.b</a:t>
+            </a:r>
+            <a:r>
+              <a:rPr lang="en-US" sz="1600" dirty="0" smtClean="0">
+                <a:latin typeface="Courier New" pitchFamily="49" charset="0"/>
+                <a:cs typeface="Courier New" pitchFamily="49" charset="0"/>
+              </a:rPr>
+              <a:t>  #0xff, P1DIR</a:t>
+            </a:r>
+            <a:endParaRPr lang="en-US" sz="1600" dirty="0"/>
+          </a:p>
+          <a:p>
+            <a:endParaRPr lang="en-US" sz="2000" dirty="0" smtClean="0">
+              <a:solidFill>
+                <a:schemeClr val="accent2"/>
+              </a:solidFill>
+            </a:endParaRPr>
+          </a:p>
+          <a:p>
+            <a:r>
+              <a:rPr lang="en-US" sz="2000" dirty="0" smtClean="0">
+                <a:solidFill>
+                  <a:schemeClr val="accent2"/>
+                </a:solidFill>
+              </a:rPr>
+              <a:t>What do these commands do?</a:t>
+            </a:r>
+            <a:endParaRPr lang="en-US" sz="2000" dirty="0">
+              <a:solidFill>
+                <a:schemeClr val="accent2"/>
+              </a:solidFill>
+            </a:endParaRPr>
+          </a:p>
+          <a:p>
+            <a:pPr lvl="1"/>
+            <a:r>
+              <a:rPr lang="en-US" sz="1600" dirty="0" err="1" smtClean="0">
+                <a:latin typeface="Courier New" pitchFamily="49" charset="0"/>
+                <a:cs typeface="Courier New" pitchFamily="49" charset="0"/>
+              </a:rPr>
+              <a:t>mov.b</a:t>
+            </a:r>
+            <a:r>
+              <a:rPr lang="en-US" sz="1600" dirty="0" smtClean="0">
+                <a:latin typeface="Courier New" pitchFamily="49" charset="0"/>
+                <a:cs typeface="Courier New" pitchFamily="49" charset="0"/>
+              </a:rPr>
+              <a:t>  </a:t>
+            </a:r>
+            <a:r>
+              <a:rPr lang="en-US" sz="1600" dirty="0">
+                <a:latin typeface="Courier New" pitchFamily="49" charset="0"/>
+                <a:cs typeface="Courier New" pitchFamily="49" charset="0"/>
+              </a:rPr>
+              <a:t>#</a:t>
+            </a:r>
+            <a:r>
+              <a:rPr lang="en-US" sz="1600" dirty="0" smtClean="0">
+                <a:latin typeface="Courier New" pitchFamily="49" charset="0"/>
+                <a:cs typeface="Courier New" pitchFamily="49" charset="0"/>
+              </a:rPr>
+              <a:t>0b00001111, &amp;P1DIR</a:t>
+            </a:r>
+          </a:p>
+          <a:p>
+            <a:pPr lvl="1"/>
+            <a:r>
+              <a:rPr lang="en-US" sz="1600" dirty="0" err="1" smtClean="0">
+                <a:latin typeface="Courier New" pitchFamily="49" charset="0"/>
+                <a:cs typeface="Courier New" pitchFamily="49" charset="0"/>
+              </a:rPr>
+              <a:t>bis.b</a:t>
+            </a:r>
+            <a:r>
+              <a:rPr lang="en-US" sz="1600" dirty="0" smtClean="0">
+                <a:latin typeface="Courier New" pitchFamily="49" charset="0"/>
+                <a:cs typeface="Courier New" pitchFamily="49" charset="0"/>
+              </a:rPr>
+              <a:t>  </a:t>
+            </a:r>
+            <a:r>
+              <a:rPr lang="en-US" sz="1600" dirty="0">
+                <a:latin typeface="Courier New" pitchFamily="49" charset="0"/>
+                <a:cs typeface="Courier New" pitchFamily="49" charset="0"/>
+              </a:rPr>
+              <a:t>#0b00001111, &amp;</a:t>
+            </a:r>
+            <a:r>
+              <a:rPr lang="en-US" sz="1600" dirty="0" smtClean="0">
+                <a:latin typeface="Courier New" pitchFamily="49" charset="0"/>
+                <a:cs typeface="Courier New" pitchFamily="49" charset="0"/>
+              </a:rPr>
+              <a:t>P1OUT</a:t>
+            </a:r>
+          </a:p>
+          <a:p>
+            <a:pPr lvl="1"/>
+            <a:r>
+              <a:rPr lang="en-US" sz="1600" dirty="0" err="1" smtClean="0">
+                <a:latin typeface="Courier New" pitchFamily="49" charset="0"/>
+                <a:cs typeface="Courier New" pitchFamily="49" charset="0"/>
+              </a:rPr>
+              <a:t>mov.b</a:t>
+            </a:r>
+            <a:r>
+              <a:rPr lang="en-US" sz="1600" dirty="0" smtClean="0">
+                <a:latin typeface="Courier New" pitchFamily="49" charset="0"/>
+                <a:cs typeface="Courier New" pitchFamily="49" charset="0"/>
+              </a:rPr>
+              <a:t>  #0xff, </a:t>
+            </a:r>
+            <a:r>
+              <a:rPr lang="en-US" sz="1600" dirty="0">
+                <a:latin typeface="Courier New" pitchFamily="49" charset="0"/>
+                <a:cs typeface="Courier New" pitchFamily="49" charset="0"/>
+              </a:rPr>
+              <a:t>&amp;</a:t>
+            </a:r>
+            <a:r>
+              <a:rPr lang="en-US" sz="1600" dirty="0" smtClean="0">
+                <a:latin typeface="Courier New" pitchFamily="49" charset="0"/>
+                <a:cs typeface="Courier New" pitchFamily="49" charset="0"/>
+              </a:rPr>
+              <a:t>P1OUT</a:t>
+            </a:r>
+          </a:p>
+          <a:p>
+            <a:pPr lvl="1"/>
+            <a:r>
+              <a:rPr lang="en-US" sz="1600" dirty="0" err="1" smtClean="0">
+                <a:latin typeface="Courier New" pitchFamily="49" charset="0"/>
+                <a:cs typeface="Courier New" pitchFamily="49" charset="0"/>
+              </a:rPr>
+              <a:t>mov.b</a:t>
+            </a:r>
+            <a:r>
+              <a:rPr lang="en-US" sz="1600" dirty="0" smtClean="0">
+                <a:latin typeface="Courier New" pitchFamily="49" charset="0"/>
+                <a:cs typeface="Courier New" pitchFamily="49" charset="0"/>
+              </a:rPr>
+              <a:t>  &amp;P1IN, r5 </a:t>
+            </a:r>
+            <a:endParaRPr lang="en-US" sz="1600" dirty="0">
+              <a:latin typeface="Courier New" pitchFamily="49" charset="0"/>
+              <a:cs typeface="Courier New" pitchFamily="49" charset="0"/>
+            </a:endParaRPr>
+          </a:p>
+          <a:p>
+            <a:pPr lvl="1"/>
+            <a:endParaRPr lang="en-US" sz="1600" dirty="0"/>
+          </a:p>
+          <a:p>
+            <a:endParaRPr lang="en-US" sz="2000" dirty="0">
+              <a:solidFill>
+                <a:schemeClr val="accent2"/>
+              </a:solidFill>
+            </a:endParaRPr>
+          </a:p>
+          <a:p>
+            <a:pPr lvl="1"/>
+            <a:endParaRPr lang="en-US" sz="2000" dirty="0" smtClean="0"/>
+          </a:p>
+          <a:p>
+            <a:endParaRPr lang="en-US" sz="2000" dirty="0">
+              <a:solidFill>
+                <a:schemeClr val="accent2"/>
+              </a:solidFill>
+            </a:endParaRPr>
+          </a:p>
+          <a:p>
+            <a:endParaRPr lang="en-US" sz="2000" dirty="0" smtClean="0">
+              <a:solidFill>
+                <a:schemeClr val="accent2"/>
+              </a:solidFill>
+            </a:endParaRPr>
+          </a:p>
+          <a:p>
+            <a:endParaRPr lang="en-US" sz="2000" dirty="0"/>
+          </a:p>
+        </p:txBody>
+      </p:sp>
+    </p:spTree>
+    <p:extLst>
+      <p:ext uri="{BB962C8B-B14F-4D97-AF65-F5344CB8AC3E}">
+        <p14:creationId xmlns:p14="http://schemas.microsoft.com/office/powerpoint/2010/main" val="45763967"/>
+      </p:ext>
+    </p:extLst>
+  </p:cSld>
+  <p:clrMapOvr>
+    <a:masterClrMapping/>
+  </p:clrMapOvr>
+  <p:timing>
+    <p:tnLst>
+      <p:par>
+        <p:cTn id="1" dur="indefinite" restart="never" nodeType="tmRoot"/>
+      </p:par>
+    </p:tnLst>
+  </p:timing>
+</p:sld>
+</file>
+
+<file path=ppt/slides/slide15.xml><?xml version="1.0" encoding="utf-8"?>
+<p:sld xmlns:a="http://schemas.openxmlformats.org/drawingml/2006/main" xmlns:r="http://schemas.openxmlformats.org/officeDocument/2006/relationships" xmlns:p="http://schemas.openxmlformats.org/presentationml/2006/main">
+  <p:cSld>
+    <p:spTree>
+      <p:nvGrpSpPr>
+        <p:cNvPr id="1" name=""/>
+        <p:cNvGrpSpPr/>
+        <p:nvPr/>
+      </p:nvGrpSpPr>
+      <p:grpSpPr>
+        <a:xfrm>
+          <a:off x="0" y="0"/>
+          <a:ext cx="0" cy="0"/>
+          <a:chOff x="0" y="0"/>
+          <a:chExt cx="0" cy="0"/>
+        </a:xfrm>
+      </p:grpSpPr>
+      <p:sp>
+        <p:nvSpPr>
+          <p:cNvPr id="2" name="Title 1"/>
+          <p:cNvSpPr>
+            <a:spLocks noGrp="1"/>
+          </p:cNvSpPr>
+          <p:nvPr>
+            <p:ph type="title"/>
+          </p:nvPr>
+        </p:nvSpPr>
+        <p:spPr/>
+        <p:txBody>
+          <a:bodyPr/>
+          <a:lstStyle/>
+          <a:p>
+            <a:r>
               <a:rPr lang="en-US" b="1" dirty="0" err="1" smtClean="0"/>
               <a:t>Inclass</a:t>
             </a:r>
@@ -6587,6 +7679,13 @@
   <p:clrMapOvr>
     <a:masterClrMapping/>
   </p:clrMapOvr>
+  <p:timing>
+    <p:tnLst>
+      <p:par>
+        <p:cTn id="1" dur="indefinite" restart="never" nodeType="tmRoot"/>
+      </p:par>
+    </p:tnLst>
+  </p:timing>
 </p:sld>
 </file>
 
@@ -7629,7 +8728,7 @@
           <a:p>
             <a:r>
               <a:rPr lang="en-US" b="1" dirty="0" smtClean="0"/>
-              <a:t>How do we talk to Ports? Do I/O?</a:t>
+              <a:t>Multiplexing</a:t>
             </a:r>
             <a:endParaRPr lang="en-US" dirty="0"/>
           </a:p>
@@ -7661,8 +8760,31 @@
                   <a:schemeClr val="accent2"/>
                 </a:solidFill>
               </a:rPr>
-              <a:t>Two classic methods</a:t>
-            </a:r>
+              <a:t>Only 20 Pins !!! But want access to many more signals</a:t>
+            </a:r>
+          </a:p>
+          <a:p>
+            <a:pPr lvl="1"/>
+            <a:r>
+              <a:rPr lang="en-US" sz="1600" dirty="0" smtClean="0"/>
+              <a:t>Therefore, each pin shares several signals </a:t>
+            </a:r>
+            <a:r>
+              <a:rPr lang="en-US" sz="1600" dirty="0" smtClean="0">
+                <a:sym typeface="Wingdings" pitchFamily="2" charset="2"/>
+              </a:rPr>
+              <a:t> multiplexing</a:t>
+            </a:r>
+            <a:endParaRPr lang="en-US" sz="1600" dirty="0" smtClean="0"/>
+          </a:p>
+          <a:p>
+            <a:endParaRPr lang="en-US" sz="2000" dirty="0" smtClean="0">
+              <a:solidFill>
+                <a:schemeClr val="accent2"/>
+              </a:solidFill>
+            </a:endParaRPr>
+          </a:p>
+          <a:p>
             <a:endParaRPr lang="en-US" sz="2000" dirty="0">
               <a:solidFill>
                 <a:schemeClr val="accent2"/>
@@ -7670,29 +8792,6 @@
             </a:endParaRPr>
           </a:p>
           <a:p>
-            <a:pPr lvl="1"/>
-            <a:r>
-              <a:rPr lang="en-US" sz="2000" dirty="0" smtClean="0"/>
-              <a:t>Memory-Mapped I/O                        (Motorola)</a:t>
-            </a:r>
-          </a:p>
-          <a:p>
-            <a:pPr lvl="1"/>
-            <a:r>
-              <a:rPr lang="en-US" sz="2000" dirty="0" smtClean="0"/>
-              <a:t>Port-Mapped I/O [or Isolated IO]     (Intel)</a:t>
-            </a:r>
-            <a:endParaRPr lang="en-US" sz="1800" dirty="0" smtClean="0"/>
-          </a:p>
-          <a:p>
-            <a:r>
-              <a:rPr lang="en-US" sz="2000" dirty="0">
-                <a:solidFill>
-                  <a:schemeClr val="accent2"/>
-                </a:solidFill>
-              </a:rPr>
-              <a:t>Memory-Mapped I/O </a:t>
-            </a:r>
             <a:endParaRPr lang="en-US" sz="2000" dirty="0" smtClean="0">
               <a:solidFill>
                 <a:schemeClr val="accent2"/>
@@ -7700,152 +8799,73 @@
             </a:endParaRPr>
           </a:p>
           <a:p>
-            <a:pPr lvl="1"/>
-            <a:r>
-              <a:rPr lang="en-US" sz="2000" dirty="0" smtClean="0"/>
-              <a:t>I/O and memory SHARE the same address space</a:t>
-            </a:r>
-          </a:p>
-          <a:p>
-            <a:pPr lvl="1"/>
-            <a:r>
-              <a:rPr lang="en-US" sz="2000" dirty="0" smtClean="0"/>
-              <a:t>Advantage</a:t>
-            </a:r>
-          </a:p>
-          <a:p>
-            <a:pPr lvl="2"/>
-            <a:r>
-              <a:rPr lang="en-US" sz="1800" dirty="0" smtClean="0"/>
-              <a:t>Fewer </a:t>
-            </a:r>
-            <a:r>
-              <a:rPr lang="en-US" sz="1800" dirty="0"/>
-              <a:t>instructions</a:t>
-            </a:r>
-          </a:p>
-          <a:p>
-            <a:pPr lvl="2"/>
-            <a:r>
-              <a:rPr lang="en-US" sz="1800" dirty="0" smtClean="0"/>
-              <a:t>Can </a:t>
-            </a:r>
-            <a:r>
-              <a:rPr lang="en-US" sz="1800" dirty="0"/>
-              <a:t>use </a:t>
-            </a:r>
-            <a:r>
-              <a:rPr lang="en-US" sz="1800" dirty="0" smtClean="0"/>
-              <a:t>all addressing modes</a:t>
-            </a:r>
-          </a:p>
-          <a:p>
-            <a:pPr lvl="1"/>
-            <a:r>
-              <a:rPr lang="en-US" sz="2200" dirty="0" smtClean="0"/>
-              <a:t>Disadvantage</a:t>
-            </a:r>
-          </a:p>
-          <a:p>
-            <a:pPr lvl="2"/>
-            <a:r>
-              <a:rPr lang="en-US" sz="1800" dirty="0" smtClean="0"/>
-              <a:t>Lose </a:t>
-            </a:r>
-            <a:r>
-              <a:rPr lang="en-US" sz="1800" dirty="0"/>
-              <a:t>memory to </a:t>
-            </a:r>
-            <a:r>
-              <a:rPr lang="en-US" sz="1800" dirty="0" smtClean="0"/>
-              <a:t>IO</a:t>
-            </a:r>
-          </a:p>
-          <a:p>
-            <a:pPr lvl="2"/>
-            <a:r>
-              <a:rPr lang="en-US" sz="1800" dirty="0" smtClean="0"/>
-              <a:t>Programmer mistakes</a:t>
-            </a:r>
-          </a:p>
-          <a:p>
-            <a:pPr lvl="1"/>
-            <a:r>
-              <a:rPr lang="en-US" sz="2200" dirty="0" smtClean="0"/>
-              <a:t>How to use</a:t>
-            </a:r>
-          </a:p>
-          <a:p>
-            <a:pPr lvl="2"/>
-            <a:r>
-              <a:rPr lang="en-US" sz="1800" dirty="0" err="1" smtClean="0"/>
-              <a:t>Mov</a:t>
-            </a:r>
-            <a:r>
-              <a:rPr lang="en-US" sz="1800" dirty="0" smtClean="0"/>
-              <a:t> #0x55, &amp;P1OUT</a:t>
-            </a:r>
-          </a:p>
-          <a:p>
-            <a:pPr lvl="2"/>
-            <a:r>
-              <a:rPr lang="en-US" sz="1800" dirty="0" err="1"/>
-              <a:t>Mov</a:t>
-            </a:r>
-            <a:r>
-              <a:rPr lang="en-US" sz="1800" dirty="0"/>
-              <a:t> #0x55, </a:t>
-            </a:r>
-            <a:r>
-              <a:rPr lang="en-US" sz="1800" dirty="0" smtClean="0"/>
-              <a:t>&amp;0x0021</a:t>
-            </a:r>
-          </a:p>
-          <a:p>
-            <a:pPr lvl="1"/>
-            <a:r>
-              <a:rPr lang="en-US" sz="2200" dirty="0" smtClean="0">
-                <a:solidFill>
-                  <a:schemeClr val="accent2"/>
-                </a:solidFill>
-              </a:rPr>
-              <a:t>User’s Guide p 333, Table 8-2 (BB pp 41)</a:t>
-            </a:r>
-          </a:p>
-          <a:p>
-            <a:pPr lvl="1"/>
-            <a:r>
-              <a:rPr lang="en-US" sz="2200" dirty="0" smtClean="0">
-                <a:solidFill>
-                  <a:schemeClr val="accent2"/>
-                </a:solidFill>
-              </a:rPr>
-              <a:t>Watchdog Timer, page 341 (BB pp 42)</a:t>
-            </a:r>
-          </a:p>
-          <a:p>
-            <a:pPr lvl="1"/>
-            <a:endParaRPr lang="en-US" sz="2200" dirty="0"/>
-          </a:p>
-          <a:p>
             <a:endParaRPr lang="en-US" sz="2000" dirty="0">
               <a:solidFill>
                 <a:schemeClr val="accent2"/>
               </a:solidFill>
             </a:endParaRPr>
           </a:p>
+          <a:p>
+            <a:endParaRPr lang="en-US" sz="2000" dirty="0" smtClean="0">
+              <a:solidFill>
+                <a:schemeClr val="accent2"/>
+              </a:solidFill>
+            </a:endParaRPr>
+          </a:p>
+          <a:p>
+            <a:endParaRPr lang="en-US" sz="2000" dirty="0" smtClean="0">
+              <a:solidFill>
+                <a:schemeClr val="accent2"/>
+              </a:solidFill>
+            </a:endParaRPr>
+          </a:p>
+          <a:p>
+            <a:endParaRPr lang="en-US" sz="2000" dirty="0">
+              <a:solidFill>
+                <a:schemeClr val="accent2"/>
+              </a:solidFill>
+            </a:endParaRPr>
+          </a:p>
+          <a:p>
+            <a:r>
+              <a:rPr lang="en-US" sz="2000" dirty="0" smtClean="0">
+                <a:solidFill>
+                  <a:schemeClr val="accent2"/>
+                </a:solidFill>
+              </a:rPr>
+              <a:t>Use PxSEL1 and PxSEL2 to select signal for each pin</a:t>
+            </a:r>
+          </a:p>
+          <a:p>
+            <a:pPr lvl="1"/>
+            <a:r>
+              <a:rPr lang="en-US" sz="2000" dirty="0"/>
+              <a:t>The details are in the </a:t>
+            </a:r>
+            <a:r>
+              <a:rPr lang="en-US" sz="2000" dirty="0">
+                <a:hlinkClick r:id="rId2" action="ppaction://hlinkfile"/>
+              </a:rPr>
+              <a:t>MSP430G2x53 2x13 Mixed Signal MCU Datasheet</a:t>
+            </a:r>
+            <a:r>
+              <a:rPr lang="en-US" sz="2000" dirty="0"/>
+              <a:t>.</a:t>
+            </a:r>
+            <a:endParaRPr lang="en-US" sz="1600" dirty="0"/>
+          </a:p>
         </p:txBody>
       </p:sp>
       <p:pic>
         <p:nvPicPr>
-          <p:cNvPr id="2050" name="Picture 2" descr="MSP430 Memory Map"/>
+          <p:cNvPr id="4" name="Picture 2" descr="MSP430G2553 Pinout"/>
           <p:cNvPicPr>
             <a:picLocks noChangeAspect="1" noChangeArrowheads="1"/>
           </p:cNvPicPr>
           <p:nvPr/>
         </p:nvPicPr>
         <p:blipFill>
-          <a:blip r:embed="rId2">
+          <a:blip r:embed="rId3">
             <a:extLst>
               <a:ext uri="{28A0092B-C50C-407E-A947-70E740481C1C}">
                 <a14:useLocalDpi xmlns:a14="http://schemas.microsoft.com/office/drawing/2010/main" val="0"/>
@@ -7859,8 +8879,8 @@
         </p:blipFill>
         <p:spPr bwMode="auto">
           <a:xfrm>
-            <a:off x="6018663" y="2513628"/>
-            <a:ext cx="3110914" cy="4343722"/>
+            <a:off x="1121224" y="1334418"/>
+            <a:ext cx="6543675" cy="2381250"/>
           </a:xfrm>
           <a:prstGeom prst="rect">
             <a:avLst/>
@@ -7880,7 +8900,7 @@
     </p:spTree>
     <p:extLst>
       <p:ext uri="{BB962C8B-B14F-4D97-AF65-F5344CB8AC3E}">
-        <p14:creationId xmlns:p14="http://schemas.microsoft.com/office/powerpoint/2010/main" val="2990205779"/>
+        <p14:creationId xmlns:p14="http://schemas.microsoft.com/office/powerpoint/2010/main" val="3207840792"/>
       </p:ext>
     </p:extLst>
   </p:cSld>
@@ -7931,7 +8951,7 @@
           <a:p>
             <a:r>
               <a:rPr lang="en-US" b="1" dirty="0" smtClean="0"/>
-              <a:t>How do we talk to Ports? Do I/O?</a:t>
+              <a:t>Pitfall !!!</a:t>
             </a:r>
             <a:endParaRPr lang="en-US" dirty="0"/>
           </a:p>
@@ -7957,120 +8977,11 @@
           <a:bodyPr/>
           <a:lstStyle/>
           <a:p>
-            <a:r>
-              <a:rPr lang="en-US" sz="2000" dirty="0" smtClean="0">
-                <a:solidFill>
-                  <a:schemeClr val="accent2"/>
-                </a:solidFill>
-              </a:rPr>
-              <a:t>Port-Mapped </a:t>
-            </a:r>
-            <a:r>
-              <a:rPr lang="en-US" sz="2000" dirty="0">
-                <a:solidFill>
-                  <a:schemeClr val="accent2"/>
-                </a:solidFill>
-              </a:rPr>
-              <a:t>I/O </a:t>
-            </a:r>
-            <a:r>
-              <a:rPr lang="en-US" sz="2000" dirty="0" smtClean="0">
-                <a:solidFill>
-                  <a:schemeClr val="accent2"/>
-                </a:solidFill>
-              </a:rPr>
-              <a:t>   </a:t>
-            </a:r>
-            <a:r>
-              <a:rPr lang="en-US" sz="2000" dirty="0" smtClean="0"/>
-              <a:t>(Intel)</a:t>
-            </a:r>
-          </a:p>
-          <a:p>
-            <a:pPr lvl="1"/>
-            <a:r>
-              <a:rPr lang="en-US" sz="2000" dirty="0" smtClean="0"/>
-              <a:t>I/O and memory have their own separate address space</a:t>
-            </a:r>
-          </a:p>
-          <a:p>
-            <a:pPr lvl="1"/>
-            <a:r>
-              <a:rPr lang="en-US" sz="2000" dirty="0" smtClean="0"/>
-              <a:t>Advantage</a:t>
-            </a:r>
-          </a:p>
-          <a:p>
-            <a:pPr lvl="2"/>
-            <a:r>
-              <a:rPr lang="en-US" sz="1800" dirty="0" smtClean="0"/>
-              <a:t>Don't </a:t>
-            </a:r>
-            <a:r>
-              <a:rPr lang="en-US" sz="1800" dirty="0"/>
-              <a:t>lose memory for IO.</a:t>
-            </a:r>
-          </a:p>
-          <a:p>
-            <a:pPr lvl="2"/>
-            <a:r>
-              <a:rPr lang="en-US" sz="1800" dirty="0" smtClean="0"/>
-              <a:t>Protects </a:t>
-            </a:r>
-            <a:r>
-              <a:rPr lang="en-US" sz="1800" dirty="0"/>
-              <a:t>coder from mistakes.</a:t>
-            </a:r>
-          </a:p>
-          <a:p>
-            <a:pPr lvl="1"/>
-            <a:r>
-              <a:rPr lang="en-US" sz="2200" dirty="0" smtClean="0"/>
-              <a:t>Disadvantage</a:t>
-            </a:r>
-          </a:p>
-          <a:p>
-            <a:pPr lvl="2"/>
-            <a:r>
-              <a:rPr lang="en-US" sz="1800" dirty="0" smtClean="0"/>
-              <a:t>Need More Instructions (like In/Out)</a:t>
-            </a:r>
-          </a:p>
-          <a:p>
-            <a:pPr lvl="2"/>
-            <a:r>
-              <a:rPr lang="en-US" sz="1800" dirty="0" smtClean="0"/>
-              <a:t>More restrictive addressing modes</a:t>
-            </a:r>
-          </a:p>
-          <a:p>
-            <a:pPr lvl="1"/>
-            <a:r>
-              <a:rPr lang="en-US" sz="2200" dirty="0" smtClean="0"/>
-              <a:t>How to use</a:t>
-            </a:r>
-          </a:p>
-          <a:p>
-            <a:pPr lvl="2"/>
-            <a:r>
-              <a:rPr lang="en-US" sz="1800" dirty="0" smtClean="0"/>
-              <a:t>Out #0x55, &amp;PORT1</a:t>
-            </a:r>
-          </a:p>
-          <a:p>
-            <a:pPr lvl="1"/>
-            <a:r>
-              <a:rPr lang="en-US" sz="2200" dirty="0" smtClean="0">
-                <a:solidFill>
-                  <a:schemeClr val="accent2"/>
-                </a:solidFill>
-              </a:rPr>
-              <a:t>Does Port-Mapped cheat?</a:t>
-            </a:r>
-          </a:p>
-          <a:p>
-            <a:pPr lvl="1"/>
-            <a:endParaRPr lang="en-US" sz="2200" dirty="0"/>
+            <a:endParaRPr lang="en-US" sz="2000" dirty="0" smtClean="0">
+              <a:solidFill>
+                <a:schemeClr val="accent2"/>
+              </a:solidFill>
+            </a:endParaRPr>
           </a:p>
           <a:p>
             <a:endParaRPr lang="en-US" sz="2000" dirty="0">
@@ -8079,12 +8990,237 @@
               </a:solidFill>
             </a:endParaRPr>
           </a:p>
+          <a:p>
+            <a:endParaRPr lang="en-US" sz="2000" dirty="0" smtClean="0">
+              <a:solidFill>
+                <a:schemeClr val="accent2"/>
+              </a:solidFill>
+            </a:endParaRPr>
+          </a:p>
+          <a:p>
+            <a:endParaRPr lang="en-US" sz="2000" dirty="0">
+              <a:solidFill>
+                <a:schemeClr val="accent2"/>
+              </a:solidFill>
+            </a:endParaRPr>
+          </a:p>
+          <a:p>
+            <a:endParaRPr lang="en-US" sz="2000" dirty="0" smtClean="0">
+              <a:solidFill>
+                <a:schemeClr val="accent2"/>
+              </a:solidFill>
+            </a:endParaRPr>
+          </a:p>
+          <a:p>
+            <a:endParaRPr lang="en-US" sz="2000" dirty="0">
+              <a:solidFill>
+                <a:schemeClr val="accent2"/>
+              </a:solidFill>
+            </a:endParaRPr>
+          </a:p>
+          <a:p>
+            <a:endParaRPr lang="en-US" sz="2000" dirty="0" smtClean="0">
+              <a:solidFill>
+                <a:schemeClr val="accent2"/>
+              </a:solidFill>
+            </a:endParaRPr>
+          </a:p>
+          <a:p>
+            <a:endParaRPr lang="en-US" sz="2000" dirty="0" smtClean="0">
+              <a:solidFill>
+                <a:schemeClr val="accent2"/>
+              </a:solidFill>
+            </a:endParaRPr>
+          </a:p>
+          <a:p>
+            <a:endParaRPr lang="en-US" sz="2000" dirty="0" smtClean="0">
+              <a:solidFill>
+                <a:schemeClr val="accent2"/>
+              </a:solidFill>
+            </a:endParaRPr>
+          </a:p>
+          <a:p>
+            <a:endParaRPr lang="en-US" sz="2000" dirty="0" smtClean="0">
+              <a:solidFill>
+                <a:schemeClr val="accent2"/>
+              </a:solidFill>
+            </a:endParaRPr>
+          </a:p>
+          <a:p>
+            <a:endParaRPr lang="en-US" sz="2000" dirty="0">
+              <a:solidFill>
+                <a:schemeClr val="accent2"/>
+              </a:solidFill>
+            </a:endParaRPr>
+          </a:p>
+          <a:p>
+            <a:endParaRPr lang="en-US" sz="2000" dirty="0" smtClean="0">
+              <a:solidFill>
+                <a:schemeClr val="accent2"/>
+              </a:solidFill>
+            </a:endParaRPr>
+          </a:p>
+          <a:p>
+            <a:pPr marL="0" indent="0">
+              <a:buNone/>
+            </a:pPr>
+            <a:r>
+              <a:rPr lang="en-US" sz="1800" dirty="0" smtClean="0"/>
+              <a:t>Let's </a:t>
+            </a:r>
+            <a:r>
+              <a:rPr lang="en-US" sz="1800" dirty="0"/>
+              <a:t>say I wanted to make the UCA0SOMI function available on </a:t>
+            </a:r>
+            <a:r>
+              <a:rPr lang="en-US" sz="1800" dirty="0" smtClean="0"/>
+              <a:t>P1.1:</a:t>
+            </a:r>
+          </a:p>
+          <a:p>
+            <a:pPr lvl="1"/>
+            <a:r>
+              <a:rPr lang="en-US" sz="1200" dirty="0">
+                <a:solidFill>
+                  <a:srgbClr val="00B050"/>
+                </a:solidFill>
+                <a:latin typeface="Courier New" pitchFamily="49" charset="0"/>
+                <a:cs typeface="Courier New" pitchFamily="49" charset="0"/>
+              </a:rPr>
+              <a:t>; 'from USCI' means this bit is set automatically by the USCI when enabled</a:t>
+            </a:r>
+          </a:p>
+          <a:p>
+            <a:pPr lvl="1"/>
+            <a:r>
+              <a:rPr lang="en-US" sz="1200" dirty="0">
+                <a:latin typeface="Courier New" pitchFamily="49" charset="0"/>
+                <a:cs typeface="Courier New" pitchFamily="49" charset="0"/>
+              </a:rPr>
+              <a:t>    </a:t>
+            </a:r>
+            <a:r>
+              <a:rPr lang="en-US" sz="1200" dirty="0" err="1">
+                <a:latin typeface="Courier New" pitchFamily="49" charset="0"/>
+                <a:cs typeface="Courier New" pitchFamily="49" charset="0"/>
+              </a:rPr>
+              <a:t>bis.b</a:t>
+            </a:r>
+            <a:r>
+              <a:rPr lang="en-US" sz="1200" dirty="0">
+                <a:latin typeface="Courier New" pitchFamily="49" charset="0"/>
+                <a:cs typeface="Courier New" pitchFamily="49" charset="0"/>
+              </a:rPr>
+              <a:t>   #BIT1, P1SEL   </a:t>
+            </a:r>
+          </a:p>
+          <a:p>
+            <a:pPr lvl="1"/>
+            <a:r>
+              <a:rPr lang="en-US" sz="1200" dirty="0">
+                <a:latin typeface="Courier New" pitchFamily="49" charset="0"/>
+                <a:cs typeface="Courier New" pitchFamily="49" charset="0"/>
+              </a:rPr>
+              <a:t>    </a:t>
+            </a:r>
+            <a:r>
+              <a:rPr lang="en-US" sz="1200" dirty="0" err="1">
+                <a:latin typeface="Courier New" pitchFamily="49" charset="0"/>
+                <a:cs typeface="Courier New" pitchFamily="49" charset="0"/>
+              </a:rPr>
+              <a:t>bis.b</a:t>
+            </a:r>
+            <a:r>
+              <a:rPr lang="en-US" sz="1200" dirty="0">
+                <a:latin typeface="Courier New" pitchFamily="49" charset="0"/>
+                <a:cs typeface="Courier New" pitchFamily="49" charset="0"/>
+              </a:rPr>
+              <a:t>   #BIT1, </a:t>
+            </a:r>
+            <a:r>
+              <a:rPr lang="en-US" sz="1200" dirty="0" smtClean="0">
+                <a:latin typeface="Courier New" pitchFamily="49" charset="0"/>
+                <a:cs typeface="Courier New" pitchFamily="49" charset="0"/>
+              </a:rPr>
+              <a:t>P1SEL2</a:t>
+            </a:r>
+            <a:endParaRPr lang="en-US" sz="1600" dirty="0"/>
+          </a:p>
+          <a:p>
+            <a:endParaRPr lang="en-US" sz="2000" dirty="0">
+              <a:solidFill>
+                <a:schemeClr val="accent2"/>
+              </a:solidFill>
+            </a:endParaRPr>
+          </a:p>
+          <a:p>
+            <a:pPr lvl="1"/>
+            <a:endParaRPr lang="en-US" sz="2000" dirty="0" smtClean="0"/>
+          </a:p>
+          <a:p>
+            <a:endParaRPr lang="en-US" sz="2000" dirty="0">
+              <a:solidFill>
+                <a:schemeClr val="accent2"/>
+              </a:solidFill>
+            </a:endParaRPr>
+          </a:p>
+          <a:p>
+            <a:endParaRPr lang="en-US" sz="2000" dirty="0" smtClean="0">
+              <a:solidFill>
+                <a:schemeClr val="accent2"/>
+              </a:solidFill>
+            </a:endParaRPr>
+          </a:p>
+          <a:p>
+            <a:endParaRPr lang="en-US" sz="2000" dirty="0"/>
+          </a:p>
         </p:txBody>
       </p:sp>
+      <p:pic>
+        <p:nvPicPr>
+          <p:cNvPr id="3074" name="Picture 2" descr="P1.0-2 Multiplexing Control Bits / Signals"/>
+          <p:cNvPicPr>
+            <a:picLocks noChangeAspect="1" noChangeArrowheads="1"/>
+          </p:cNvPicPr>
+          <p:nvPr/>
+        </p:nvPicPr>
+        <p:blipFill>
+          <a:blip r:embed="rId2">
+            <a:extLst>
+              <a:ext uri="{28A0092B-C50C-407E-A947-70E740481C1C}">
+                <a14:useLocalDpi xmlns:a14="http://schemas.microsoft.com/office/drawing/2010/main" val="0"/>
+              </a:ext>
+            </a:extLst>
+          </a:blip>
+          <a:srcRect/>
+          <a:stretch>
+            <a:fillRect/>
+          </a:stretch>
+        </p:blipFill>
+        <p:spPr bwMode="auto">
+          <a:xfrm>
+            <a:off x="1183264" y="119695"/>
+            <a:ext cx="6753225" cy="4848225"/>
+          </a:xfrm>
+          <a:prstGeom prst="rect">
+            <a:avLst/>
+          </a:prstGeom>
+          <a:noFill/>
+          <a:extLst>
+            <a:ext uri="{909E8E84-426E-40DD-AFC4-6F175D3DCCD1}">
+              <a14:hiddenFill xmlns:a14="http://schemas.microsoft.com/office/drawing/2010/main">
+                <a:solidFill>
+                  <a:srgbClr val="FFFFFF"/>
+                </a:solidFill>
+              </a14:hiddenFill>
+            </a:ext>
+          </a:extLst>
+        </p:spPr>
+      </p:pic>
     </p:spTree>
     <p:extLst>
       <p:ext uri="{BB962C8B-B14F-4D97-AF65-F5344CB8AC3E}">
-        <p14:creationId xmlns:p14="http://schemas.microsoft.com/office/powerpoint/2010/main" val="645359394"/>
+        <p14:creationId xmlns:p14="http://schemas.microsoft.com/office/powerpoint/2010/main" val="307478788"/>
       </p:ext>
     </p:extLst>
   </p:cSld>
@@ -8134,8 +9270,8 @@
           <a:lstStyle/>
           <a:p>
             <a:r>
-              <a:rPr lang="en-US" b="1" dirty="0"/>
-              <a:t>General Purpose Input Output (GPIO)</a:t>
+              <a:rPr lang="en-US" b="1" dirty="0" smtClean="0"/>
+              <a:t>How do we talk to Ports? Do I/O?</a:t>
             </a:r>
             <a:endParaRPr lang="en-US" dirty="0"/>
           </a:p>
@@ -8162,68 +9298,42 @@
           <a:lstStyle/>
           <a:p>
             <a:r>
+              <a:rPr lang="en-US" sz="2000" dirty="0" smtClean="0">
+                <a:solidFill>
+                  <a:schemeClr val="accent2"/>
+                </a:solidFill>
+              </a:rPr>
+              <a:t>Two classic methods</a:t>
+            </a:r>
+            <a:endParaRPr lang="en-US" sz="2000" dirty="0">
+              <a:solidFill>
+                <a:schemeClr val="accent2"/>
+              </a:solidFill>
+            </a:endParaRPr>
+          </a:p>
+          <a:p>
+            <a:pPr lvl="1"/>
+            <a:r>
+              <a:rPr lang="en-US" sz="2000" dirty="0" smtClean="0"/>
+              <a:t>Memory-Mapped I/O                        (Motorola)</a:t>
+            </a:r>
+          </a:p>
+          <a:p>
+            <a:pPr lvl="1"/>
+            <a:r>
+              <a:rPr lang="en-US" sz="2000" dirty="0" smtClean="0"/>
+              <a:t>Port-Mapped I/O [or Isolated IO]     (Intel)</a:t>
+            </a:r>
+            <a:endParaRPr lang="en-US" sz="1800" dirty="0" smtClean="0"/>
+          </a:p>
+          <a:p>
+            <a:r>
               <a:rPr lang="en-US" sz="2000" dirty="0">
                 <a:solidFill>
                   <a:schemeClr val="accent2"/>
                 </a:solidFill>
               </a:rPr>
-              <a:t>The registers used to configure GPIO are </a:t>
-            </a:r>
-            <a:r>
-              <a:rPr lang="en-US" sz="2000" dirty="0" err="1">
-                <a:solidFill>
-                  <a:schemeClr val="accent2"/>
-                </a:solidFill>
-              </a:rPr>
-              <a:t>PxDIR</a:t>
-            </a:r>
-            <a:r>
-              <a:rPr lang="en-US" sz="2000" dirty="0" smtClean="0">
-                <a:solidFill>
-                  <a:schemeClr val="accent2"/>
-                </a:solidFill>
-              </a:rPr>
-              <a:t>, </a:t>
-            </a:r>
-            <a:r>
-              <a:rPr lang="en-US" sz="2000" dirty="0" err="1" smtClean="0">
-                <a:solidFill>
-                  <a:schemeClr val="accent2"/>
-                </a:solidFill>
-              </a:rPr>
-              <a:t>PxREN</a:t>
-            </a:r>
-            <a:r>
-              <a:rPr lang="en-US" sz="2000" dirty="0" smtClean="0">
-                <a:solidFill>
-                  <a:schemeClr val="accent2"/>
-                </a:solidFill>
-              </a:rPr>
-              <a:t>, </a:t>
-            </a:r>
-            <a:r>
-              <a:rPr lang="en-US" sz="2000" dirty="0" err="1">
-                <a:solidFill>
-                  <a:schemeClr val="accent2"/>
-                </a:solidFill>
-              </a:rPr>
-              <a:t>PxOUT</a:t>
-            </a:r>
-            <a:r>
-              <a:rPr lang="en-US" sz="2000" dirty="0">
-                <a:solidFill>
-                  <a:schemeClr val="accent2"/>
-                </a:solidFill>
-              </a:rPr>
-              <a:t>, and </a:t>
-            </a:r>
-            <a:r>
-              <a:rPr lang="en-US" sz="2000" dirty="0" err="1" smtClean="0">
-                <a:solidFill>
-                  <a:schemeClr val="accent2"/>
-                </a:solidFill>
-              </a:rPr>
-              <a:t>PxIN</a:t>
+              <a:t>Memory-Mapped I/O </a:t>
             </a:r>
             <a:endParaRPr lang="en-US" sz="2000" dirty="0" smtClean="0">
               <a:solidFill>
@@ -8234,580 +9344,126 @@
           <a:p>
             <a:pPr lvl="1"/>
             <a:r>
+              <a:rPr lang="en-US" sz="2000" dirty="0" smtClean="0"/>
+              <a:t>I/O and memory SHARE the same address space</a:t>
+            </a:r>
+          </a:p>
+          <a:p>
+            <a:pPr lvl="1"/>
+            <a:r>
+              <a:rPr lang="en-US" sz="2000" dirty="0" smtClean="0"/>
+              <a:t>Advantage</a:t>
+            </a:r>
+          </a:p>
+          <a:p>
+            <a:pPr lvl="2"/>
+            <a:r>
+              <a:rPr lang="en-US" sz="1800" dirty="0" smtClean="0"/>
+              <a:t>Fewer </a:t>
+            </a:r>
+            <a:r>
+              <a:rPr lang="en-US" sz="1800" dirty="0"/>
+              <a:t>instructions</a:t>
+            </a:r>
+          </a:p>
+          <a:p>
+            <a:pPr lvl="2"/>
+            <a:r>
+              <a:rPr lang="en-US" sz="1800" dirty="0" smtClean="0"/>
+              <a:t>Can </a:t>
+            </a:r>
+            <a:r>
+              <a:rPr lang="en-US" sz="1800" dirty="0"/>
+              <a:t>use </a:t>
+            </a:r>
+            <a:r>
+              <a:rPr lang="en-US" sz="1800" dirty="0" smtClean="0"/>
+              <a:t>all addressing modes</a:t>
+            </a:r>
+          </a:p>
+          <a:p>
+            <a:pPr lvl="1"/>
+            <a:r>
+              <a:rPr lang="en-US" sz="2200" dirty="0" smtClean="0"/>
+              <a:t>Disadvantage</a:t>
+            </a:r>
+          </a:p>
+          <a:p>
+            <a:pPr lvl="2"/>
+            <a:r>
+              <a:rPr lang="en-US" sz="1800" dirty="0" smtClean="0"/>
+              <a:t>Lose </a:t>
+            </a:r>
+            <a:r>
+              <a:rPr lang="en-US" sz="1800" dirty="0"/>
+              <a:t>memory to </a:t>
+            </a:r>
+            <a:r>
+              <a:rPr lang="en-US" sz="1800" dirty="0" smtClean="0"/>
+              <a:t>IO</a:t>
+            </a:r>
+          </a:p>
+          <a:p>
+            <a:pPr lvl="2"/>
+            <a:r>
+              <a:rPr lang="en-US" sz="1800" dirty="0" smtClean="0"/>
+              <a:t>Programmer mistakes</a:t>
+            </a:r>
+          </a:p>
+          <a:p>
+            <a:pPr lvl="1"/>
+            <a:r>
+              <a:rPr lang="en-US" sz="2200" dirty="0" smtClean="0"/>
+              <a:t>How to use</a:t>
+            </a:r>
+          </a:p>
+          <a:p>
+            <a:pPr lvl="2"/>
+            <a:r>
               <a:rPr lang="en-US" sz="1800" dirty="0" err="1" smtClean="0"/>
-              <a:t>PxDIR</a:t>
+              <a:t>Mov</a:t>
             </a:r>
             <a:r>
               <a:rPr lang="en-US" sz="1800" dirty="0" smtClean="0"/>
-              <a:t> </a:t>
+              <a:t> #0x55, &amp;P1OUT</a:t>
+            </a:r>
+          </a:p>
+          <a:p>
+            <a:pPr lvl="2"/>
+            <a:r>
+              <a:rPr lang="en-US" sz="1800" dirty="0" err="1"/>
+              <a:t>Mov</a:t>
             </a:r>
             <a:r>
               <a:rPr lang="en-US" sz="1800" dirty="0"/>
-              <a:t>configures which pins are input and which pins are output </a:t>
-            </a:r>
-          </a:p>
-          <a:p>
-            <a:pPr lvl="2"/>
-            <a:r>
-              <a:rPr lang="en-US" sz="1400" dirty="0" smtClean="0"/>
-              <a:t>1 </a:t>
-            </a:r>
-            <a:r>
-              <a:rPr lang="en-US" sz="1400" dirty="0"/>
-              <a:t>corresponds to output, 0 to input</a:t>
+              <a:t> #0x55, </a:t>
+            </a:r>
+            <a:r>
+              <a:rPr lang="en-US" sz="1800" dirty="0" smtClean="0"/>
+              <a:t>&amp;0x0021</a:t>
             </a:r>
           </a:p>
           <a:p>
             <a:pPr lvl="1"/>
             <a:r>
-              <a:rPr lang="en-US" sz="1800" dirty="0" err="1"/>
-              <a:t>PxREN</a:t>
-            </a:r>
-            <a:r>
-              <a:rPr lang="en-US" sz="1800" dirty="0"/>
-              <a:t> controls pull up / pull down resistors to avoid floating inputs</a:t>
-            </a:r>
-            <a:r>
-              <a:rPr lang="en-US" sz="1800" dirty="0" smtClean="0"/>
-              <a:t>.</a:t>
+              <a:rPr lang="en-US" sz="2200" dirty="0" smtClean="0">
+                <a:solidFill>
+                  <a:schemeClr val="accent2"/>
+                </a:solidFill>
+              </a:rPr>
+              <a:t>User’s Guide p 333, Table 8-2 (BB pp 41)</a:t>
             </a:r>
           </a:p>
           <a:p>
             <a:pPr lvl="1"/>
             <a:r>
-              <a:rPr lang="en-US" sz="1800" dirty="0" smtClean="0"/>
-              <a:t>Writing </a:t>
-            </a:r>
-            <a:r>
-              <a:rPr lang="en-US" sz="1800" dirty="0"/>
-              <a:t>to </a:t>
-            </a:r>
-            <a:r>
-              <a:rPr lang="en-US" sz="1800" dirty="0" err="1"/>
-              <a:t>PxOUT</a:t>
-            </a:r>
-            <a:r>
-              <a:rPr lang="en-US" sz="1800" dirty="0"/>
-              <a:t> controls the output of each pin</a:t>
-            </a:r>
-          </a:p>
-          <a:p>
-            <a:pPr lvl="1"/>
-            <a:r>
-              <a:rPr lang="en-US" sz="1800" dirty="0" err="1" smtClean="0"/>
-              <a:t>PxIN</a:t>
-            </a:r>
-            <a:r>
-              <a:rPr lang="en-US" sz="1800" dirty="0" smtClean="0"/>
-              <a:t> </a:t>
-            </a:r>
-            <a:r>
-              <a:rPr lang="en-US" sz="1800" dirty="0"/>
-              <a:t>allows you to read the values on these </a:t>
-            </a:r>
-            <a:r>
-              <a:rPr lang="en-US" sz="1800" dirty="0" smtClean="0"/>
-              <a:t>pins</a:t>
-            </a:r>
-          </a:p>
-          <a:p>
-            <a:pPr lvl="1"/>
-            <a:endParaRPr lang="en-US" sz="1800" dirty="0"/>
-          </a:p>
-          <a:p>
-            <a:pPr marL="0" indent="0">
-              <a:buNone/>
-            </a:pPr>
-            <a:r>
-              <a:rPr lang="en-US" sz="1800" dirty="0"/>
-              <a:t>Let's write a program that controls the onboard LEDs with the onboard push button</a:t>
-            </a:r>
-            <a:r>
-              <a:rPr lang="en-US" sz="1800" dirty="0">
-                <a:solidFill>
-                  <a:schemeClr val="accent2"/>
-                </a:solidFill>
-                <a:latin typeface="Courier New" pitchFamily="49" charset="0"/>
-                <a:cs typeface="Courier New" pitchFamily="49" charset="0"/>
-              </a:rPr>
-              <a:t>  </a:t>
-            </a:r>
-          </a:p>
-          <a:p>
-            <a:pPr marL="0" indent="0">
-              <a:buNone/>
-            </a:pPr>
-            <a:endParaRPr lang="en-US" sz="1400" dirty="0">
-              <a:solidFill>
-                <a:schemeClr val="accent2"/>
-              </a:solidFill>
-              <a:latin typeface="Courier New" pitchFamily="49" charset="0"/>
-              <a:cs typeface="Courier New" pitchFamily="49" charset="0"/>
-            </a:endParaRPr>
-          </a:p>
-          <a:p>
-            <a:pPr marL="0" indent="0">
-              <a:buNone/>
-            </a:pPr>
-            <a:r>
-              <a:rPr lang="en-US" sz="1400" dirty="0">
-                <a:solidFill>
-                  <a:schemeClr val="accent2"/>
-                </a:solidFill>
-                <a:latin typeface="Courier New" pitchFamily="49" charset="0"/>
-                <a:cs typeface="Courier New" pitchFamily="49" charset="0"/>
-              </a:rPr>
-              <a:t>              </a:t>
-            </a:r>
-            <a:r>
-              <a:rPr lang="en-US" sz="1400" dirty="0" err="1">
-                <a:solidFill>
-                  <a:schemeClr val="accent2"/>
-                </a:solidFill>
-                <a:latin typeface="Courier New" pitchFamily="49" charset="0"/>
-                <a:cs typeface="Courier New" pitchFamily="49" charset="0"/>
-              </a:rPr>
-              <a:t>bis.b</a:t>
-            </a:r>
-            <a:r>
-              <a:rPr lang="en-US" sz="1400" dirty="0">
-                <a:solidFill>
-                  <a:schemeClr val="accent2"/>
-                </a:solidFill>
-                <a:latin typeface="Courier New" pitchFamily="49" charset="0"/>
-                <a:cs typeface="Courier New" pitchFamily="49" charset="0"/>
-              </a:rPr>
-              <a:t>  #BIT0|BIT6, &amp;P1DIR</a:t>
-            </a:r>
-          </a:p>
-          <a:p>
-            <a:pPr marL="0" indent="0">
-              <a:buNone/>
-            </a:pPr>
-            <a:r>
-              <a:rPr lang="en-US" sz="1400" dirty="0">
-                <a:solidFill>
-                  <a:schemeClr val="accent2"/>
-                </a:solidFill>
-                <a:latin typeface="Courier New" pitchFamily="49" charset="0"/>
-                <a:cs typeface="Courier New" pitchFamily="49" charset="0"/>
-              </a:rPr>
-              <a:t>              </a:t>
-            </a:r>
-            <a:r>
-              <a:rPr lang="en-US" sz="1400" dirty="0" err="1">
-                <a:solidFill>
-                  <a:schemeClr val="accent2"/>
-                </a:solidFill>
-                <a:latin typeface="Courier New" pitchFamily="49" charset="0"/>
-                <a:cs typeface="Courier New" pitchFamily="49" charset="0"/>
-              </a:rPr>
-              <a:t>bic.b</a:t>
-            </a:r>
-            <a:r>
-              <a:rPr lang="en-US" sz="1400" dirty="0">
-                <a:solidFill>
-                  <a:schemeClr val="accent2"/>
-                </a:solidFill>
-                <a:latin typeface="Courier New" pitchFamily="49" charset="0"/>
-                <a:cs typeface="Courier New" pitchFamily="49" charset="0"/>
-              </a:rPr>
-              <a:t>  #BIT3, &amp;P1DIR</a:t>
-            </a:r>
-          </a:p>
-          <a:p>
-            <a:pPr marL="0" indent="0">
-              <a:buNone/>
-            </a:pPr>
-            <a:endParaRPr lang="en-US" sz="1400" dirty="0">
-              <a:solidFill>
-                <a:schemeClr val="accent2"/>
-              </a:solidFill>
-              <a:latin typeface="Courier New" pitchFamily="49" charset="0"/>
-              <a:cs typeface="Courier New" pitchFamily="49" charset="0"/>
-            </a:endParaRPr>
-          </a:p>
-          <a:p>
-            <a:pPr marL="0" indent="0">
-              <a:buNone/>
-            </a:pPr>
-            <a:r>
-              <a:rPr lang="en-US" sz="1400" dirty="0" err="1">
-                <a:solidFill>
-                  <a:schemeClr val="accent2"/>
-                </a:solidFill>
-                <a:latin typeface="Courier New" pitchFamily="49" charset="0"/>
-                <a:cs typeface="Courier New" pitchFamily="49" charset="0"/>
-              </a:rPr>
-              <a:t>check_btn</a:t>
-            </a:r>
-            <a:r>
-              <a:rPr lang="en-US" sz="1400" dirty="0">
-                <a:solidFill>
-                  <a:schemeClr val="accent2"/>
-                </a:solidFill>
-                <a:latin typeface="Courier New" pitchFamily="49" charset="0"/>
-                <a:cs typeface="Courier New" pitchFamily="49" charset="0"/>
-              </a:rPr>
-              <a:t>:    </a:t>
-            </a:r>
-            <a:r>
-              <a:rPr lang="en-US" sz="1400" dirty="0" err="1">
-                <a:solidFill>
-                  <a:schemeClr val="accent2"/>
-                </a:solidFill>
-                <a:latin typeface="Courier New" pitchFamily="49" charset="0"/>
-                <a:cs typeface="Courier New" pitchFamily="49" charset="0"/>
-              </a:rPr>
-              <a:t>bit.b</a:t>
-            </a:r>
-            <a:r>
-              <a:rPr lang="en-US" sz="1400" dirty="0">
-                <a:solidFill>
-                  <a:schemeClr val="accent2"/>
-                </a:solidFill>
-                <a:latin typeface="Courier New" pitchFamily="49" charset="0"/>
-                <a:cs typeface="Courier New" pitchFamily="49" charset="0"/>
-              </a:rPr>
-              <a:t>  #BIT3, &amp;</a:t>
-            </a:r>
-            <a:r>
-              <a:rPr lang="en-US" sz="1400" dirty="0" smtClean="0">
-                <a:solidFill>
-                  <a:schemeClr val="accent2"/>
-                </a:solidFill>
-                <a:latin typeface="Courier New" pitchFamily="49" charset="0"/>
-                <a:cs typeface="Courier New" pitchFamily="49" charset="0"/>
-              </a:rPr>
-              <a:t>P1IN</a:t>
-            </a:r>
-            <a:r>
-              <a:rPr lang="en-US" sz="1400" dirty="0">
-                <a:solidFill>
-                  <a:schemeClr val="accent2"/>
-                </a:solidFill>
-                <a:latin typeface="Courier New" pitchFamily="49" charset="0"/>
-                <a:cs typeface="Courier New" pitchFamily="49" charset="0"/>
-              </a:rPr>
-              <a:t> </a:t>
-            </a:r>
-            <a:r>
-              <a:rPr lang="en-US" sz="1400" dirty="0" smtClean="0">
-                <a:solidFill>
-                  <a:schemeClr val="accent2"/>
-                </a:solidFill>
-                <a:latin typeface="Courier New" pitchFamily="49" charset="0"/>
-                <a:cs typeface="Courier New" pitchFamily="49" charset="0"/>
-              </a:rPr>
-              <a:t>          </a:t>
-            </a:r>
-            <a:r>
-              <a:rPr lang="en-US" sz="1400" dirty="0" smtClean="0">
-                <a:solidFill>
-                  <a:srgbClr val="00B050"/>
-                </a:solidFill>
-                <a:latin typeface="Courier New" pitchFamily="49" charset="0"/>
-                <a:cs typeface="Courier New" pitchFamily="49" charset="0"/>
-              </a:rPr>
-              <a:t>;</a:t>
-            </a:r>
-            <a:r>
-              <a:rPr lang="en-US" sz="1400" dirty="0">
-                <a:solidFill>
-                  <a:srgbClr val="00B050"/>
-                </a:solidFill>
-                <a:latin typeface="Courier New" pitchFamily="49" charset="0"/>
-                <a:cs typeface="Courier New" pitchFamily="49" charset="0"/>
-              </a:rPr>
-              <a:t>push button is LOW on push</a:t>
-            </a:r>
-            <a:endParaRPr lang="en-US" sz="1400" dirty="0">
-              <a:solidFill>
-                <a:schemeClr val="accent2"/>
-              </a:solidFill>
-              <a:latin typeface="Courier New" pitchFamily="49" charset="0"/>
-              <a:cs typeface="Courier New" pitchFamily="49" charset="0"/>
-            </a:endParaRPr>
-          </a:p>
-          <a:p>
-            <a:pPr marL="0" indent="0">
-              <a:buNone/>
-            </a:pPr>
-            <a:r>
-              <a:rPr lang="en-US" sz="1400" dirty="0">
-                <a:solidFill>
-                  <a:schemeClr val="accent2"/>
-                </a:solidFill>
-                <a:latin typeface="Courier New" pitchFamily="49" charset="0"/>
-                <a:cs typeface="Courier New" pitchFamily="49" charset="0"/>
-              </a:rPr>
-              <a:t>              </a:t>
-            </a:r>
-            <a:r>
-              <a:rPr lang="en-US" sz="1400" dirty="0" err="1">
-                <a:solidFill>
-                  <a:schemeClr val="accent2"/>
-                </a:solidFill>
-                <a:latin typeface="Courier New" pitchFamily="49" charset="0"/>
-                <a:cs typeface="Courier New" pitchFamily="49" charset="0"/>
-              </a:rPr>
-              <a:t>jz</a:t>
-            </a:r>
-            <a:r>
-              <a:rPr lang="en-US" sz="1400" dirty="0">
-                <a:solidFill>
-                  <a:schemeClr val="accent2"/>
-                </a:solidFill>
-                <a:latin typeface="Courier New" pitchFamily="49" charset="0"/>
-                <a:cs typeface="Courier New" pitchFamily="49" charset="0"/>
-              </a:rPr>
-              <a:t>     </a:t>
-            </a:r>
-            <a:r>
-              <a:rPr lang="en-US" sz="1400" dirty="0" err="1">
-                <a:solidFill>
-                  <a:schemeClr val="accent2"/>
-                </a:solidFill>
-                <a:latin typeface="Courier New" pitchFamily="49" charset="0"/>
-                <a:cs typeface="Courier New" pitchFamily="49" charset="0"/>
-              </a:rPr>
-              <a:t>set_lights</a:t>
-            </a:r>
-            <a:endParaRPr lang="en-US" sz="1400" dirty="0">
-              <a:solidFill>
-                <a:schemeClr val="accent2"/>
-              </a:solidFill>
-              <a:latin typeface="Courier New" pitchFamily="49" charset="0"/>
-              <a:cs typeface="Courier New" pitchFamily="49" charset="0"/>
-            </a:endParaRPr>
-          </a:p>
-          <a:p>
-            <a:pPr marL="0" indent="0">
-              <a:buNone/>
-            </a:pPr>
-            <a:r>
-              <a:rPr lang="en-US" sz="1400" dirty="0">
-                <a:solidFill>
-                  <a:schemeClr val="accent2"/>
-                </a:solidFill>
-                <a:latin typeface="Courier New" pitchFamily="49" charset="0"/>
-                <a:cs typeface="Courier New" pitchFamily="49" charset="0"/>
-              </a:rPr>
-              <a:t>              </a:t>
-            </a:r>
-            <a:r>
-              <a:rPr lang="en-US" sz="1400" dirty="0" err="1">
-                <a:solidFill>
-                  <a:schemeClr val="accent2"/>
-                </a:solidFill>
-                <a:latin typeface="Courier New" pitchFamily="49" charset="0"/>
-                <a:cs typeface="Courier New" pitchFamily="49" charset="0"/>
-              </a:rPr>
-              <a:t>bic.b</a:t>
-            </a:r>
-            <a:r>
-              <a:rPr lang="en-US" sz="1400" dirty="0">
-                <a:solidFill>
-                  <a:schemeClr val="accent2"/>
-                </a:solidFill>
-                <a:latin typeface="Courier New" pitchFamily="49" charset="0"/>
-                <a:cs typeface="Courier New" pitchFamily="49" charset="0"/>
-              </a:rPr>
-              <a:t>  #BIT0|BIT6, &amp;P1OUT</a:t>
-            </a:r>
-          </a:p>
-          <a:p>
-            <a:pPr marL="0" indent="0">
-              <a:buNone/>
-            </a:pPr>
-            <a:r>
-              <a:rPr lang="en-US" sz="1400" dirty="0">
-                <a:solidFill>
-                  <a:schemeClr val="accent2"/>
-                </a:solidFill>
-                <a:latin typeface="Courier New" pitchFamily="49" charset="0"/>
-                <a:cs typeface="Courier New" pitchFamily="49" charset="0"/>
-              </a:rPr>
-              <a:t>              </a:t>
-            </a:r>
-            <a:r>
-              <a:rPr lang="en-US" sz="1400" dirty="0" err="1">
-                <a:solidFill>
-                  <a:schemeClr val="accent2"/>
-                </a:solidFill>
-                <a:latin typeface="Courier New" pitchFamily="49" charset="0"/>
-                <a:cs typeface="Courier New" pitchFamily="49" charset="0"/>
-              </a:rPr>
-              <a:t>jmp</a:t>
-            </a:r>
-            <a:r>
-              <a:rPr lang="en-US" sz="1400" dirty="0">
-                <a:solidFill>
-                  <a:schemeClr val="accent2"/>
-                </a:solidFill>
-                <a:latin typeface="Courier New" pitchFamily="49" charset="0"/>
-                <a:cs typeface="Courier New" pitchFamily="49" charset="0"/>
-              </a:rPr>
-              <a:t>    </a:t>
-            </a:r>
-            <a:r>
-              <a:rPr lang="en-US" sz="1400" dirty="0" err="1">
-                <a:solidFill>
-                  <a:schemeClr val="accent2"/>
-                </a:solidFill>
-                <a:latin typeface="Courier New" pitchFamily="49" charset="0"/>
-                <a:cs typeface="Courier New" pitchFamily="49" charset="0"/>
-              </a:rPr>
-              <a:t>check_btn</a:t>
-            </a:r>
-            <a:endParaRPr lang="en-US" sz="1400" dirty="0">
-              <a:solidFill>
-                <a:schemeClr val="accent2"/>
-              </a:solidFill>
-              <a:latin typeface="Courier New" pitchFamily="49" charset="0"/>
-              <a:cs typeface="Courier New" pitchFamily="49" charset="0"/>
-            </a:endParaRPr>
-          </a:p>
-          <a:p>
-            <a:pPr marL="0" indent="0">
-              <a:buNone/>
-            </a:pPr>
-            <a:r>
-              <a:rPr lang="en-US" sz="1400" dirty="0" err="1">
-                <a:solidFill>
-                  <a:schemeClr val="accent2"/>
-                </a:solidFill>
-                <a:latin typeface="Courier New" pitchFamily="49" charset="0"/>
-                <a:cs typeface="Courier New" pitchFamily="49" charset="0"/>
-              </a:rPr>
-              <a:t>set_lights</a:t>
-            </a:r>
-            <a:r>
-              <a:rPr lang="en-US" sz="1400" dirty="0">
-                <a:solidFill>
-                  <a:schemeClr val="accent2"/>
-                </a:solidFill>
-                <a:latin typeface="Courier New" pitchFamily="49" charset="0"/>
-                <a:cs typeface="Courier New" pitchFamily="49" charset="0"/>
-              </a:rPr>
-              <a:t>:   </a:t>
-            </a:r>
-            <a:r>
-              <a:rPr lang="en-US" sz="1400" dirty="0" err="1">
-                <a:solidFill>
-                  <a:schemeClr val="accent2"/>
-                </a:solidFill>
-                <a:latin typeface="Courier New" pitchFamily="49" charset="0"/>
-                <a:cs typeface="Courier New" pitchFamily="49" charset="0"/>
-              </a:rPr>
-              <a:t>bis.b</a:t>
-            </a:r>
-            <a:r>
-              <a:rPr lang="en-US" sz="1400" dirty="0">
-                <a:solidFill>
-                  <a:schemeClr val="accent2"/>
-                </a:solidFill>
-                <a:latin typeface="Courier New" pitchFamily="49" charset="0"/>
-                <a:cs typeface="Courier New" pitchFamily="49" charset="0"/>
-              </a:rPr>
-              <a:t>  #BIT0|BIT6, &amp;P1OUT</a:t>
-            </a:r>
-          </a:p>
-          <a:p>
-            <a:pPr marL="0" indent="0">
-              <a:buNone/>
-            </a:pPr>
-            <a:r>
-              <a:rPr lang="en-US" sz="1400" dirty="0">
-                <a:solidFill>
-                  <a:schemeClr val="accent2"/>
-                </a:solidFill>
-                <a:latin typeface="Courier New" pitchFamily="49" charset="0"/>
-                <a:cs typeface="Courier New" pitchFamily="49" charset="0"/>
-              </a:rPr>
-              <a:t>              </a:t>
-            </a:r>
-            <a:r>
-              <a:rPr lang="en-US" sz="1400" dirty="0" err="1">
-                <a:solidFill>
-                  <a:schemeClr val="accent2"/>
-                </a:solidFill>
-                <a:latin typeface="Courier New" pitchFamily="49" charset="0"/>
-                <a:cs typeface="Courier New" pitchFamily="49" charset="0"/>
-              </a:rPr>
-              <a:t>jmp</a:t>
-            </a:r>
-            <a:r>
-              <a:rPr lang="en-US" sz="1400" dirty="0">
-                <a:solidFill>
-                  <a:schemeClr val="accent2"/>
-                </a:solidFill>
-                <a:latin typeface="Courier New" pitchFamily="49" charset="0"/>
-                <a:cs typeface="Courier New" pitchFamily="49" charset="0"/>
-              </a:rPr>
-              <a:t>    </a:t>
-            </a:r>
-            <a:r>
-              <a:rPr lang="en-US" sz="1400" dirty="0" err="1">
-                <a:solidFill>
-                  <a:schemeClr val="accent2"/>
-                </a:solidFill>
-                <a:latin typeface="Courier New" pitchFamily="49" charset="0"/>
-                <a:cs typeface="Courier New" pitchFamily="49" charset="0"/>
-              </a:rPr>
-              <a:t>check_btn</a:t>
-            </a:r>
-            <a:endParaRPr lang="en-US" sz="1400" dirty="0">
-              <a:solidFill>
-                <a:schemeClr val="accent2"/>
-              </a:solidFill>
-              <a:latin typeface="Courier New" pitchFamily="49" charset="0"/>
-              <a:cs typeface="Courier New" pitchFamily="49" charset="0"/>
-            </a:endParaRPr>
-          </a:p>
-          <a:p>
-            <a:pPr marL="0" indent="0">
-              <a:buNone/>
-            </a:pPr>
-            <a:endParaRPr lang="en-US" sz="1400" dirty="0">
-              <a:solidFill>
-                <a:schemeClr val="accent2"/>
-              </a:solidFill>
-              <a:latin typeface="Courier New" pitchFamily="49" charset="0"/>
-              <a:cs typeface="Courier New" pitchFamily="49" charset="0"/>
-            </a:endParaRPr>
-          </a:p>
-          <a:p>
-            <a:pPr marL="0" indent="0">
-              <a:buNone/>
-            </a:pPr>
-            <a:endParaRPr lang="en-US" sz="1400" dirty="0">
-              <a:solidFill>
-                <a:schemeClr val="accent2"/>
-              </a:solidFill>
-              <a:latin typeface="Courier New" pitchFamily="49" charset="0"/>
-              <a:cs typeface="Courier New" pitchFamily="49" charset="0"/>
-            </a:endParaRPr>
-          </a:p>
-          <a:p>
-            <a:pPr marL="0" indent="0">
-              <a:buNone/>
-            </a:pPr>
-            <a:r>
-              <a:rPr lang="en-US" sz="2000" dirty="0"/>
-              <a:t>Any problem with this code?</a:t>
-            </a:r>
-            <a:endParaRPr lang="en-US" sz="2000" dirty="0">
-              <a:solidFill>
-                <a:schemeClr val="accent2"/>
-              </a:solidFill>
-              <a:latin typeface="Courier New" pitchFamily="49" charset="0"/>
-              <a:cs typeface="Courier New" pitchFamily="49" charset="0"/>
-            </a:endParaRPr>
-          </a:p>
-          <a:p>
-            <a:pPr lvl="1"/>
-            <a:endParaRPr lang="en-US" sz="1600" dirty="0"/>
+              <a:rPr lang="en-US" sz="2200" dirty="0" smtClean="0">
+                <a:solidFill>
+                  <a:schemeClr val="accent2"/>
+                </a:solidFill>
+              </a:rPr>
+              <a:t>Watchdog Timer, page 341 (BB pp 42)</a:t>
+            </a:r>
           </a:p>
           <a:p>
             <a:pPr lvl="1"/>
@@ -8822,45 +9478,51 @@
           </a:p>
         </p:txBody>
       </p:sp>
-      <p:sp>
-        <p:nvSpPr>
-          <p:cNvPr id="4" name="TextBox 3"/>
-          <p:cNvSpPr txBox="1"/>
+      <p:pic>
+        <p:nvPicPr>
+          <p:cNvPr id="2050" name="Picture 2" descr="MSP430 Memory Map"/>
+          <p:cNvPicPr>
+            <a:picLocks noChangeAspect="1" noChangeArrowheads="1"/>
+          </p:cNvPicPr>
           <p:nvPr/>
-        </p:nvSpPr>
-        <p:spPr>
+        </p:nvPicPr>
+        <p:blipFill>
+          <a:blip r:embed="rId2">
+            <a:extLst>
+              <a:ext uri="{28A0092B-C50C-407E-A947-70E740481C1C}">
+                <a14:useLocalDpi xmlns:a14="http://schemas.microsoft.com/office/drawing/2010/main" val="0"/>
+              </a:ext>
+            </a:extLst>
+          </a:blip>
+          <a:srcRect/>
+          <a:stretch>
+            <a:fillRect/>
+          </a:stretch>
+        </p:blipFill>
+        <p:spPr bwMode="auto">
           <a:xfrm>
-            <a:off x="5813949" y="1940673"/>
-            <a:ext cx="3616657" cy="1015663"/>
+            <a:off x="6018663" y="2513628"/>
+            <a:ext cx="3110914" cy="4343722"/>
           </a:xfrm>
           <a:prstGeom prst="rect">
             <a:avLst/>
           </a:prstGeom>
           <a:noFill/>
+          <a:extLst>
+            <a:ext uri="{909E8E84-426E-40DD-AFC4-6F175D3DCCD1}">
+              <a14:hiddenFill xmlns:a14="http://schemas.microsoft.com/office/drawing/2010/main">
+                <a:solidFill>
+                  <a:srgbClr val="FFFFFF"/>
+                </a:solidFill>
+              </a14:hiddenFill>
+            </a:ext>
+          </a:extLst>
         </p:spPr>
-        <p:txBody>
-          <a:bodyPr wrap="square" rtlCol="0">
-            <a:spAutoFit/>
-          </a:bodyPr>
-          <a:lstStyle/>
-          <a:p>
-            <a:r>
-              <a:rPr lang="en-US" dirty="0" smtClean="0"/>
-              <a:t>Family Users Guide p 328</a:t>
-            </a:r>
-          </a:p>
-          <a:p>
-            <a:r>
-              <a:rPr lang="en-US" dirty="0" smtClean="0"/>
-              <a:t>Blue Book pp 38</a:t>
-            </a:r>
-          </a:p>
-        </p:txBody>
-      </p:sp>
+      </p:pic>
     </p:spTree>
     <p:extLst>
       <p:ext uri="{BB962C8B-B14F-4D97-AF65-F5344CB8AC3E}">
-        <p14:creationId xmlns:p14="http://schemas.microsoft.com/office/powerpoint/2010/main" val="2697282666"/>
+        <p14:creationId xmlns:p14="http://schemas.microsoft.com/office/powerpoint/2010/main" val="2990205779"/>
       </p:ext>
     </p:extLst>
   </p:cSld>
@@ -8870,80 +9532,9 @@
   <p:timing>
     <p:tnLst>
       <p:par>
-        <p:cTn id="1" dur="indefinite" restart="never" nodeType="tmRoot">
-          <p:childTnLst>
-            <p:seq concurrent="1" nextAc="seek">
-              <p:cTn id="2" dur="indefinite" nodeType="mainSeq">
-                <p:childTnLst>
-                  <p:par>
-                    <p:cTn id="3" fill="hold">
-                      <p:stCondLst>
-                        <p:cond delay="indefinite"/>
-                      </p:stCondLst>
-                      <p:childTnLst>
-                        <p:par>
-                          <p:cTn id="4" fill="hold">
-                            <p:stCondLst>
-                              <p:cond delay="0"/>
-                            </p:stCondLst>
-                            <p:childTnLst>
-                              <p:par>
-                                <p:cTn id="5" presetID="1" presetClass="entr" presetSubtype="0" fill="hold" grpId="0" nodeType="clickEffect">
-                                  <p:stCondLst>
-                                    <p:cond delay="0"/>
-                                  </p:stCondLst>
-                                  <p:childTnLst>
-                                    <p:set>
-                                      <p:cBhvr>
-                                        <p:cTn id="6" dur="1" fill="hold">
-                                          <p:stCondLst>
-                                            <p:cond delay="0"/>
-                                          </p:stCondLst>
-                                        </p:cTn>
-                                        <p:tgtEl>
-                                          <p:spTgt spid="4"/>
-                                        </p:tgtEl>
-                                        <p:attrNameLst>
-                                          <p:attrName>style.visibility</p:attrName>
-                                        </p:attrNameLst>
-                                      </p:cBhvr>
-                                      <p:to>
-                                        <p:strVal val="visible"/>
-                                      </p:to>
-                                    </p:set>
-                                  </p:childTnLst>
-                                </p:cTn>
-                              </p:par>
-                            </p:childTnLst>
-                          </p:cTn>
-                        </p:par>
-                      </p:childTnLst>
-                    </p:cTn>
-                  </p:par>
-                </p:childTnLst>
-              </p:cTn>
-              <p:prevCondLst>
-                <p:cond evt="onPrev" delay="0">
-                  <p:tgtEl>
-                    <p:sldTgt/>
-                  </p:tgtEl>
-                </p:cond>
-              </p:prevCondLst>
-              <p:nextCondLst>
-                <p:cond evt="onNext" delay="0">
-                  <p:tgtEl>
-                    <p:sldTgt/>
-                  </p:tgtEl>
-                </p:cond>
-              </p:nextCondLst>
-            </p:seq>
-          </p:childTnLst>
-        </p:cTn>
+        <p:cTn id="1" dur="indefinite" restart="never" nodeType="tmRoot"/>
       </p:par>
     </p:tnLst>
-    <p:bldLst>
-      <p:bldP spid="4" grpId="0"/>
-    </p:bldLst>
   </p:timing>
 </p:sld>
 </file>

</xml_diff>

<commit_message>
L13 - minor notes / slides clean ups
</commit_message>
<xml_diff>
--- a/notes/L13/Lsn13.pptx
+++ b/notes/L13/Lsn13.pptx
@@ -5,27 +5,25 @@
     <p:sldMasterId id="2147483648" r:id="rId1"/>
   </p:sldMasterIdLst>
   <p:notesMasterIdLst>
-    <p:notesMasterId r:id="rId17"/>
+    <p:notesMasterId r:id="rId15"/>
   </p:notesMasterIdLst>
   <p:handoutMasterIdLst>
-    <p:handoutMasterId r:id="rId18"/>
+    <p:handoutMasterId r:id="rId16"/>
   </p:handoutMasterIdLst>
   <p:sldIdLst>
     <p:sldId id="282" r:id="rId2"/>
-    <p:sldId id="361" r:id="rId3"/>
-    <p:sldId id="362" r:id="rId4"/>
-    <p:sldId id="353" r:id="rId5"/>
-    <p:sldId id="356" r:id="rId6"/>
-    <p:sldId id="342" r:id="rId7"/>
-    <p:sldId id="355" r:id="rId8"/>
-    <p:sldId id="359" r:id="rId9"/>
-    <p:sldId id="343" r:id="rId10"/>
-    <p:sldId id="357" r:id="rId11"/>
-    <p:sldId id="358" r:id="rId12"/>
-    <p:sldId id="347" r:id="rId13"/>
-    <p:sldId id="364" r:id="rId14"/>
-    <p:sldId id="348" r:id="rId15"/>
-    <p:sldId id="360" r:id="rId16"/>
+    <p:sldId id="353" r:id="rId3"/>
+    <p:sldId id="356" r:id="rId4"/>
+    <p:sldId id="342" r:id="rId5"/>
+    <p:sldId id="355" r:id="rId6"/>
+    <p:sldId id="359" r:id="rId7"/>
+    <p:sldId id="343" r:id="rId8"/>
+    <p:sldId id="357" r:id="rId9"/>
+    <p:sldId id="358" r:id="rId10"/>
+    <p:sldId id="347" r:id="rId11"/>
+    <p:sldId id="364" r:id="rId12"/>
+    <p:sldId id="348" r:id="rId13"/>
+    <p:sldId id="360" r:id="rId14"/>
   </p:sldIdLst>
   <p:sldSz cx="9144000" cy="6858000" type="screen4x3"/>
   <p:notesSz cx="6985000" cy="9283700"/>
@@ -3913,71 +3911,6 @@
             </a:endParaRPr>
           </a:p>
           <a:p>
-            <a:pPr algn="l"/>
-            <a:r>
-              <a:rPr lang="en-US" sz="2000" b="1" dirty="0" smtClean="0"/>
-              <a:t>Admin</a:t>
-            </a:r>
-            <a:endParaRPr lang="en-US" sz="2000" b="1" dirty="0"/>
-          </a:p>
-          <a:p>
-            <a:pPr lvl="1" algn="l"/>
-            <a:r>
-              <a:rPr lang="en-US" sz="2000" dirty="0" smtClean="0">
-                <a:solidFill>
-                  <a:srgbClr val="0070C0"/>
-                </a:solidFill>
-              </a:rPr>
-              <a:t>Lab 2 </a:t>
-            </a:r>
-            <a:r>
-              <a:rPr lang="en-US" sz="2000" dirty="0" err="1" smtClean="0">
-                <a:solidFill>
-                  <a:srgbClr val="0070C0"/>
-                </a:solidFill>
-              </a:rPr>
-              <a:t>BitBucket</a:t>
-            </a:r>
-            <a:r>
-              <a:rPr lang="en-US" sz="2000" dirty="0" smtClean="0">
-                <a:solidFill>
-                  <a:srgbClr val="0070C0"/>
-                </a:solidFill>
-              </a:rPr>
-              <a:t> report due COB Today (no penalty if turned in by Midnight Sunday)</a:t>
-            </a:r>
-          </a:p>
-          <a:p>
-            <a:pPr lvl="1" algn="l"/>
-            <a:r>
-              <a:rPr lang="en-US" sz="2000" dirty="0">
-                <a:solidFill>
-                  <a:srgbClr val="0070C0"/>
-                </a:solidFill>
-              </a:rPr>
-              <a:t>	</a:t>
-            </a:r>
-            <a:r>
-              <a:rPr lang="en-US" sz="2000" dirty="0" smtClean="0">
-                <a:solidFill>
-                  <a:srgbClr val="0070C0"/>
-                </a:solidFill>
-              </a:rPr>
-              <a:t>- Commit Message “Lab 2 notebook is ready to grade”</a:t>
-            </a:r>
-          </a:p>
-          <a:p>
-            <a:pPr lvl="1" algn="l"/>
-            <a:r>
-              <a:rPr lang="en-US" sz="2000" dirty="0" smtClean="0">
-                <a:solidFill>
-                  <a:srgbClr val="0070C0"/>
-                </a:solidFill>
-              </a:rPr>
-              <a:t>BadLec5.asm Extra Credit Due Next Lesson</a:t>
-            </a:r>
-          </a:p>
-          <a:p>
             <a:pPr lvl="1" algn="l"/>
             <a:endParaRPr lang="en-US" sz="2000" dirty="0">
               <a:solidFill>
@@ -4012,1057 +3945,6 @@
 </file>
 
 <file path=ppt/slides/slide10.xml><?xml version="1.0" encoding="utf-8"?>
-<p:sld xmlns:a="http://schemas.openxmlformats.org/drawingml/2006/main" xmlns:r="http://schemas.openxmlformats.org/officeDocument/2006/relationships" xmlns:p="http://schemas.openxmlformats.org/presentationml/2006/main">
-  <p:cSld>
-    <p:spTree>
-      <p:nvGrpSpPr>
-        <p:cNvPr id="1" name=""/>
-        <p:cNvGrpSpPr/>
-        <p:nvPr/>
-      </p:nvGrpSpPr>
-      <p:grpSpPr>
-        <a:xfrm>
-          <a:off x="0" y="0"/>
-          <a:ext cx="0" cy="0"/>
-          <a:chOff x="0" y="0"/>
-          <a:chExt cx="0" cy="0"/>
-        </a:xfrm>
-      </p:grpSpPr>
-      <p:sp>
-        <p:nvSpPr>
-          <p:cNvPr id="2" name="Title 1"/>
-          <p:cNvSpPr>
-            <a:spLocks noGrp="1"/>
-          </p:cNvSpPr>
-          <p:nvPr>
-            <p:ph type="title"/>
-          </p:nvPr>
-        </p:nvSpPr>
-        <p:spPr/>
-        <p:txBody>
-          <a:bodyPr/>
-          <a:lstStyle/>
-          <a:p>
-            <a:r>
-              <a:rPr lang="en-US" b="1" dirty="0" smtClean="0"/>
-              <a:t>How do we talk to Ports? Do I/O?</a:t>
-            </a:r>
-            <a:endParaRPr lang="en-US" dirty="0"/>
-          </a:p>
-        </p:txBody>
-      </p:sp>
-      <p:sp>
-        <p:nvSpPr>
-          <p:cNvPr id="3" name="Content Placeholder 2"/>
-          <p:cNvSpPr>
-            <a:spLocks noGrp="1"/>
-          </p:cNvSpPr>
-          <p:nvPr>
-            <p:ph idx="1"/>
-          </p:nvPr>
-        </p:nvSpPr>
-        <p:spPr>
-          <a:xfrm>
-            <a:off x="395177" y="669852"/>
-            <a:ext cx="8493642" cy="4724400"/>
-          </a:xfrm>
-        </p:spPr>
-        <p:txBody>
-          <a:bodyPr/>
-          <a:lstStyle/>
-          <a:p>
-            <a:r>
-              <a:rPr lang="en-US" sz="2000" dirty="0" smtClean="0">
-                <a:solidFill>
-                  <a:schemeClr val="accent2"/>
-                </a:solidFill>
-              </a:rPr>
-              <a:t>Port-Mapped </a:t>
-            </a:r>
-            <a:r>
-              <a:rPr lang="en-US" sz="2000" dirty="0">
-                <a:solidFill>
-                  <a:schemeClr val="accent2"/>
-                </a:solidFill>
-              </a:rPr>
-              <a:t>I/O </a:t>
-            </a:r>
-            <a:r>
-              <a:rPr lang="en-US" sz="2000" dirty="0" smtClean="0">
-                <a:solidFill>
-                  <a:schemeClr val="accent2"/>
-                </a:solidFill>
-              </a:rPr>
-              <a:t>   </a:t>
-            </a:r>
-            <a:r>
-              <a:rPr lang="en-US" sz="2000" dirty="0" smtClean="0"/>
-              <a:t>(Intel)</a:t>
-            </a:r>
-          </a:p>
-          <a:p>
-            <a:pPr lvl="1"/>
-            <a:r>
-              <a:rPr lang="en-US" sz="2000" dirty="0" smtClean="0"/>
-              <a:t>I/O and memory have their own separate address space</a:t>
-            </a:r>
-          </a:p>
-          <a:p>
-            <a:pPr lvl="1"/>
-            <a:r>
-              <a:rPr lang="en-US" sz="2000" dirty="0" smtClean="0"/>
-              <a:t>Advantage</a:t>
-            </a:r>
-          </a:p>
-          <a:p>
-            <a:pPr lvl="2"/>
-            <a:r>
-              <a:rPr lang="en-US" sz="1800" dirty="0" smtClean="0"/>
-              <a:t>Don't </a:t>
-            </a:r>
-            <a:r>
-              <a:rPr lang="en-US" sz="1800" dirty="0"/>
-              <a:t>lose memory for IO.</a:t>
-            </a:r>
-          </a:p>
-          <a:p>
-            <a:pPr lvl="2"/>
-            <a:r>
-              <a:rPr lang="en-US" sz="1800" dirty="0" smtClean="0"/>
-              <a:t>Protects </a:t>
-            </a:r>
-            <a:r>
-              <a:rPr lang="en-US" sz="1800" dirty="0"/>
-              <a:t>coder from mistakes.</a:t>
-            </a:r>
-          </a:p>
-          <a:p>
-            <a:pPr lvl="1"/>
-            <a:r>
-              <a:rPr lang="en-US" sz="2200" dirty="0" smtClean="0"/>
-              <a:t>Disadvantage</a:t>
-            </a:r>
-          </a:p>
-          <a:p>
-            <a:pPr lvl="2"/>
-            <a:r>
-              <a:rPr lang="en-US" sz="1800" dirty="0" smtClean="0"/>
-              <a:t>Need More Instructions (like In/Out)</a:t>
-            </a:r>
-          </a:p>
-          <a:p>
-            <a:pPr lvl="2"/>
-            <a:r>
-              <a:rPr lang="en-US" sz="1800" dirty="0" smtClean="0"/>
-              <a:t>More restrictive addressing modes</a:t>
-            </a:r>
-          </a:p>
-          <a:p>
-            <a:pPr lvl="1"/>
-            <a:r>
-              <a:rPr lang="en-US" sz="2200" dirty="0" smtClean="0"/>
-              <a:t>How to use</a:t>
-            </a:r>
-          </a:p>
-          <a:p>
-            <a:pPr lvl="2"/>
-            <a:r>
-              <a:rPr lang="en-US" sz="1800" dirty="0" smtClean="0"/>
-              <a:t>Out #0x55, &amp;PORT1</a:t>
-            </a:r>
-          </a:p>
-          <a:p>
-            <a:pPr lvl="1"/>
-            <a:r>
-              <a:rPr lang="en-US" sz="2200" dirty="0" smtClean="0">
-                <a:solidFill>
-                  <a:schemeClr val="accent2"/>
-                </a:solidFill>
-              </a:rPr>
-              <a:t>Does Port-Mapped cheat?</a:t>
-            </a:r>
-          </a:p>
-          <a:p>
-            <a:pPr lvl="1"/>
-            <a:endParaRPr lang="en-US" sz="2200" dirty="0"/>
-          </a:p>
-          <a:p>
-            <a:endParaRPr lang="en-US" sz="2000" dirty="0">
-              <a:solidFill>
-                <a:schemeClr val="accent2"/>
-              </a:solidFill>
-            </a:endParaRPr>
-          </a:p>
-        </p:txBody>
-      </p:sp>
-    </p:spTree>
-    <p:extLst>
-      <p:ext uri="{BB962C8B-B14F-4D97-AF65-F5344CB8AC3E}">
-        <p14:creationId xmlns:p14="http://schemas.microsoft.com/office/powerpoint/2010/main" val="645359394"/>
-      </p:ext>
-    </p:extLst>
-  </p:cSld>
-  <p:clrMapOvr>
-    <a:masterClrMapping/>
-  </p:clrMapOvr>
-  <p:timing>
-    <p:tnLst>
-      <p:par>
-        <p:cTn id="1" dur="indefinite" restart="never" nodeType="tmRoot"/>
-      </p:par>
-    </p:tnLst>
-  </p:timing>
-</p:sld>
-</file>
-
-<file path=ppt/slides/slide11.xml><?xml version="1.0" encoding="utf-8"?>
-<p:sld xmlns:a="http://schemas.openxmlformats.org/drawingml/2006/main" xmlns:r="http://schemas.openxmlformats.org/officeDocument/2006/relationships" xmlns:p="http://schemas.openxmlformats.org/presentationml/2006/main">
-  <p:cSld>
-    <p:spTree>
-      <p:nvGrpSpPr>
-        <p:cNvPr id="1" name=""/>
-        <p:cNvGrpSpPr/>
-        <p:nvPr/>
-      </p:nvGrpSpPr>
-      <p:grpSpPr>
-        <a:xfrm>
-          <a:off x="0" y="0"/>
-          <a:ext cx="0" cy="0"/>
-          <a:chOff x="0" y="0"/>
-          <a:chExt cx="0" cy="0"/>
-        </a:xfrm>
-      </p:grpSpPr>
-      <p:sp>
-        <p:nvSpPr>
-          <p:cNvPr id="2" name="Title 1"/>
-          <p:cNvSpPr>
-            <a:spLocks noGrp="1"/>
-          </p:cNvSpPr>
-          <p:nvPr>
-            <p:ph type="title"/>
-          </p:nvPr>
-        </p:nvSpPr>
-        <p:spPr/>
-        <p:txBody>
-          <a:bodyPr/>
-          <a:lstStyle/>
-          <a:p>
-            <a:r>
-              <a:rPr lang="en-US" b="1" dirty="0"/>
-              <a:t>General Purpose Input Output (GPIO)</a:t>
-            </a:r>
-            <a:endParaRPr lang="en-US" dirty="0"/>
-          </a:p>
-        </p:txBody>
-      </p:sp>
-      <p:sp>
-        <p:nvSpPr>
-          <p:cNvPr id="3" name="Content Placeholder 2"/>
-          <p:cNvSpPr>
-            <a:spLocks noGrp="1"/>
-          </p:cNvSpPr>
-          <p:nvPr>
-            <p:ph idx="1"/>
-          </p:nvPr>
-        </p:nvSpPr>
-        <p:spPr>
-          <a:xfrm>
-            <a:off x="395177" y="669852"/>
-            <a:ext cx="8493642" cy="4724400"/>
-          </a:xfrm>
-        </p:spPr>
-        <p:txBody>
-          <a:bodyPr/>
-          <a:lstStyle/>
-          <a:p>
-            <a:r>
-              <a:rPr lang="en-US" sz="2000" dirty="0">
-                <a:solidFill>
-                  <a:schemeClr val="accent2"/>
-                </a:solidFill>
-              </a:rPr>
-              <a:t>The registers used to configure GPIO are </a:t>
-            </a:r>
-            <a:r>
-              <a:rPr lang="en-US" sz="2000" dirty="0" err="1">
-                <a:solidFill>
-                  <a:schemeClr val="accent2"/>
-                </a:solidFill>
-              </a:rPr>
-              <a:t>PxDIR</a:t>
-            </a:r>
-            <a:r>
-              <a:rPr lang="en-US" sz="2000" dirty="0" smtClean="0">
-                <a:solidFill>
-                  <a:schemeClr val="accent2"/>
-                </a:solidFill>
-              </a:rPr>
-              <a:t>, </a:t>
-            </a:r>
-            <a:r>
-              <a:rPr lang="en-US" sz="2000" dirty="0" err="1" smtClean="0">
-                <a:solidFill>
-                  <a:schemeClr val="accent2"/>
-                </a:solidFill>
-              </a:rPr>
-              <a:t>PxREN</a:t>
-            </a:r>
-            <a:r>
-              <a:rPr lang="en-US" sz="2000" dirty="0" smtClean="0">
-                <a:solidFill>
-                  <a:schemeClr val="accent2"/>
-                </a:solidFill>
-              </a:rPr>
-              <a:t>, </a:t>
-            </a:r>
-            <a:r>
-              <a:rPr lang="en-US" sz="2000" dirty="0" err="1">
-                <a:solidFill>
-                  <a:schemeClr val="accent2"/>
-                </a:solidFill>
-              </a:rPr>
-              <a:t>PxOUT</a:t>
-            </a:r>
-            <a:r>
-              <a:rPr lang="en-US" sz="2000" dirty="0">
-                <a:solidFill>
-                  <a:schemeClr val="accent2"/>
-                </a:solidFill>
-              </a:rPr>
-              <a:t>, and </a:t>
-            </a:r>
-            <a:r>
-              <a:rPr lang="en-US" sz="2000" dirty="0" err="1" smtClean="0">
-                <a:solidFill>
-                  <a:schemeClr val="accent2"/>
-                </a:solidFill>
-              </a:rPr>
-              <a:t>PxIN</a:t>
-            </a:r>
-            <a:endParaRPr lang="en-US" sz="2000" dirty="0" smtClean="0">
-              <a:solidFill>
-                <a:schemeClr val="accent2"/>
-              </a:solidFill>
-            </a:endParaRPr>
-          </a:p>
-          <a:p>
-            <a:pPr lvl="1"/>
-            <a:r>
-              <a:rPr lang="en-US" sz="1800" dirty="0" err="1" smtClean="0"/>
-              <a:t>PxDIR</a:t>
-            </a:r>
-            <a:r>
-              <a:rPr lang="en-US" sz="1800" dirty="0" smtClean="0"/>
-              <a:t> </a:t>
-            </a:r>
-            <a:r>
-              <a:rPr lang="en-US" sz="1800" dirty="0"/>
-              <a:t>configures which pins are input and which pins are output </a:t>
-            </a:r>
-          </a:p>
-          <a:p>
-            <a:pPr lvl="2"/>
-            <a:r>
-              <a:rPr lang="en-US" sz="1400" dirty="0" smtClean="0"/>
-              <a:t>1 </a:t>
-            </a:r>
-            <a:r>
-              <a:rPr lang="en-US" sz="1400" dirty="0"/>
-              <a:t>corresponds to output, 0 to input</a:t>
-            </a:r>
-          </a:p>
-          <a:p>
-            <a:pPr lvl="1"/>
-            <a:r>
-              <a:rPr lang="en-US" sz="1800" dirty="0" err="1"/>
-              <a:t>PxREN</a:t>
-            </a:r>
-            <a:r>
-              <a:rPr lang="en-US" sz="1800" dirty="0"/>
-              <a:t> controls pull up / pull down resistors to avoid floating inputs</a:t>
-            </a:r>
-            <a:r>
-              <a:rPr lang="en-US" sz="1800" dirty="0" smtClean="0"/>
-              <a:t>.</a:t>
-            </a:r>
-          </a:p>
-          <a:p>
-            <a:pPr lvl="1"/>
-            <a:r>
-              <a:rPr lang="en-US" sz="1800" dirty="0" smtClean="0"/>
-              <a:t>Writing </a:t>
-            </a:r>
-            <a:r>
-              <a:rPr lang="en-US" sz="1800" dirty="0"/>
-              <a:t>to </a:t>
-            </a:r>
-            <a:r>
-              <a:rPr lang="en-US" sz="1800" dirty="0" err="1"/>
-              <a:t>PxOUT</a:t>
-            </a:r>
-            <a:r>
-              <a:rPr lang="en-US" sz="1800" dirty="0"/>
-              <a:t> controls the output of each pin</a:t>
-            </a:r>
-          </a:p>
-          <a:p>
-            <a:pPr lvl="1"/>
-            <a:r>
-              <a:rPr lang="en-US" sz="1800" dirty="0" err="1" smtClean="0"/>
-              <a:t>PxIN</a:t>
-            </a:r>
-            <a:r>
-              <a:rPr lang="en-US" sz="1800" dirty="0" smtClean="0"/>
-              <a:t> </a:t>
-            </a:r>
-            <a:r>
-              <a:rPr lang="en-US" sz="1800" dirty="0"/>
-              <a:t>allows you to read the values on these </a:t>
-            </a:r>
-            <a:r>
-              <a:rPr lang="en-US" sz="1800" dirty="0" smtClean="0"/>
-              <a:t>pins</a:t>
-            </a:r>
-          </a:p>
-          <a:p>
-            <a:pPr lvl="1"/>
-            <a:endParaRPr lang="en-US" sz="1800" dirty="0"/>
-          </a:p>
-          <a:p>
-            <a:pPr marL="0" indent="0">
-              <a:buNone/>
-            </a:pPr>
-            <a:r>
-              <a:rPr lang="en-US" sz="1800" dirty="0"/>
-              <a:t>Let's write a program that controls the onboard LEDs with the onboard push button</a:t>
-            </a:r>
-            <a:r>
-              <a:rPr lang="en-US" sz="1800" dirty="0">
-                <a:solidFill>
-                  <a:schemeClr val="accent2"/>
-                </a:solidFill>
-                <a:latin typeface="Courier New" pitchFamily="49" charset="0"/>
-                <a:cs typeface="Courier New" pitchFamily="49" charset="0"/>
-              </a:rPr>
-              <a:t>  </a:t>
-            </a:r>
-          </a:p>
-          <a:p>
-            <a:pPr marL="0" indent="0">
-              <a:buNone/>
-            </a:pPr>
-            <a:endParaRPr lang="en-US" sz="1400" dirty="0">
-              <a:solidFill>
-                <a:schemeClr val="accent2"/>
-              </a:solidFill>
-              <a:latin typeface="Courier New" pitchFamily="49" charset="0"/>
-              <a:cs typeface="Courier New" pitchFamily="49" charset="0"/>
-            </a:endParaRPr>
-          </a:p>
-          <a:p>
-            <a:pPr marL="0" indent="0">
-              <a:buNone/>
-            </a:pPr>
-            <a:r>
-              <a:rPr lang="en-US" sz="1400" dirty="0">
-                <a:solidFill>
-                  <a:schemeClr val="accent2"/>
-                </a:solidFill>
-                <a:latin typeface="Courier New" pitchFamily="49" charset="0"/>
-                <a:cs typeface="Courier New" pitchFamily="49" charset="0"/>
-              </a:rPr>
-              <a:t>              </a:t>
-            </a:r>
-            <a:r>
-              <a:rPr lang="en-US" sz="1400" dirty="0" err="1">
-                <a:solidFill>
-                  <a:schemeClr val="accent2"/>
-                </a:solidFill>
-                <a:latin typeface="Courier New" pitchFamily="49" charset="0"/>
-                <a:cs typeface="Courier New" pitchFamily="49" charset="0"/>
-              </a:rPr>
-              <a:t>bis.b</a:t>
-            </a:r>
-            <a:r>
-              <a:rPr lang="en-US" sz="1400" dirty="0">
-                <a:solidFill>
-                  <a:schemeClr val="accent2"/>
-                </a:solidFill>
-                <a:latin typeface="Courier New" pitchFamily="49" charset="0"/>
-                <a:cs typeface="Courier New" pitchFamily="49" charset="0"/>
-              </a:rPr>
-              <a:t>  #BIT0|BIT6, &amp;P1DIR</a:t>
-            </a:r>
-          </a:p>
-          <a:p>
-            <a:pPr marL="0" indent="0">
-              <a:buNone/>
-            </a:pPr>
-            <a:r>
-              <a:rPr lang="en-US" sz="1400" dirty="0">
-                <a:solidFill>
-                  <a:schemeClr val="accent2"/>
-                </a:solidFill>
-                <a:latin typeface="Courier New" pitchFamily="49" charset="0"/>
-                <a:cs typeface="Courier New" pitchFamily="49" charset="0"/>
-              </a:rPr>
-              <a:t>              </a:t>
-            </a:r>
-            <a:r>
-              <a:rPr lang="en-US" sz="1400" dirty="0" err="1">
-                <a:solidFill>
-                  <a:schemeClr val="accent2"/>
-                </a:solidFill>
-                <a:latin typeface="Courier New" pitchFamily="49" charset="0"/>
-                <a:cs typeface="Courier New" pitchFamily="49" charset="0"/>
-              </a:rPr>
-              <a:t>bic.b</a:t>
-            </a:r>
-            <a:r>
-              <a:rPr lang="en-US" sz="1400" dirty="0">
-                <a:solidFill>
-                  <a:schemeClr val="accent2"/>
-                </a:solidFill>
-                <a:latin typeface="Courier New" pitchFamily="49" charset="0"/>
-                <a:cs typeface="Courier New" pitchFamily="49" charset="0"/>
-              </a:rPr>
-              <a:t>  #BIT3, &amp;P1DIR</a:t>
-            </a:r>
-          </a:p>
-          <a:p>
-            <a:pPr marL="0" indent="0">
-              <a:buNone/>
-            </a:pPr>
-            <a:endParaRPr lang="en-US" sz="1400" dirty="0">
-              <a:solidFill>
-                <a:schemeClr val="accent2"/>
-              </a:solidFill>
-              <a:latin typeface="Courier New" pitchFamily="49" charset="0"/>
-              <a:cs typeface="Courier New" pitchFamily="49" charset="0"/>
-            </a:endParaRPr>
-          </a:p>
-          <a:p>
-            <a:pPr marL="0" indent="0">
-              <a:buNone/>
-            </a:pPr>
-            <a:r>
-              <a:rPr lang="en-US" sz="1400" dirty="0" err="1">
-                <a:solidFill>
-                  <a:schemeClr val="accent2"/>
-                </a:solidFill>
-                <a:latin typeface="Courier New" pitchFamily="49" charset="0"/>
-                <a:cs typeface="Courier New" pitchFamily="49" charset="0"/>
-              </a:rPr>
-              <a:t>check_btn</a:t>
-            </a:r>
-            <a:r>
-              <a:rPr lang="en-US" sz="1400" dirty="0">
-                <a:solidFill>
-                  <a:schemeClr val="accent2"/>
-                </a:solidFill>
-                <a:latin typeface="Courier New" pitchFamily="49" charset="0"/>
-                <a:cs typeface="Courier New" pitchFamily="49" charset="0"/>
-              </a:rPr>
-              <a:t>:    </a:t>
-            </a:r>
-            <a:r>
-              <a:rPr lang="en-US" sz="1400" dirty="0" err="1">
-                <a:solidFill>
-                  <a:schemeClr val="accent2"/>
-                </a:solidFill>
-                <a:latin typeface="Courier New" pitchFamily="49" charset="0"/>
-                <a:cs typeface="Courier New" pitchFamily="49" charset="0"/>
-              </a:rPr>
-              <a:t>bit.b</a:t>
-            </a:r>
-            <a:r>
-              <a:rPr lang="en-US" sz="1400" dirty="0">
-                <a:solidFill>
-                  <a:schemeClr val="accent2"/>
-                </a:solidFill>
-                <a:latin typeface="Courier New" pitchFamily="49" charset="0"/>
-                <a:cs typeface="Courier New" pitchFamily="49" charset="0"/>
-              </a:rPr>
-              <a:t>  #BIT3, &amp;</a:t>
-            </a:r>
-            <a:r>
-              <a:rPr lang="en-US" sz="1400" dirty="0" smtClean="0">
-                <a:solidFill>
-                  <a:schemeClr val="accent2"/>
-                </a:solidFill>
-                <a:latin typeface="Courier New" pitchFamily="49" charset="0"/>
-                <a:cs typeface="Courier New" pitchFamily="49" charset="0"/>
-              </a:rPr>
-              <a:t>P1IN</a:t>
-            </a:r>
-            <a:r>
-              <a:rPr lang="en-US" sz="1400" dirty="0">
-                <a:solidFill>
-                  <a:schemeClr val="accent2"/>
-                </a:solidFill>
-                <a:latin typeface="Courier New" pitchFamily="49" charset="0"/>
-                <a:cs typeface="Courier New" pitchFamily="49" charset="0"/>
-              </a:rPr>
-              <a:t> </a:t>
-            </a:r>
-            <a:r>
-              <a:rPr lang="en-US" sz="1400" dirty="0" smtClean="0">
-                <a:solidFill>
-                  <a:schemeClr val="accent2"/>
-                </a:solidFill>
-                <a:latin typeface="Courier New" pitchFamily="49" charset="0"/>
-                <a:cs typeface="Courier New" pitchFamily="49" charset="0"/>
-              </a:rPr>
-              <a:t>          </a:t>
-            </a:r>
-            <a:r>
-              <a:rPr lang="en-US" sz="1400" dirty="0" smtClean="0">
-                <a:solidFill>
-                  <a:srgbClr val="00B050"/>
-                </a:solidFill>
-                <a:latin typeface="Courier New" pitchFamily="49" charset="0"/>
-                <a:cs typeface="Courier New" pitchFamily="49" charset="0"/>
-              </a:rPr>
-              <a:t>;</a:t>
-            </a:r>
-            <a:r>
-              <a:rPr lang="en-US" sz="1400" dirty="0">
-                <a:solidFill>
-                  <a:srgbClr val="00B050"/>
-                </a:solidFill>
-                <a:latin typeface="Courier New" pitchFamily="49" charset="0"/>
-                <a:cs typeface="Courier New" pitchFamily="49" charset="0"/>
-              </a:rPr>
-              <a:t>push button is LOW on push</a:t>
-            </a:r>
-            <a:endParaRPr lang="en-US" sz="1400" dirty="0">
-              <a:solidFill>
-                <a:schemeClr val="accent2"/>
-              </a:solidFill>
-              <a:latin typeface="Courier New" pitchFamily="49" charset="0"/>
-              <a:cs typeface="Courier New" pitchFamily="49" charset="0"/>
-            </a:endParaRPr>
-          </a:p>
-          <a:p>
-            <a:pPr marL="0" indent="0">
-              <a:buNone/>
-            </a:pPr>
-            <a:r>
-              <a:rPr lang="en-US" sz="1400" dirty="0">
-                <a:solidFill>
-                  <a:schemeClr val="accent2"/>
-                </a:solidFill>
-                <a:latin typeface="Courier New" pitchFamily="49" charset="0"/>
-                <a:cs typeface="Courier New" pitchFamily="49" charset="0"/>
-              </a:rPr>
-              <a:t>              </a:t>
-            </a:r>
-            <a:r>
-              <a:rPr lang="en-US" sz="1400" dirty="0" err="1">
-                <a:solidFill>
-                  <a:schemeClr val="accent2"/>
-                </a:solidFill>
-                <a:latin typeface="Courier New" pitchFamily="49" charset="0"/>
-                <a:cs typeface="Courier New" pitchFamily="49" charset="0"/>
-              </a:rPr>
-              <a:t>jz</a:t>
-            </a:r>
-            <a:r>
-              <a:rPr lang="en-US" sz="1400" dirty="0">
-                <a:solidFill>
-                  <a:schemeClr val="accent2"/>
-                </a:solidFill>
-                <a:latin typeface="Courier New" pitchFamily="49" charset="0"/>
-                <a:cs typeface="Courier New" pitchFamily="49" charset="0"/>
-              </a:rPr>
-              <a:t>     </a:t>
-            </a:r>
-            <a:r>
-              <a:rPr lang="en-US" sz="1400" dirty="0" err="1">
-                <a:solidFill>
-                  <a:schemeClr val="accent2"/>
-                </a:solidFill>
-                <a:latin typeface="Courier New" pitchFamily="49" charset="0"/>
-                <a:cs typeface="Courier New" pitchFamily="49" charset="0"/>
-              </a:rPr>
-              <a:t>set_lights</a:t>
-            </a:r>
-            <a:endParaRPr lang="en-US" sz="1400" dirty="0">
-              <a:solidFill>
-                <a:schemeClr val="accent2"/>
-              </a:solidFill>
-              <a:latin typeface="Courier New" pitchFamily="49" charset="0"/>
-              <a:cs typeface="Courier New" pitchFamily="49" charset="0"/>
-            </a:endParaRPr>
-          </a:p>
-          <a:p>
-            <a:pPr marL="0" indent="0">
-              <a:buNone/>
-            </a:pPr>
-            <a:r>
-              <a:rPr lang="en-US" sz="1400" dirty="0">
-                <a:solidFill>
-                  <a:schemeClr val="accent2"/>
-                </a:solidFill>
-                <a:latin typeface="Courier New" pitchFamily="49" charset="0"/>
-                <a:cs typeface="Courier New" pitchFamily="49" charset="0"/>
-              </a:rPr>
-              <a:t>              </a:t>
-            </a:r>
-            <a:r>
-              <a:rPr lang="en-US" sz="1400" dirty="0" err="1">
-                <a:solidFill>
-                  <a:schemeClr val="accent2"/>
-                </a:solidFill>
-                <a:latin typeface="Courier New" pitchFamily="49" charset="0"/>
-                <a:cs typeface="Courier New" pitchFamily="49" charset="0"/>
-              </a:rPr>
-              <a:t>bic.b</a:t>
-            </a:r>
-            <a:r>
-              <a:rPr lang="en-US" sz="1400" dirty="0">
-                <a:solidFill>
-                  <a:schemeClr val="accent2"/>
-                </a:solidFill>
-                <a:latin typeface="Courier New" pitchFamily="49" charset="0"/>
-                <a:cs typeface="Courier New" pitchFamily="49" charset="0"/>
-              </a:rPr>
-              <a:t>  #BIT0|BIT6, &amp;P1OUT</a:t>
-            </a:r>
-          </a:p>
-          <a:p>
-            <a:pPr marL="0" indent="0">
-              <a:buNone/>
-            </a:pPr>
-            <a:r>
-              <a:rPr lang="en-US" sz="1400" dirty="0">
-                <a:solidFill>
-                  <a:schemeClr val="accent2"/>
-                </a:solidFill>
-                <a:latin typeface="Courier New" pitchFamily="49" charset="0"/>
-                <a:cs typeface="Courier New" pitchFamily="49" charset="0"/>
-              </a:rPr>
-              <a:t>              </a:t>
-            </a:r>
-            <a:r>
-              <a:rPr lang="en-US" sz="1400" dirty="0" err="1">
-                <a:solidFill>
-                  <a:schemeClr val="accent2"/>
-                </a:solidFill>
-                <a:latin typeface="Courier New" pitchFamily="49" charset="0"/>
-                <a:cs typeface="Courier New" pitchFamily="49" charset="0"/>
-              </a:rPr>
-              <a:t>jmp</a:t>
-            </a:r>
-            <a:r>
-              <a:rPr lang="en-US" sz="1400" dirty="0">
-                <a:solidFill>
-                  <a:schemeClr val="accent2"/>
-                </a:solidFill>
-                <a:latin typeface="Courier New" pitchFamily="49" charset="0"/>
-                <a:cs typeface="Courier New" pitchFamily="49" charset="0"/>
-              </a:rPr>
-              <a:t>    </a:t>
-            </a:r>
-            <a:r>
-              <a:rPr lang="en-US" sz="1400" dirty="0" err="1">
-                <a:solidFill>
-                  <a:schemeClr val="accent2"/>
-                </a:solidFill>
-                <a:latin typeface="Courier New" pitchFamily="49" charset="0"/>
-                <a:cs typeface="Courier New" pitchFamily="49" charset="0"/>
-              </a:rPr>
-              <a:t>check_btn</a:t>
-            </a:r>
-            <a:endParaRPr lang="en-US" sz="1400" dirty="0">
-              <a:solidFill>
-                <a:schemeClr val="accent2"/>
-              </a:solidFill>
-              <a:latin typeface="Courier New" pitchFamily="49" charset="0"/>
-              <a:cs typeface="Courier New" pitchFamily="49" charset="0"/>
-            </a:endParaRPr>
-          </a:p>
-          <a:p>
-            <a:pPr marL="0" indent="0">
-              <a:buNone/>
-            </a:pPr>
-            <a:r>
-              <a:rPr lang="en-US" sz="1400" dirty="0" err="1">
-                <a:solidFill>
-                  <a:schemeClr val="accent2"/>
-                </a:solidFill>
-                <a:latin typeface="Courier New" pitchFamily="49" charset="0"/>
-                <a:cs typeface="Courier New" pitchFamily="49" charset="0"/>
-              </a:rPr>
-              <a:t>set_lights</a:t>
-            </a:r>
-            <a:r>
-              <a:rPr lang="en-US" sz="1400" dirty="0">
-                <a:solidFill>
-                  <a:schemeClr val="accent2"/>
-                </a:solidFill>
-                <a:latin typeface="Courier New" pitchFamily="49" charset="0"/>
-                <a:cs typeface="Courier New" pitchFamily="49" charset="0"/>
-              </a:rPr>
-              <a:t>:   </a:t>
-            </a:r>
-            <a:r>
-              <a:rPr lang="en-US" sz="1400" dirty="0" err="1">
-                <a:solidFill>
-                  <a:schemeClr val="accent2"/>
-                </a:solidFill>
-                <a:latin typeface="Courier New" pitchFamily="49" charset="0"/>
-                <a:cs typeface="Courier New" pitchFamily="49" charset="0"/>
-              </a:rPr>
-              <a:t>bis.b</a:t>
-            </a:r>
-            <a:r>
-              <a:rPr lang="en-US" sz="1400" dirty="0">
-                <a:solidFill>
-                  <a:schemeClr val="accent2"/>
-                </a:solidFill>
-                <a:latin typeface="Courier New" pitchFamily="49" charset="0"/>
-                <a:cs typeface="Courier New" pitchFamily="49" charset="0"/>
-              </a:rPr>
-              <a:t>  #BIT0|BIT6, &amp;P1OUT</a:t>
-            </a:r>
-          </a:p>
-          <a:p>
-            <a:pPr marL="0" indent="0">
-              <a:buNone/>
-            </a:pPr>
-            <a:r>
-              <a:rPr lang="en-US" sz="1400" dirty="0">
-                <a:solidFill>
-                  <a:schemeClr val="accent2"/>
-                </a:solidFill>
-                <a:latin typeface="Courier New" pitchFamily="49" charset="0"/>
-                <a:cs typeface="Courier New" pitchFamily="49" charset="0"/>
-              </a:rPr>
-              <a:t>              </a:t>
-            </a:r>
-            <a:r>
-              <a:rPr lang="en-US" sz="1400" dirty="0" err="1">
-                <a:solidFill>
-                  <a:schemeClr val="accent2"/>
-                </a:solidFill>
-                <a:latin typeface="Courier New" pitchFamily="49" charset="0"/>
-                <a:cs typeface="Courier New" pitchFamily="49" charset="0"/>
-              </a:rPr>
-              <a:t>jmp</a:t>
-            </a:r>
-            <a:r>
-              <a:rPr lang="en-US" sz="1400" dirty="0">
-                <a:solidFill>
-                  <a:schemeClr val="accent2"/>
-                </a:solidFill>
-                <a:latin typeface="Courier New" pitchFamily="49" charset="0"/>
-                <a:cs typeface="Courier New" pitchFamily="49" charset="0"/>
-              </a:rPr>
-              <a:t>    </a:t>
-            </a:r>
-            <a:r>
-              <a:rPr lang="en-US" sz="1400" dirty="0" err="1">
-                <a:solidFill>
-                  <a:schemeClr val="accent2"/>
-                </a:solidFill>
-                <a:latin typeface="Courier New" pitchFamily="49" charset="0"/>
-                <a:cs typeface="Courier New" pitchFamily="49" charset="0"/>
-              </a:rPr>
-              <a:t>check_btn</a:t>
-            </a:r>
-            <a:endParaRPr lang="en-US" sz="1400" dirty="0">
-              <a:solidFill>
-                <a:schemeClr val="accent2"/>
-              </a:solidFill>
-              <a:latin typeface="Courier New" pitchFamily="49" charset="0"/>
-              <a:cs typeface="Courier New" pitchFamily="49" charset="0"/>
-            </a:endParaRPr>
-          </a:p>
-          <a:p>
-            <a:pPr marL="0" indent="0">
-              <a:buNone/>
-            </a:pPr>
-            <a:endParaRPr lang="en-US" sz="1400" dirty="0">
-              <a:solidFill>
-                <a:schemeClr val="accent2"/>
-              </a:solidFill>
-              <a:latin typeface="Courier New" pitchFamily="49" charset="0"/>
-              <a:cs typeface="Courier New" pitchFamily="49" charset="0"/>
-            </a:endParaRPr>
-          </a:p>
-          <a:p>
-            <a:pPr marL="0" indent="0">
-              <a:buNone/>
-            </a:pPr>
-            <a:endParaRPr lang="en-US" sz="1400" dirty="0">
-              <a:solidFill>
-                <a:schemeClr val="accent2"/>
-              </a:solidFill>
-              <a:latin typeface="Courier New" pitchFamily="49" charset="0"/>
-              <a:cs typeface="Courier New" pitchFamily="49" charset="0"/>
-            </a:endParaRPr>
-          </a:p>
-          <a:p>
-            <a:pPr marL="0" indent="0">
-              <a:buNone/>
-            </a:pPr>
-            <a:r>
-              <a:rPr lang="en-US" sz="2000" dirty="0"/>
-              <a:t>Any problem with this code?</a:t>
-            </a:r>
-            <a:endParaRPr lang="en-US" sz="2000" dirty="0">
-              <a:solidFill>
-                <a:schemeClr val="accent2"/>
-              </a:solidFill>
-              <a:latin typeface="Courier New" pitchFamily="49" charset="0"/>
-              <a:cs typeface="Courier New" pitchFamily="49" charset="0"/>
-            </a:endParaRPr>
-          </a:p>
-          <a:p>
-            <a:pPr lvl="1"/>
-            <a:endParaRPr lang="en-US" sz="1600" dirty="0"/>
-          </a:p>
-          <a:p>
-            <a:pPr lvl="1"/>
-            <a:endParaRPr lang="en-US" sz="2200" dirty="0"/>
-          </a:p>
-          <a:p>
-            <a:endParaRPr lang="en-US" sz="2000" dirty="0">
-              <a:solidFill>
-                <a:schemeClr val="accent2"/>
-              </a:solidFill>
-            </a:endParaRPr>
-          </a:p>
-        </p:txBody>
-      </p:sp>
-      <p:sp>
-        <p:nvSpPr>
-          <p:cNvPr id="4" name="TextBox 3"/>
-          <p:cNvSpPr txBox="1"/>
-          <p:nvPr/>
-        </p:nvSpPr>
-        <p:spPr>
-          <a:xfrm>
-            <a:off x="5813949" y="1940673"/>
-            <a:ext cx="3616657" cy="1015663"/>
-          </a:xfrm>
-          <a:prstGeom prst="rect">
-            <a:avLst/>
-          </a:prstGeom>
-          <a:noFill/>
-        </p:spPr>
-        <p:txBody>
-          <a:bodyPr wrap="square" rtlCol="0">
-            <a:spAutoFit/>
-          </a:bodyPr>
-          <a:lstStyle/>
-          <a:p>
-            <a:r>
-              <a:rPr lang="en-US" dirty="0" smtClean="0"/>
-              <a:t>Family Users Guide p 328</a:t>
-            </a:r>
-          </a:p>
-          <a:p>
-            <a:r>
-              <a:rPr lang="en-US" dirty="0" smtClean="0"/>
-              <a:t>Blue Book pp 38</a:t>
-            </a:r>
-          </a:p>
-        </p:txBody>
-      </p:sp>
-    </p:spTree>
-    <p:extLst>
-      <p:ext uri="{BB962C8B-B14F-4D97-AF65-F5344CB8AC3E}">
-        <p14:creationId xmlns:p14="http://schemas.microsoft.com/office/powerpoint/2010/main" val="2697282666"/>
-      </p:ext>
-    </p:extLst>
-  </p:cSld>
-  <p:clrMapOvr>
-    <a:masterClrMapping/>
-  </p:clrMapOvr>
-  <p:timing>
-    <p:tnLst>
-      <p:par>
-        <p:cTn id="1" dur="indefinite" restart="never" nodeType="tmRoot">
-          <p:childTnLst>
-            <p:seq concurrent="1" nextAc="seek">
-              <p:cTn id="2" dur="indefinite" nodeType="mainSeq">
-                <p:childTnLst>
-                  <p:par>
-                    <p:cTn id="3" fill="hold">
-                      <p:stCondLst>
-                        <p:cond delay="indefinite"/>
-                      </p:stCondLst>
-                      <p:childTnLst>
-                        <p:par>
-                          <p:cTn id="4" fill="hold">
-                            <p:stCondLst>
-                              <p:cond delay="0"/>
-                            </p:stCondLst>
-                            <p:childTnLst>
-                              <p:par>
-                                <p:cTn id="5" presetID="1" presetClass="entr" presetSubtype="0" fill="hold" grpId="0" nodeType="clickEffect">
-                                  <p:stCondLst>
-                                    <p:cond delay="0"/>
-                                  </p:stCondLst>
-                                  <p:childTnLst>
-                                    <p:set>
-                                      <p:cBhvr>
-                                        <p:cTn id="6" dur="1" fill="hold">
-                                          <p:stCondLst>
-                                            <p:cond delay="0"/>
-                                          </p:stCondLst>
-                                        </p:cTn>
-                                        <p:tgtEl>
-                                          <p:spTgt spid="4"/>
-                                        </p:tgtEl>
-                                        <p:attrNameLst>
-                                          <p:attrName>style.visibility</p:attrName>
-                                        </p:attrNameLst>
-                                      </p:cBhvr>
-                                      <p:to>
-                                        <p:strVal val="visible"/>
-                                      </p:to>
-                                    </p:set>
-                                  </p:childTnLst>
-                                </p:cTn>
-                              </p:par>
-                            </p:childTnLst>
-                          </p:cTn>
-                        </p:par>
-                      </p:childTnLst>
-                    </p:cTn>
-                  </p:par>
-                </p:childTnLst>
-              </p:cTn>
-              <p:prevCondLst>
-                <p:cond evt="onPrev" delay="0">
-                  <p:tgtEl>
-                    <p:sldTgt/>
-                  </p:tgtEl>
-                </p:cond>
-              </p:prevCondLst>
-              <p:nextCondLst>
-                <p:cond evt="onNext" delay="0">
-                  <p:tgtEl>
-                    <p:sldTgt/>
-                  </p:tgtEl>
-                </p:cond>
-              </p:nextCondLst>
-            </p:seq>
-          </p:childTnLst>
-        </p:cTn>
-      </p:par>
-    </p:tnLst>
-    <p:bldLst>
-      <p:bldP spid="4" grpId="0"/>
-    </p:bldLst>
-  </p:timing>
-</p:sld>
-</file>
-
-<file path=ppt/slides/slide12.xml><?xml version="1.0" encoding="utf-8"?>
 <p:sld xmlns:a="http://schemas.openxmlformats.org/drawingml/2006/main" xmlns:r="http://schemas.openxmlformats.org/officeDocument/2006/relationships" xmlns:p="http://schemas.openxmlformats.org/presentationml/2006/main">
   <p:cSld>
     <p:spTree>
@@ -6049,7 +4931,7 @@
 </p:sld>
 </file>
 
-<file path=ppt/slides/slide13.xml><?xml version="1.0" encoding="utf-8"?>
+<file path=ppt/slides/slide11.xml><?xml version="1.0" encoding="utf-8"?>
 <p:sld xmlns:a="http://schemas.openxmlformats.org/drawingml/2006/main" xmlns:r="http://schemas.openxmlformats.org/officeDocument/2006/relationships" xmlns:p="http://schemas.openxmlformats.org/presentationml/2006/main">
   <p:cSld>
     <p:spTree>
@@ -6632,7 +5514,7 @@
 </p:sld>
 </file>
 
-<file path=ppt/slides/slide14.xml><?xml version="1.0" encoding="utf-8"?>
+<file path=ppt/slides/slide12.xml><?xml version="1.0" encoding="utf-8"?>
 <p:sld xmlns:a="http://schemas.openxmlformats.org/drawingml/2006/main" xmlns:r="http://schemas.openxmlformats.org/officeDocument/2006/relationships" xmlns:p="http://schemas.openxmlformats.org/presentationml/2006/main">
   <p:cSld>
     <p:spTree>
@@ -6930,7 +5812,7 @@
 </p:sld>
 </file>
 
-<file path=ppt/slides/slide15.xml><?xml version="1.0" encoding="utf-8"?>
+<file path=ppt/slides/slide13.xml><?xml version="1.0" encoding="utf-8"?>
 <p:sld xmlns:a="http://schemas.openxmlformats.org/drawingml/2006/main" xmlns:r="http://schemas.openxmlformats.org/officeDocument/2006/relationships" xmlns:p="http://schemas.openxmlformats.org/presentationml/2006/main">
   <p:cSld>
     <p:spTree>
@@ -7722,8 +6604,8 @@
           <a:lstStyle/>
           <a:p>
             <a:r>
-              <a:rPr lang="en-US" dirty="0" smtClean="0"/>
-              <a:t>Common Mistakes on Lab 1</a:t>
+              <a:rPr lang="en-US" b="1" dirty="0" smtClean="0"/>
+              <a:t>Peripherals</a:t>
             </a:r>
             <a:endParaRPr lang="en-US" dirty="0"/>
           </a:p>
@@ -7739,178 +6621,182 @@
             <p:ph idx="1"/>
           </p:nvPr>
         </p:nvSpPr>
-        <p:spPr/>
+        <p:spPr>
+          <a:xfrm>
+            <a:off x="395177" y="669852"/>
+            <a:ext cx="8493642" cy="4724400"/>
+          </a:xfrm>
+        </p:spPr>
         <p:txBody>
           <a:bodyPr/>
           <a:lstStyle/>
           <a:p>
             <a:r>
+              <a:rPr lang="en-US" sz="2000" dirty="0" smtClean="0">
+                <a:solidFill>
+                  <a:schemeClr val="accent2"/>
+                </a:solidFill>
+              </a:rPr>
+              <a:t>What are Peripherals?</a:t>
+            </a:r>
+          </a:p>
+          <a:p>
+            <a:r>
+              <a:rPr lang="en-US" sz="2000" dirty="0" smtClean="0">
+                <a:solidFill>
+                  <a:schemeClr val="accent2"/>
+                </a:solidFill>
+              </a:rPr>
+              <a:t> MSP430G2xx Peripherals?</a:t>
+            </a:r>
+          </a:p>
+          <a:p>
+            <a:pPr lvl="1"/>
+            <a:r>
+              <a:rPr lang="en-US" sz="2000" dirty="0" smtClean="0">
+                <a:hlinkClick r:id="rId2"/>
+              </a:rPr>
+              <a:t>MSP430 </a:t>
+            </a:r>
+            <a:r>
+              <a:rPr lang="en-US" sz="2000" dirty="0" err="1">
+                <a:hlinkClick r:id="rId2"/>
+              </a:rPr>
+              <a:t>wikipedia</a:t>
+            </a:r>
+            <a:r>
               <a:rPr lang="en-US" sz="2000" dirty="0" smtClean="0"/>
-              <a:t>Use of multiple .</a:t>
-            </a:r>
-            <a:r>
-              <a:rPr lang="en-US" sz="2000" dirty="0" err="1" smtClean="0"/>
-              <a:t>asm</a:t>
-            </a:r>
+              <a:t>:</a:t>
+            </a:r>
+          </a:p>
+          <a:p>
+            <a:pPr lvl="1"/>
             <a:r>
               <a:rPr lang="en-US" sz="2000" dirty="0" smtClean="0"/>
-              <a:t> files (all functionalities should be in final .</a:t>
-            </a:r>
-            <a:r>
-              <a:rPr lang="en-US" sz="2000" dirty="0" err="1" smtClean="0"/>
-              <a:t>asm</a:t>
-            </a:r>
+              <a:t>Watchdog </a:t>
+            </a:r>
+            <a:r>
+              <a:rPr lang="en-US" sz="2000" dirty="0"/>
+              <a:t>Timer</a:t>
+            </a:r>
+          </a:p>
+          <a:p>
+            <a:pPr lvl="1"/>
             <a:r>
               <a:rPr lang="en-US" sz="2000" dirty="0" smtClean="0"/>
-              <a:t>)</a:t>
-            </a:r>
-          </a:p>
-          <a:p>
+              <a:t>Universal </a:t>
+            </a:r>
+            <a:r>
+              <a:rPr lang="en-US" sz="2000" dirty="0"/>
+              <a:t>Serial Communication Interface (USCI) </a:t>
+            </a:r>
+            <a:endParaRPr lang="en-US" sz="2000" dirty="0" smtClean="0"/>
+          </a:p>
+          <a:p>
+            <a:pPr lvl="2"/>
+            <a:r>
+              <a:rPr lang="en-US" sz="1600" dirty="0"/>
+              <a:t>I</a:t>
+            </a:r>
+            <a:r>
+              <a:rPr lang="en-US" sz="1600" dirty="0" smtClean="0"/>
+              <a:t>mplements </a:t>
+            </a:r>
+            <a:r>
+              <a:rPr lang="en-US" sz="1600" dirty="0"/>
+              <a:t>SPI and I2C protocols </a:t>
+            </a:r>
+            <a:endParaRPr lang="en-US" sz="1600" dirty="0" smtClean="0"/>
+          </a:p>
+          <a:p>
+            <a:pPr lvl="2"/>
+            <a:r>
+              <a:rPr lang="en-US" sz="1600" dirty="0" smtClean="0"/>
+              <a:t>We'll </a:t>
+            </a:r>
+            <a:r>
+              <a:rPr lang="en-US" sz="1600" dirty="0"/>
+              <a:t>use SPI to interface with the LCD in your black </a:t>
+            </a:r>
+            <a:r>
+              <a:rPr lang="en-US" sz="1600" dirty="0" smtClean="0"/>
+              <a:t>box</a:t>
+            </a:r>
+            <a:endParaRPr lang="en-US" sz="1600" dirty="0"/>
+          </a:p>
+          <a:p>
+            <a:pPr lvl="1"/>
             <a:r>
               <a:rPr lang="en-US" sz="2000" dirty="0" smtClean="0"/>
-              <a:t>Lack </a:t>
+              <a:t>Pulse </a:t>
             </a:r>
             <a:r>
               <a:rPr lang="en-US" sz="2000" dirty="0"/>
-              <a:t>detail </a:t>
-            </a:r>
+              <a:t>Width Modulation (PWM) </a:t>
+            </a:r>
+          </a:p>
+          <a:p>
+            <a:pPr lvl="2"/>
+            <a:r>
+              <a:rPr lang="en-US" sz="1600" dirty="0"/>
+              <a:t>W</a:t>
+            </a:r>
+            <a:r>
+              <a:rPr lang="en-US" sz="1600" dirty="0" smtClean="0"/>
+              <a:t>e'll </a:t>
+            </a:r>
+            <a:r>
+              <a:rPr lang="en-US" sz="1600" dirty="0"/>
+              <a:t>use this later to drive the robot</a:t>
+            </a:r>
+          </a:p>
+          <a:p>
+            <a:pPr lvl="1"/>
             <a:r>
               <a:rPr lang="en-US" sz="2000" dirty="0" smtClean="0"/>
-              <a:t>on </a:t>
-            </a:r>
-            <a:r>
-              <a:rPr lang="en-US" sz="2000" dirty="0" err="1"/>
-              <a:t>flowgraph</a:t>
+              <a:t>Temperature </a:t>
             </a:r>
             <a:r>
               <a:rPr lang="en-US" sz="2000" dirty="0"/>
-              <a:t> (i.e. values </a:t>
-            </a:r>
+              <a:t>Sensor</a:t>
+            </a:r>
+          </a:p>
+          <a:p>
+            <a:pPr lvl="1"/>
             <a:r>
               <a:rPr lang="en-US" sz="2000" dirty="0" smtClean="0"/>
-              <a:t>and data outputs)</a:t>
-            </a:r>
-            <a:endParaRPr lang="en-US" sz="2000" dirty="0"/>
-          </a:p>
-          <a:p>
+              <a:t>Multipliers</a:t>
+            </a:r>
+          </a:p>
+          <a:p>
+            <a:pPr lvl="1"/>
             <a:r>
               <a:rPr lang="en-US" sz="2000" dirty="0" smtClean="0"/>
-              <a:t>Didn’t include </a:t>
+              <a:t>Capacitive </a:t>
             </a:r>
             <a:r>
               <a:rPr lang="en-US" sz="2000" dirty="0"/>
-              <a:t>documentation in code </a:t>
-            </a:r>
-            <a:r>
-              <a:rPr lang="en-US" sz="2000" dirty="0" smtClean="0"/>
-              <a:t>header or didn’t have a header</a:t>
-            </a:r>
-          </a:p>
-          <a:p>
-            <a:r>
-              <a:rPr lang="en-US" sz="2000" dirty="0" smtClean="0"/>
-              <a:t>Didn’t show </a:t>
-            </a:r>
-            <a:r>
-              <a:rPr lang="en-US" sz="2000" dirty="0"/>
-              <a:t>Proof of Functionality (i.e. “Show me the memory!”)</a:t>
-            </a:r>
-          </a:p>
-          <a:p>
-            <a:r>
-              <a:rPr lang="en-US" sz="2000" dirty="0" smtClean="0"/>
-              <a:t>Used Magic numbers instead of constants </a:t>
-            </a:r>
-          </a:p>
-          <a:p>
-            <a:pPr lvl="1"/>
+              <a:t>Touch I/O </a:t>
+            </a:r>
+            <a:endParaRPr lang="en-US" sz="2000" dirty="0" smtClean="0"/>
+          </a:p>
+          <a:p>
+            <a:pPr lvl="2"/>
             <a:r>
               <a:rPr lang="en-US" sz="1600" dirty="0" smtClean="0"/>
-              <a:t>Constants should be in </a:t>
+              <a:t>For </a:t>
             </a:r>
             <a:r>
               <a:rPr lang="en-US" sz="1600" dirty="0"/>
-              <a:t>all </a:t>
-            </a:r>
-            <a:r>
-              <a:rPr lang="en-US" sz="1600" dirty="0" smtClean="0"/>
-              <a:t>CAPs</a:t>
-            </a:r>
-          </a:p>
-          <a:p>
-            <a:r>
-              <a:rPr lang="en-US" sz="2000" dirty="0" smtClean="0"/>
-              <a:t>Not using the Example repo (missing sections or details)</a:t>
-            </a:r>
-          </a:p>
-          <a:p>
-            <a:pPr lvl="1"/>
-            <a:r>
-              <a:rPr lang="en-US" sz="1800" dirty="0">
-                <a:hlinkClick r:id="rId2"/>
-              </a:rPr>
-              <a:t>https://</a:t>
-            </a:r>
-            <a:r>
-              <a:rPr lang="en-US" sz="1800" dirty="0" smtClean="0">
-                <a:hlinkClick r:id="rId2"/>
-              </a:rPr>
-              <a:t>github.com/jfalkinburg/ECE_382_Lab_Ex</a:t>
-            </a:r>
-            <a:endParaRPr lang="en-US" sz="1800" dirty="0"/>
-          </a:p>
-          <a:p>
-            <a:pPr lvl="1"/>
-            <a:r>
-              <a:rPr lang="en-US" sz="1600" dirty="0" smtClean="0"/>
-              <a:t>Don’t copy entire code into readme</a:t>
-            </a:r>
-          </a:p>
-          <a:p>
-            <a:r>
-              <a:rPr lang="en-US" sz="2000" dirty="0" smtClean="0"/>
-              <a:t>Code built in </a:t>
-            </a:r>
-            <a:r>
-              <a:rPr lang="en-US" sz="2000" dirty="0"/>
-              <a:t>RAM (i.e. the .data section</a:t>
-            </a:r>
-            <a:r>
-              <a:rPr lang="en-US" sz="2000" dirty="0" smtClean="0"/>
-              <a:t>)</a:t>
-            </a:r>
-          </a:p>
-          <a:p>
-            <a:r>
-              <a:rPr lang="en-US" sz="2000" dirty="0" smtClean="0"/>
-              <a:t>Missing 2 Additional Test Cases, didn’t test them, or didn’t account for edge cases, or didn’t explain the results</a:t>
-            </a:r>
-          </a:p>
-          <a:p>
-            <a:r>
-              <a:rPr lang="en-US" sz="2000" dirty="0" smtClean="0"/>
-              <a:t>Effective use of </a:t>
-            </a:r>
-            <a:r>
-              <a:rPr lang="en-US" sz="2000" dirty="0" err="1" smtClean="0"/>
-              <a:t>BitBucket</a:t>
-            </a:r>
-            <a:r>
-              <a:rPr lang="en-US" sz="2000" dirty="0" smtClean="0"/>
-              <a:t> (need at least 3 commits with detailed comments for code)</a:t>
-            </a:r>
-          </a:p>
-          <a:p>
-            <a:r>
-              <a:rPr lang="en-US" sz="2000" dirty="0" smtClean="0"/>
-              <a:t>Didn’t show me the Multiply algorithm or document the source</a:t>
-            </a:r>
-          </a:p>
-          <a:p>
-            <a:r>
-              <a:rPr lang="en-US" sz="2000" dirty="0" smtClean="0"/>
-              <a:t>Poor Conclusion (i.e. Telling me what you did and what you learned)</a:t>
-            </a:r>
+              <a:t>working with touch screens, </a:t>
+            </a:r>
+            <a:r>
+              <a:rPr lang="en-US" sz="1600" dirty="0" err="1" smtClean="0"/>
+              <a:t>etc</a:t>
+            </a:r>
+            <a:endParaRPr lang="en-US" sz="2000" dirty="0" smtClean="0"/>
+          </a:p>
+          <a:p>
             <a:endParaRPr lang="en-US" sz="2000" dirty="0"/>
           </a:p>
         </p:txBody>
@@ -7918,7 +6804,7 @@
     </p:spTree>
     <p:extLst>
       <p:ext uri="{BB962C8B-B14F-4D97-AF65-F5344CB8AC3E}">
-        <p14:creationId xmlns:p14="http://schemas.microsoft.com/office/powerpoint/2010/main" val="1084653994"/>
+        <p14:creationId xmlns:p14="http://schemas.microsoft.com/office/powerpoint/2010/main" val="3458147277"/>
       </p:ext>
     </p:extLst>
   </p:cSld>
@@ -7968,486 +6854,6 @@
           <a:lstStyle/>
           <a:p>
             <a:r>
-              <a:rPr lang="en-US" dirty="0" smtClean="0"/>
-              <a:t>What do I want to see on the Lab 2 Notebook?</a:t>
-            </a:r>
-            <a:endParaRPr lang="en-US" dirty="0"/>
-          </a:p>
-        </p:txBody>
-      </p:sp>
-      <p:sp>
-        <p:nvSpPr>
-          <p:cNvPr id="3" name="Content Placeholder 2"/>
-          <p:cNvSpPr>
-            <a:spLocks noGrp="1"/>
-          </p:cNvSpPr>
-          <p:nvPr>
-            <p:ph idx="1"/>
-          </p:nvPr>
-        </p:nvSpPr>
-        <p:spPr/>
-        <p:txBody>
-          <a:bodyPr/>
-          <a:lstStyle/>
-          <a:p>
-            <a:r>
-              <a:rPr lang="en-US" sz="2000" dirty="0" smtClean="0"/>
-              <a:t>Use one .</a:t>
-            </a:r>
-            <a:r>
-              <a:rPr lang="en-US" sz="2000" dirty="0" err="1"/>
-              <a:t>asm</a:t>
-            </a:r>
-            <a:r>
-              <a:rPr lang="en-US" sz="2000" dirty="0"/>
-              <a:t> </a:t>
-            </a:r>
-            <a:r>
-              <a:rPr lang="en-US" sz="2000" dirty="0" smtClean="0"/>
-              <a:t>file for all functionalities and commit often </a:t>
-            </a:r>
-          </a:p>
-          <a:p>
-            <a:pPr lvl="1"/>
-            <a:r>
-              <a:rPr lang="en-US" sz="1600" dirty="0" smtClean="0"/>
-              <a:t>Each Functionality should have a commit</a:t>
-            </a:r>
-          </a:p>
-          <a:p>
-            <a:pPr lvl="1"/>
-            <a:r>
-              <a:rPr lang="en-US" sz="1600" dirty="0"/>
-              <a:t>Effective use of </a:t>
-            </a:r>
-            <a:r>
-              <a:rPr lang="en-US" sz="1600" dirty="0" err="1"/>
-              <a:t>BitBucket</a:t>
-            </a:r>
-            <a:r>
-              <a:rPr lang="en-US" sz="1600" dirty="0"/>
-              <a:t> </a:t>
-            </a:r>
-            <a:r>
-              <a:rPr lang="en-US" sz="1600" dirty="0" smtClean="0"/>
-              <a:t>should be at </a:t>
-            </a:r>
-            <a:r>
-              <a:rPr lang="en-US" sz="1600" dirty="0"/>
-              <a:t>least 3 commits with </a:t>
-            </a:r>
-            <a:r>
-              <a:rPr lang="en-US" sz="1600" dirty="0" smtClean="0"/>
-              <a:t>detailed comments</a:t>
-            </a:r>
-          </a:p>
-          <a:p>
-            <a:pPr lvl="1"/>
-            <a:r>
-              <a:rPr lang="en-US" sz="1600" dirty="0" smtClean="0"/>
-              <a:t>Don’t forget code headers and comments and update subroutine headers</a:t>
-            </a:r>
-            <a:endParaRPr lang="en-US" sz="1600" dirty="0"/>
-          </a:p>
-          <a:p>
-            <a:r>
-              <a:rPr lang="en-US" sz="2000" dirty="0" smtClean="0"/>
-              <a:t>Show Proof of Functionality (i.e. “Show me the memory!”)</a:t>
-            </a:r>
-          </a:p>
-          <a:p>
-            <a:pPr lvl="1"/>
-            <a:r>
-              <a:rPr lang="en-US" sz="1600" dirty="0" smtClean="0"/>
-              <a:t>Don’t include an image without explaining what it is and how it is important</a:t>
-            </a:r>
-          </a:p>
-          <a:p>
-            <a:pPr lvl="1"/>
-            <a:r>
-              <a:rPr lang="en-US" sz="1600" dirty="0"/>
-              <a:t>For </a:t>
-            </a:r>
-            <a:r>
-              <a:rPr lang="en-US" sz="1600" dirty="0" smtClean="0"/>
-              <a:t>A-</a:t>
-            </a:r>
-            <a:r>
-              <a:rPr lang="en-US" sz="1600" dirty="0" err="1" smtClean="0"/>
-              <a:t>Funct</a:t>
-            </a:r>
-            <a:r>
-              <a:rPr lang="en-US" sz="1600" dirty="0" smtClean="0"/>
-              <a:t> you should also tell me what the key in addition to the message</a:t>
-            </a:r>
-          </a:p>
-          <a:p>
-            <a:r>
-              <a:rPr lang="en-US" sz="2000" dirty="0" smtClean="0"/>
-              <a:t>Update your </a:t>
-            </a:r>
-            <a:r>
-              <a:rPr lang="en-US" sz="2000" dirty="0" err="1" smtClean="0"/>
-              <a:t>flowgraph</a:t>
-            </a:r>
-            <a:r>
-              <a:rPr lang="en-US" sz="2000" dirty="0" smtClean="0"/>
-              <a:t>!  Show me what registers you used to pass data</a:t>
-            </a:r>
-            <a:endParaRPr lang="en-US" sz="2000" dirty="0"/>
-          </a:p>
-          <a:p>
-            <a:pPr lvl="1"/>
-            <a:r>
-              <a:rPr lang="en-US" sz="1600" dirty="0" smtClean="0"/>
-              <a:t>If you did A or B-</a:t>
-            </a:r>
-            <a:r>
-              <a:rPr lang="en-US" sz="1600" dirty="0" err="1" smtClean="0"/>
-              <a:t>Funct</a:t>
-            </a:r>
-            <a:r>
-              <a:rPr lang="en-US" sz="1600" dirty="0" smtClean="0"/>
-              <a:t> you need to show me how you did it (i.e. </a:t>
-            </a:r>
-            <a:r>
-              <a:rPr lang="en-US" sz="1600" dirty="0" err="1" smtClean="0"/>
-              <a:t>Flowgraph</a:t>
-            </a:r>
-            <a:r>
-              <a:rPr lang="en-US" sz="1600" dirty="0" smtClean="0"/>
-              <a:t>)</a:t>
-            </a:r>
-          </a:p>
-          <a:p>
-            <a:r>
-              <a:rPr lang="en-US" sz="2000" dirty="0" smtClean="0"/>
-              <a:t>Discuss any issues had in the debugging section</a:t>
-            </a:r>
-          </a:p>
-          <a:p>
-            <a:r>
-              <a:rPr lang="en-US" sz="2000" dirty="0" smtClean="0"/>
-              <a:t>Conclusion – Paragraph that restates the purpose, discusses whether you achieved that goal, and tell </a:t>
-            </a:r>
-            <a:r>
-              <a:rPr lang="en-US" sz="2000" dirty="0"/>
-              <a:t>me what you </a:t>
-            </a:r>
-            <a:r>
-              <a:rPr lang="en-US" sz="2000" dirty="0" smtClean="0"/>
-              <a:t>learned and how you can use this in the future.</a:t>
-            </a:r>
-            <a:endParaRPr lang="en-US" sz="2000" dirty="0"/>
-          </a:p>
-          <a:p>
-            <a:endParaRPr lang="en-US" dirty="0"/>
-          </a:p>
-        </p:txBody>
-      </p:sp>
-    </p:spTree>
-    <p:extLst>
-      <p:ext uri="{BB962C8B-B14F-4D97-AF65-F5344CB8AC3E}">
-        <p14:creationId xmlns:p14="http://schemas.microsoft.com/office/powerpoint/2010/main" val="3113984799"/>
-      </p:ext>
-    </p:extLst>
-  </p:cSld>
-  <p:clrMapOvr>
-    <a:masterClrMapping/>
-  </p:clrMapOvr>
-  <p:timing>
-    <p:tnLst>
-      <p:par>
-        <p:cTn id="1" dur="indefinite" restart="never" nodeType="tmRoot"/>
-      </p:par>
-    </p:tnLst>
-  </p:timing>
-</p:sld>
-</file>
-
-<file path=ppt/slides/slide4.xml><?xml version="1.0" encoding="utf-8"?>
-<p:sld xmlns:a="http://schemas.openxmlformats.org/drawingml/2006/main" xmlns:r="http://schemas.openxmlformats.org/officeDocument/2006/relationships" xmlns:p="http://schemas.openxmlformats.org/presentationml/2006/main">
-  <p:cSld>
-    <p:spTree>
-      <p:nvGrpSpPr>
-        <p:cNvPr id="1" name=""/>
-        <p:cNvGrpSpPr/>
-        <p:nvPr/>
-      </p:nvGrpSpPr>
-      <p:grpSpPr>
-        <a:xfrm>
-          <a:off x="0" y="0"/>
-          <a:ext cx="0" cy="0"/>
-          <a:chOff x="0" y="0"/>
-          <a:chExt cx="0" cy="0"/>
-        </a:xfrm>
-      </p:grpSpPr>
-      <p:sp>
-        <p:nvSpPr>
-          <p:cNvPr id="2" name="Title 1"/>
-          <p:cNvSpPr>
-            <a:spLocks noGrp="1"/>
-          </p:cNvSpPr>
-          <p:nvPr>
-            <p:ph type="title"/>
-          </p:nvPr>
-        </p:nvSpPr>
-        <p:spPr/>
-        <p:txBody>
-          <a:bodyPr/>
-          <a:lstStyle/>
-          <a:p>
-            <a:r>
-              <a:rPr lang="en-US" b="1" dirty="0" smtClean="0"/>
-              <a:t>Peripherals</a:t>
-            </a:r>
-            <a:endParaRPr lang="en-US" dirty="0"/>
-          </a:p>
-        </p:txBody>
-      </p:sp>
-      <p:sp>
-        <p:nvSpPr>
-          <p:cNvPr id="3" name="Content Placeholder 2"/>
-          <p:cNvSpPr>
-            <a:spLocks noGrp="1"/>
-          </p:cNvSpPr>
-          <p:nvPr>
-            <p:ph idx="1"/>
-          </p:nvPr>
-        </p:nvSpPr>
-        <p:spPr>
-          <a:xfrm>
-            <a:off x="395177" y="669852"/>
-            <a:ext cx="8493642" cy="4724400"/>
-          </a:xfrm>
-        </p:spPr>
-        <p:txBody>
-          <a:bodyPr/>
-          <a:lstStyle/>
-          <a:p>
-            <a:r>
-              <a:rPr lang="en-US" sz="2000" dirty="0" smtClean="0">
-                <a:solidFill>
-                  <a:schemeClr val="accent2"/>
-                </a:solidFill>
-              </a:rPr>
-              <a:t>What are Peripherals?</a:t>
-            </a:r>
-          </a:p>
-          <a:p>
-            <a:r>
-              <a:rPr lang="en-US" sz="2000" dirty="0" smtClean="0">
-                <a:solidFill>
-                  <a:schemeClr val="accent2"/>
-                </a:solidFill>
-              </a:rPr>
-              <a:t> MSP430G2xx Peripherals?</a:t>
-            </a:r>
-          </a:p>
-          <a:p>
-            <a:pPr lvl="1"/>
-            <a:r>
-              <a:rPr lang="en-US" sz="2000" dirty="0" smtClean="0">
-                <a:hlinkClick r:id="rId2"/>
-              </a:rPr>
-              <a:t>MSP430 </a:t>
-            </a:r>
-            <a:r>
-              <a:rPr lang="en-US" sz="2000" dirty="0" err="1">
-                <a:hlinkClick r:id="rId2"/>
-              </a:rPr>
-              <a:t>wikipedia</a:t>
-            </a:r>
-            <a:r>
-              <a:rPr lang="en-US" sz="2000" dirty="0" smtClean="0"/>
-              <a:t>:</a:t>
-            </a:r>
-          </a:p>
-          <a:p>
-            <a:pPr lvl="1"/>
-            <a:r>
-              <a:rPr lang="en-US" sz="2000" dirty="0" smtClean="0"/>
-              <a:t>Watchdog </a:t>
-            </a:r>
-            <a:r>
-              <a:rPr lang="en-US" sz="2000" dirty="0"/>
-              <a:t>Timer</a:t>
-            </a:r>
-          </a:p>
-          <a:p>
-            <a:pPr lvl="1"/>
-            <a:r>
-              <a:rPr lang="en-US" sz="2000" dirty="0" smtClean="0"/>
-              <a:t>Universal </a:t>
-            </a:r>
-            <a:r>
-              <a:rPr lang="en-US" sz="2000" dirty="0"/>
-              <a:t>Serial Communication Interface (USCI) </a:t>
-            </a:r>
-            <a:endParaRPr lang="en-US" sz="2000" dirty="0" smtClean="0"/>
-          </a:p>
-          <a:p>
-            <a:pPr lvl="2"/>
-            <a:r>
-              <a:rPr lang="en-US" sz="1600" dirty="0"/>
-              <a:t>I</a:t>
-            </a:r>
-            <a:r>
-              <a:rPr lang="en-US" sz="1600" dirty="0" smtClean="0"/>
-              <a:t>mplements </a:t>
-            </a:r>
-            <a:r>
-              <a:rPr lang="en-US" sz="1600" dirty="0"/>
-              <a:t>SPI and I2C protocols </a:t>
-            </a:r>
-            <a:endParaRPr lang="en-US" sz="1600" dirty="0" smtClean="0"/>
-          </a:p>
-          <a:p>
-            <a:pPr lvl="2"/>
-            <a:r>
-              <a:rPr lang="en-US" sz="1600" dirty="0" smtClean="0"/>
-              <a:t>We'll </a:t>
-            </a:r>
-            <a:r>
-              <a:rPr lang="en-US" sz="1600" dirty="0"/>
-              <a:t>use SPI to interface with the LCD in your black </a:t>
-            </a:r>
-            <a:r>
-              <a:rPr lang="en-US" sz="1600" dirty="0" smtClean="0"/>
-              <a:t>box</a:t>
-            </a:r>
-            <a:endParaRPr lang="en-US" sz="1600" dirty="0"/>
-          </a:p>
-          <a:p>
-            <a:pPr lvl="1"/>
-            <a:r>
-              <a:rPr lang="en-US" sz="2000" dirty="0" smtClean="0"/>
-              <a:t>Pulse </a:t>
-            </a:r>
-            <a:r>
-              <a:rPr lang="en-US" sz="2000" dirty="0"/>
-              <a:t>Width Modulation (PWM) </a:t>
-            </a:r>
-          </a:p>
-          <a:p>
-            <a:pPr lvl="2"/>
-            <a:r>
-              <a:rPr lang="en-US" sz="1600" dirty="0"/>
-              <a:t>W</a:t>
-            </a:r>
-            <a:r>
-              <a:rPr lang="en-US" sz="1600" dirty="0" smtClean="0"/>
-              <a:t>e'll </a:t>
-            </a:r>
-            <a:r>
-              <a:rPr lang="en-US" sz="1600" dirty="0"/>
-              <a:t>use this later to drive the robot</a:t>
-            </a:r>
-          </a:p>
-          <a:p>
-            <a:pPr lvl="1"/>
-            <a:r>
-              <a:rPr lang="en-US" sz="2000" dirty="0" smtClean="0"/>
-              <a:t>Temperature </a:t>
-            </a:r>
-            <a:r>
-              <a:rPr lang="en-US" sz="2000" dirty="0"/>
-              <a:t>Sensor</a:t>
-            </a:r>
-          </a:p>
-          <a:p>
-            <a:pPr lvl="1"/>
-            <a:r>
-              <a:rPr lang="en-US" sz="2000" dirty="0" smtClean="0"/>
-              <a:t>Multipliers</a:t>
-            </a:r>
-          </a:p>
-          <a:p>
-            <a:pPr lvl="1"/>
-            <a:r>
-              <a:rPr lang="en-US" sz="2000" dirty="0" smtClean="0"/>
-              <a:t>Capacitive </a:t>
-            </a:r>
-            <a:r>
-              <a:rPr lang="en-US" sz="2000" dirty="0"/>
-              <a:t>Touch I/O </a:t>
-            </a:r>
-            <a:endParaRPr lang="en-US" sz="2000" dirty="0" smtClean="0"/>
-          </a:p>
-          <a:p>
-            <a:pPr lvl="2"/>
-            <a:r>
-              <a:rPr lang="en-US" sz="1600" dirty="0" smtClean="0"/>
-              <a:t>For </a:t>
-            </a:r>
-            <a:r>
-              <a:rPr lang="en-US" sz="1600" dirty="0"/>
-              <a:t>working with touch screens, </a:t>
-            </a:r>
-            <a:r>
-              <a:rPr lang="en-US" sz="1600" dirty="0" err="1" smtClean="0"/>
-              <a:t>etc</a:t>
-            </a:r>
-            <a:endParaRPr lang="en-US" sz="2000" dirty="0" smtClean="0"/>
-          </a:p>
-          <a:p>
-            <a:endParaRPr lang="en-US" sz="2000" dirty="0"/>
-          </a:p>
-        </p:txBody>
-      </p:sp>
-    </p:spTree>
-    <p:extLst>
-      <p:ext uri="{BB962C8B-B14F-4D97-AF65-F5344CB8AC3E}">
-        <p14:creationId xmlns:p14="http://schemas.microsoft.com/office/powerpoint/2010/main" val="3458147277"/>
-      </p:ext>
-    </p:extLst>
-  </p:cSld>
-  <p:clrMapOvr>
-    <a:masterClrMapping/>
-  </p:clrMapOvr>
-  <p:timing>
-    <p:tnLst>
-      <p:par>
-        <p:cTn id="1" dur="indefinite" restart="never" nodeType="tmRoot"/>
-      </p:par>
-    </p:tnLst>
-  </p:timing>
-</p:sld>
-</file>
-
-<file path=ppt/slides/slide5.xml><?xml version="1.0" encoding="utf-8"?>
-<p:sld xmlns:a="http://schemas.openxmlformats.org/drawingml/2006/main" xmlns:r="http://schemas.openxmlformats.org/officeDocument/2006/relationships" xmlns:p="http://schemas.openxmlformats.org/presentationml/2006/main">
-  <p:cSld>
-    <p:spTree>
-      <p:nvGrpSpPr>
-        <p:cNvPr id="1" name=""/>
-        <p:cNvGrpSpPr/>
-        <p:nvPr/>
-      </p:nvGrpSpPr>
-      <p:grpSpPr>
-        <a:xfrm>
-          <a:off x="0" y="0"/>
-          <a:ext cx="0" cy="0"/>
-          <a:chOff x="0" y="0"/>
-          <a:chExt cx="0" cy="0"/>
-        </a:xfrm>
-      </p:grpSpPr>
-      <p:sp>
-        <p:nvSpPr>
-          <p:cNvPr id="2" name="Title 1"/>
-          <p:cNvSpPr>
-            <a:spLocks noGrp="1"/>
-          </p:cNvSpPr>
-          <p:nvPr>
-            <p:ph type="title"/>
-          </p:nvPr>
-        </p:nvSpPr>
-        <p:spPr/>
-        <p:txBody>
-          <a:bodyPr/>
-          <a:lstStyle/>
-          <a:p>
-            <a:r>
               <a:rPr lang="en-US" b="1" dirty="0" smtClean="0"/>
               <a:t>Ports</a:t>
             </a:r>
@@ -8603,7 +7009,7 @@
 </p:sld>
 </file>
 
-<file path=ppt/slides/slide6.xml><?xml version="1.0" encoding="utf-8"?>
+<file path=ppt/slides/slide4.xml><?xml version="1.0" encoding="utf-8"?>
 <p:sld xmlns:a="http://schemas.openxmlformats.org/drawingml/2006/main" xmlns:r="http://schemas.openxmlformats.org/officeDocument/2006/relationships" xmlns:p="http://schemas.openxmlformats.org/presentationml/2006/main">
   <p:cSld>
     <p:spTree>
@@ -8694,7 +7100,7 @@
 </p:sld>
 </file>
 
-<file path=ppt/slides/slide7.xml><?xml version="1.0" encoding="utf-8"?>
+<file path=ppt/slides/slide5.xml><?xml version="1.0" encoding="utf-8"?>
 <p:sld xmlns:a="http://schemas.openxmlformats.org/drawingml/2006/main" xmlns:r="http://schemas.openxmlformats.org/officeDocument/2006/relationships" xmlns:p="http://schemas.openxmlformats.org/presentationml/2006/main">
   <p:cSld>
     <p:spTree>
@@ -8901,6 +7307,664 @@
     <p:extLst>
       <p:ext uri="{BB962C8B-B14F-4D97-AF65-F5344CB8AC3E}">
         <p14:creationId xmlns:p14="http://schemas.microsoft.com/office/powerpoint/2010/main" val="3207840792"/>
+      </p:ext>
+    </p:extLst>
+  </p:cSld>
+  <p:clrMapOvr>
+    <a:masterClrMapping/>
+  </p:clrMapOvr>
+  <p:timing>
+    <p:tnLst>
+      <p:par>
+        <p:cTn id="1" dur="indefinite" restart="never" nodeType="tmRoot"/>
+      </p:par>
+    </p:tnLst>
+  </p:timing>
+</p:sld>
+</file>
+
+<file path=ppt/slides/slide6.xml><?xml version="1.0" encoding="utf-8"?>
+<p:sld xmlns:a="http://schemas.openxmlformats.org/drawingml/2006/main" xmlns:r="http://schemas.openxmlformats.org/officeDocument/2006/relationships" xmlns:p="http://schemas.openxmlformats.org/presentationml/2006/main">
+  <p:cSld>
+    <p:spTree>
+      <p:nvGrpSpPr>
+        <p:cNvPr id="1" name=""/>
+        <p:cNvGrpSpPr/>
+        <p:nvPr/>
+      </p:nvGrpSpPr>
+      <p:grpSpPr>
+        <a:xfrm>
+          <a:off x="0" y="0"/>
+          <a:ext cx="0" cy="0"/>
+          <a:chOff x="0" y="0"/>
+          <a:chExt cx="0" cy="0"/>
+        </a:xfrm>
+      </p:grpSpPr>
+      <p:sp>
+        <p:nvSpPr>
+          <p:cNvPr id="2" name="Title 1"/>
+          <p:cNvSpPr>
+            <a:spLocks noGrp="1"/>
+          </p:cNvSpPr>
+          <p:nvPr>
+            <p:ph type="title"/>
+          </p:nvPr>
+        </p:nvSpPr>
+        <p:spPr/>
+        <p:txBody>
+          <a:bodyPr/>
+          <a:lstStyle/>
+          <a:p>
+            <a:r>
+              <a:rPr lang="en-US" b="1" dirty="0" smtClean="0"/>
+              <a:t>Pitfall !!!</a:t>
+            </a:r>
+            <a:endParaRPr lang="en-US" dirty="0"/>
+          </a:p>
+        </p:txBody>
+      </p:sp>
+      <p:sp>
+        <p:nvSpPr>
+          <p:cNvPr id="3" name="Content Placeholder 2"/>
+          <p:cNvSpPr>
+            <a:spLocks noGrp="1"/>
+          </p:cNvSpPr>
+          <p:nvPr>
+            <p:ph idx="1"/>
+          </p:nvPr>
+        </p:nvSpPr>
+        <p:spPr>
+          <a:xfrm>
+            <a:off x="395177" y="669852"/>
+            <a:ext cx="8493642" cy="4724400"/>
+          </a:xfrm>
+        </p:spPr>
+        <p:txBody>
+          <a:bodyPr/>
+          <a:lstStyle/>
+          <a:p>
+            <a:endParaRPr lang="en-US" sz="2000" dirty="0" smtClean="0">
+              <a:solidFill>
+                <a:schemeClr val="accent2"/>
+              </a:solidFill>
+            </a:endParaRPr>
+          </a:p>
+          <a:p>
+            <a:endParaRPr lang="en-US" sz="2000" dirty="0">
+              <a:solidFill>
+                <a:schemeClr val="accent2"/>
+              </a:solidFill>
+            </a:endParaRPr>
+          </a:p>
+          <a:p>
+            <a:endParaRPr lang="en-US" sz="2000" dirty="0" smtClean="0">
+              <a:solidFill>
+                <a:schemeClr val="accent2"/>
+              </a:solidFill>
+            </a:endParaRPr>
+          </a:p>
+          <a:p>
+            <a:endParaRPr lang="en-US" sz="2000" dirty="0">
+              <a:solidFill>
+                <a:schemeClr val="accent2"/>
+              </a:solidFill>
+            </a:endParaRPr>
+          </a:p>
+          <a:p>
+            <a:endParaRPr lang="en-US" sz="2000" dirty="0" smtClean="0">
+              <a:solidFill>
+                <a:schemeClr val="accent2"/>
+              </a:solidFill>
+            </a:endParaRPr>
+          </a:p>
+          <a:p>
+            <a:endParaRPr lang="en-US" sz="2000" dirty="0">
+              <a:solidFill>
+                <a:schemeClr val="accent2"/>
+              </a:solidFill>
+            </a:endParaRPr>
+          </a:p>
+          <a:p>
+            <a:endParaRPr lang="en-US" sz="2000" dirty="0" smtClean="0">
+              <a:solidFill>
+                <a:schemeClr val="accent2"/>
+              </a:solidFill>
+            </a:endParaRPr>
+          </a:p>
+          <a:p>
+            <a:endParaRPr lang="en-US" sz="2000" dirty="0" smtClean="0">
+              <a:solidFill>
+                <a:schemeClr val="accent2"/>
+              </a:solidFill>
+            </a:endParaRPr>
+          </a:p>
+          <a:p>
+            <a:endParaRPr lang="en-US" sz="2000" dirty="0" smtClean="0">
+              <a:solidFill>
+                <a:schemeClr val="accent2"/>
+              </a:solidFill>
+            </a:endParaRPr>
+          </a:p>
+          <a:p>
+            <a:endParaRPr lang="en-US" sz="2000" dirty="0" smtClean="0">
+              <a:solidFill>
+                <a:schemeClr val="accent2"/>
+              </a:solidFill>
+            </a:endParaRPr>
+          </a:p>
+          <a:p>
+            <a:endParaRPr lang="en-US" sz="2000" dirty="0">
+              <a:solidFill>
+                <a:schemeClr val="accent2"/>
+              </a:solidFill>
+            </a:endParaRPr>
+          </a:p>
+          <a:p>
+            <a:endParaRPr lang="en-US" sz="2000" dirty="0" smtClean="0">
+              <a:solidFill>
+                <a:schemeClr val="accent2"/>
+              </a:solidFill>
+            </a:endParaRPr>
+          </a:p>
+          <a:p>
+            <a:pPr marL="0" indent="0">
+              <a:buNone/>
+            </a:pPr>
+            <a:r>
+              <a:rPr lang="en-US" sz="1800" dirty="0" smtClean="0"/>
+              <a:t>Let's </a:t>
+            </a:r>
+            <a:r>
+              <a:rPr lang="en-US" sz="1800" dirty="0"/>
+              <a:t>say I wanted to make the UCA0SOMI function available on </a:t>
+            </a:r>
+            <a:r>
+              <a:rPr lang="en-US" sz="1800" dirty="0" smtClean="0"/>
+              <a:t>P1.1:</a:t>
+            </a:r>
+          </a:p>
+          <a:p>
+            <a:pPr lvl="1"/>
+            <a:r>
+              <a:rPr lang="en-US" sz="1200" dirty="0">
+                <a:solidFill>
+                  <a:srgbClr val="00B050"/>
+                </a:solidFill>
+                <a:latin typeface="Courier New" pitchFamily="49" charset="0"/>
+                <a:cs typeface="Courier New" pitchFamily="49" charset="0"/>
+              </a:rPr>
+              <a:t>; 'from USCI' means this bit is set automatically by the USCI when enabled</a:t>
+            </a:r>
+          </a:p>
+          <a:p>
+            <a:pPr lvl="1"/>
+            <a:r>
+              <a:rPr lang="en-US" sz="1200" dirty="0">
+                <a:latin typeface="Courier New" pitchFamily="49" charset="0"/>
+                <a:cs typeface="Courier New" pitchFamily="49" charset="0"/>
+              </a:rPr>
+              <a:t>    </a:t>
+            </a:r>
+            <a:r>
+              <a:rPr lang="en-US" sz="1200" dirty="0" err="1">
+                <a:latin typeface="Courier New" pitchFamily="49" charset="0"/>
+                <a:cs typeface="Courier New" pitchFamily="49" charset="0"/>
+              </a:rPr>
+              <a:t>bis.b</a:t>
+            </a:r>
+            <a:r>
+              <a:rPr lang="en-US" sz="1200" dirty="0">
+                <a:latin typeface="Courier New" pitchFamily="49" charset="0"/>
+                <a:cs typeface="Courier New" pitchFamily="49" charset="0"/>
+              </a:rPr>
+              <a:t>   #BIT1, P1SEL   </a:t>
+            </a:r>
+          </a:p>
+          <a:p>
+            <a:pPr lvl="1"/>
+            <a:r>
+              <a:rPr lang="en-US" sz="1200" dirty="0">
+                <a:latin typeface="Courier New" pitchFamily="49" charset="0"/>
+                <a:cs typeface="Courier New" pitchFamily="49" charset="0"/>
+              </a:rPr>
+              <a:t>    </a:t>
+            </a:r>
+            <a:r>
+              <a:rPr lang="en-US" sz="1200" dirty="0" err="1">
+                <a:latin typeface="Courier New" pitchFamily="49" charset="0"/>
+                <a:cs typeface="Courier New" pitchFamily="49" charset="0"/>
+              </a:rPr>
+              <a:t>bis.b</a:t>
+            </a:r>
+            <a:r>
+              <a:rPr lang="en-US" sz="1200" dirty="0">
+                <a:latin typeface="Courier New" pitchFamily="49" charset="0"/>
+                <a:cs typeface="Courier New" pitchFamily="49" charset="0"/>
+              </a:rPr>
+              <a:t>   #BIT1, </a:t>
+            </a:r>
+            <a:r>
+              <a:rPr lang="en-US" sz="1200" dirty="0" smtClean="0">
+                <a:latin typeface="Courier New" pitchFamily="49" charset="0"/>
+                <a:cs typeface="Courier New" pitchFamily="49" charset="0"/>
+              </a:rPr>
+              <a:t>P1SEL2</a:t>
+            </a:r>
+            <a:endParaRPr lang="en-US" sz="1600" dirty="0"/>
+          </a:p>
+          <a:p>
+            <a:endParaRPr lang="en-US" sz="2000" dirty="0">
+              <a:solidFill>
+                <a:schemeClr val="accent2"/>
+              </a:solidFill>
+            </a:endParaRPr>
+          </a:p>
+          <a:p>
+            <a:pPr lvl="1"/>
+            <a:endParaRPr lang="en-US" sz="2000" dirty="0" smtClean="0"/>
+          </a:p>
+          <a:p>
+            <a:endParaRPr lang="en-US" sz="2000" dirty="0">
+              <a:solidFill>
+                <a:schemeClr val="accent2"/>
+              </a:solidFill>
+            </a:endParaRPr>
+          </a:p>
+          <a:p>
+            <a:endParaRPr lang="en-US" sz="2000" dirty="0" smtClean="0">
+              <a:solidFill>
+                <a:schemeClr val="accent2"/>
+              </a:solidFill>
+            </a:endParaRPr>
+          </a:p>
+          <a:p>
+            <a:endParaRPr lang="en-US" sz="2000" dirty="0"/>
+          </a:p>
+        </p:txBody>
+      </p:sp>
+      <p:pic>
+        <p:nvPicPr>
+          <p:cNvPr id="3074" name="Picture 2" descr="P1.0-2 Multiplexing Control Bits / Signals"/>
+          <p:cNvPicPr>
+            <a:picLocks noChangeAspect="1" noChangeArrowheads="1"/>
+          </p:cNvPicPr>
+          <p:nvPr/>
+        </p:nvPicPr>
+        <p:blipFill>
+          <a:blip r:embed="rId2">
+            <a:extLst>
+              <a:ext uri="{28A0092B-C50C-407E-A947-70E740481C1C}">
+                <a14:useLocalDpi xmlns:a14="http://schemas.microsoft.com/office/drawing/2010/main" val="0"/>
+              </a:ext>
+            </a:extLst>
+          </a:blip>
+          <a:srcRect/>
+          <a:stretch>
+            <a:fillRect/>
+          </a:stretch>
+        </p:blipFill>
+        <p:spPr bwMode="auto">
+          <a:xfrm>
+            <a:off x="1183264" y="119695"/>
+            <a:ext cx="6753225" cy="4848225"/>
+          </a:xfrm>
+          <a:prstGeom prst="rect">
+            <a:avLst/>
+          </a:prstGeom>
+          <a:noFill/>
+          <a:extLst>
+            <a:ext uri="{909E8E84-426E-40DD-AFC4-6F175D3DCCD1}">
+              <a14:hiddenFill xmlns:a14="http://schemas.microsoft.com/office/drawing/2010/main">
+                <a:solidFill>
+                  <a:srgbClr val="FFFFFF"/>
+                </a:solidFill>
+              </a14:hiddenFill>
+            </a:ext>
+          </a:extLst>
+        </p:spPr>
+      </p:pic>
+    </p:spTree>
+    <p:extLst>
+      <p:ext uri="{BB962C8B-B14F-4D97-AF65-F5344CB8AC3E}">
+        <p14:creationId xmlns:p14="http://schemas.microsoft.com/office/powerpoint/2010/main" val="307478788"/>
+      </p:ext>
+    </p:extLst>
+  </p:cSld>
+  <p:clrMapOvr>
+    <a:masterClrMapping/>
+  </p:clrMapOvr>
+  <p:timing>
+    <p:tnLst>
+      <p:par>
+        <p:cTn id="1" dur="indefinite" restart="never" nodeType="tmRoot"/>
+      </p:par>
+    </p:tnLst>
+  </p:timing>
+</p:sld>
+</file>
+
+<file path=ppt/slides/slide7.xml><?xml version="1.0" encoding="utf-8"?>
+<p:sld xmlns:a="http://schemas.openxmlformats.org/drawingml/2006/main" xmlns:r="http://schemas.openxmlformats.org/officeDocument/2006/relationships" xmlns:p="http://schemas.openxmlformats.org/presentationml/2006/main">
+  <p:cSld>
+    <p:spTree>
+      <p:nvGrpSpPr>
+        <p:cNvPr id="1" name=""/>
+        <p:cNvGrpSpPr/>
+        <p:nvPr/>
+      </p:nvGrpSpPr>
+      <p:grpSpPr>
+        <a:xfrm>
+          <a:off x="0" y="0"/>
+          <a:ext cx="0" cy="0"/>
+          <a:chOff x="0" y="0"/>
+          <a:chExt cx="0" cy="0"/>
+        </a:xfrm>
+      </p:grpSpPr>
+      <p:sp>
+        <p:nvSpPr>
+          <p:cNvPr id="2" name="Title 1"/>
+          <p:cNvSpPr>
+            <a:spLocks noGrp="1"/>
+          </p:cNvSpPr>
+          <p:nvPr>
+            <p:ph type="title"/>
+          </p:nvPr>
+        </p:nvSpPr>
+        <p:spPr/>
+        <p:txBody>
+          <a:bodyPr/>
+          <a:lstStyle/>
+          <a:p>
+            <a:r>
+              <a:rPr lang="en-US" b="1" dirty="0" smtClean="0"/>
+              <a:t>How do we talk to Ports? Do I/O?</a:t>
+            </a:r>
+            <a:endParaRPr lang="en-US" dirty="0"/>
+          </a:p>
+        </p:txBody>
+      </p:sp>
+      <p:sp>
+        <p:nvSpPr>
+          <p:cNvPr id="3" name="Content Placeholder 2"/>
+          <p:cNvSpPr>
+            <a:spLocks noGrp="1"/>
+          </p:cNvSpPr>
+          <p:nvPr>
+            <p:ph idx="1"/>
+          </p:nvPr>
+        </p:nvSpPr>
+        <p:spPr>
+          <a:xfrm>
+            <a:off x="395177" y="669852"/>
+            <a:ext cx="8493642" cy="4724400"/>
+          </a:xfrm>
+        </p:spPr>
+        <p:txBody>
+          <a:bodyPr/>
+          <a:lstStyle/>
+          <a:p>
+            <a:r>
+              <a:rPr lang="en-US" sz="2000" dirty="0" smtClean="0">
+                <a:solidFill>
+                  <a:schemeClr val="accent2"/>
+                </a:solidFill>
+              </a:rPr>
+              <a:t>Two classic methods</a:t>
+            </a:r>
+            <a:endParaRPr lang="en-US" sz="2000" dirty="0">
+              <a:solidFill>
+                <a:schemeClr val="accent2"/>
+              </a:solidFill>
+            </a:endParaRPr>
+          </a:p>
+          <a:p>
+            <a:pPr lvl="1"/>
+            <a:r>
+              <a:rPr lang="en-US" sz="2000" dirty="0" smtClean="0"/>
+              <a:t>Memory-Mapped I/O                        (Motorola)</a:t>
+            </a:r>
+          </a:p>
+          <a:p>
+            <a:pPr lvl="1"/>
+            <a:r>
+              <a:rPr lang="en-US" sz="2000" dirty="0" smtClean="0"/>
+              <a:t>Port-Mapped I/O [or Isolated IO]     (Intel)</a:t>
+            </a:r>
+            <a:endParaRPr lang="en-US" sz="1800" dirty="0" smtClean="0"/>
+          </a:p>
+          <a:p>
+            <a:r>
+              <a:rPr lang="en-US" sz="2000" dirty="0">
+                <a:solidFill>
+                  <a:schemeClr val="accent2"/>
+                </a:solidFill>
+              </a:rPr>
+              <a:t>Memory-Mapped I/O </a:t>
+            </a:r>
+            <a:endParaRPr lang="en-US" sz="2000" dirty="0" smtClean="0">
+              <a:solidFill>
+                <a:schemeClr val="accent2"/>
+              </a:solidFill>
+            </a:endParaRPr>
+          </a:p>
+          <a:p>
+            <a:pPr lvl="1"/>
+            <a:r>
+              <a:rPr lang="en-US" sz="2000" dirty="0" smtClean="0"/>
+              <a:t>I/O and memory SHARE the same address space</a:t>
+            </a:r>
+          </a:p>
+          <a:p>
+            <a:pPr lvl="1"/>
+            <a:r>
+              <a:rPr lang="en-US" sz="2000" dirty="0" smtClean="0"/>
+              <a:t>Advantage</a:t>
+            </a:r>
+          </a:p>
+          <a:p>
+            <a:pPr lvl="2"/>
+            <a:r>
+              <a:rPr lang="en-US" sz="1800" dirty="0" smtClean="0"/>
+              <a:t>Fewer </a:t>
+            </a:r>
+            <a:r>
+              <a:rPr lang="en-US" sz="1800" dirty="0"/>
+              <a:t>instructions</a:t>
+            </a:r>
+          </a:p>
+          <a:p>
+            <a:pPr lvl="2"/>
+            <a:r>
+              <a:rPr lang="en-US" sz="1800" dirty="0" smtClean="0"/>
+              <a:t>Can </a:t>
+            </a:r>
+            <a:r>
+              <a:rPr lang="en-US" sz="1800" dirty="0"/>
+              <a:t>use </a:t>
+            </a:r>
+            <a:r>
+              <a:rPr lang="en-US" sz="1800" dirty="0" smtClean="0"/>
+              <a:t>all addressing modes</a:t>
+            </a:r>
+          </a:p>
+          <a:p>
+            <a:pPr lvl="1"/>
+            <a:r>
+              <a:rPr lang="en-US" sz="2200" dirty="0" smtClean="0"/>
+              <a:t>Disadvantage</a:t>
+            </a:r>
+          </a:p>
+          <a:p>
+            <a:pPr lvl="2"/>
+            <a:r>
+              <a:rPr lang="en-US" sz="1800" dirty="0" smtClean="0"/>
+              <a:t>Lose </a:t>
+            </a:r>
+            <a:r>
+              <a:rPr lang="en-US" sz="1800" dirty="0"/>
+              <a:t>memory to </a:t>
+            </a:r>
+            <a:r>
+              <a:rPr lang="en-US" sz="1800" dirty="0" smtClean="0"/>
+              <a:t>IO</a:t>
+            </a:r>
+          </a:p>
+          <a:p>
+            <a:pPr lvl="2"/>
+            <a:r>
+              <a:rPr lang="en-US" sz="1800" dirty="0" smtClean="0"/>
+              <a:t>Programmer mistakes</a:t>
+            </a:r>
+          </a:p>
+          <a:p>
+            <a:pPr lvl="1"/>
+            <a:r>
+              <a:rPr lang="en-US" sz="2200" dirty="0" smtClean="0"/>
+              <a:t>How to use</a:t>
+            </a:r>
+          </a:p>
+          <a:p>
+            <a:pPr lvl="2"/>
+            <a:r>
+              <a:rPr lang="en-US" sz="1800" dirty="0" err="1" smtClean="0">
+                <a:latin typeface="Courier New" panose="02070309020205020404" pitchFamily="49" charset="0"/>
+                <a:cs typeface="Courier New" panose="02070309020205020404" pitchFamily="49" charset="0"/>
+              </a:rPr>
+              <a:t>mov.b</a:t>
+            </a:r>
+            <a:r>
+              <a:rPr lang="en-US" sz="1800" dirty="0" smtClean="0">
+                <a:latin typeface="Courier New" panose="02070309020205020404" pitchFamily="49" charset="0"/>
+                <a:cs typeface="Courier New" panose="02070309020205020404" pitchFamily="49" charset="0"/>
+              </a:rPr>
+              <a:t> </a:t>
+            </a:r>
+            <a:r>
+              <a:rPr lang="en-US" sz="1800" dirty="0" smtClean="0">
+                <a:latin typeface="Courier New" panose="02070309020205020404" pitchFamily="49" charset="0"/>
+                <a:cs typeface="Courier New" panose="02070309020205020404" pitchFamily="49" charset="0"/>
+              </a:rPr>
+              <a:t>#0x55, &amp;P1OUT</a:t>
+            </a:r>
+          </a:p>
+          <a:p>
+            <a:pPr lvl="2"/>
+            <a:r>
+              <a:rPr lang="en-US" sz="1800" dirty="0" err="1">
+                <a:latin typeface="Courier New" panose="02070309020205020404" pitchFamily="49" charset="0"/>
+                <a:cs typeface="Courier New" panose="02070309020205020404" pitchFamily="49" charset="0"/>
+              </a:rPr>
+              <a:t>m</a:t>
+            </a:r>
+            <a:r>
+              <a:rPr lang="en-US" sz="1800" dirty="0" err="1" smtClean="0">
+                <a:latin typeface="Courier New" panose="02070309020205020404" pitchFamily="49" charset="0"/>
+                <a:cs typeface="Courier New" panose="02070309020205020404" pitchFamily="49" charset="0"/>
+              </a:rPr>
+              <a:t>ov.b</a:t>
+            </a:r>
+            <a:r>
+              <a:rPr lang="en-US" sz="1800" dirty="0" smtClean="0">
+                <a:latin typeface="Courier New" panose="02070309020205020404" pitchFamily="49" charset="0"/>
+                <a:cs typeface="Courier New" panose="02070309020205020404" pitchFamily="49" charset="0"/>
+              </a:rPr>
+              <a:t> </a:t>
+            </a:r>
+            <a:r>
+              <a:rPr lang="en-US" sz="1800" dirty="0">
+                <a:latin typeface="Courier New" panose="02070309020205020404" pitchFamily="49" charset="0"/>
+                <a:cs typeface="Courier New" panose="02070309020205020404" pitchFamily="49" charset="0"/>
+              </a:rPr>
+              <a:t>#0x55, </a:t>
+            </a:r>
+            <a:r>
+              <a:rPr lang="en-US" sz="1800" dirty="0" smtClean="0">
+                <a:latin typeface="Courier New" panose="02070309020205020404" pitchFamily="49" charset="0"/>
+                <a:cs typeface="Courier New" panose="02070309020205020404" pitchFamily="49" charset="0"/>
+              </a:rPr>
+              <a:t>&amp;0x0021</a:t>
+            </a:r>
+          </a:p>
+          <a:p>
+            <a:pPr lvl="1"/>
+            <a:r>
+              <a:rPr lang="en-US" sz="2200" dirty="0" smtClean="0">
+                <a:solidFill>
+                  <a:schemeClr val="accent2"/>
+                </a:solidFill>
+              </a:rPr>
+              <a:t>User’s Guide p 333, Table 8-2 (BB pp 41)</a:t>
+            </a:r>
+          </a:p>
+          <a:p>
+            <a:pPr lvl="1"/>
+            <a:r>
+              <a:rPr lang="en-US" sz="2200" dirty="0" smtClean="0">
+                <a:solidFill>
+                  <a:schemeClr val="accent2"/>
+                </a:solidFill>
+              </a:rPr>
+              <a:t>Watchdog Timer, page 341 (BB pp 42)</a:t>
+            </a:r>
+          </a:p>
+          <a:p>
+            <a:pPr lvl="1"/>
+            <a:endParaRPr lang="en-US" sz="2200" dirty="0"/>
+          </a:p>
+          <a:p>
+            <a:endParaRPr lang="en-US" sz="2000" dirty="0">
+              <a:solidFill>
+                <a:schemeClr val="accent2"/>
+              </a:solidFill>
+            </a:endParaRPr>
+          </a:p>
+        </p:txBody>
+      </p:sp>
+      <p:pic>
+        <p:nvPicPr>
+          <p:cNvPr id="2050" name="Picture 2" descr="MSP430 Memory Map"/>
+          <p:cNvPicPr>
+            <a:picLocks noChangeAspect="1" noChangeArrowheads="1"/>
+          </p:cNvPicPr>
+          <p:nvPr/>
+        </p:nvPicPr>
+        <p:blipFill>
+          <a:blip r:embed="rId2">
+            <a:extLst>
+              <a:ext uri="{28A0092B-C50C-407E-A947-70E740481C1C}">
+                <a14:useLocalDpi xmlns:a14="http://schemas.microsoft.com/office/drawing/2010/main" val="0"/>
+              </a:ext>
+            </a:extLst>
+          </a:blip>
+          <a:srcRect/>
+          <a:stretch>
+            <a:fillRect/>
+          </a:stretch>
+        </p:blipFill>
+        <p:spPr bwMode="auto">
+          <a:xfrm>
+            <a:off x="6018663" y="2513628"/>
+            <a:ext cx="3110914" cy="4343722"/>
+          </a:xfrm>
+          <a:prstGeom prst="rect">
+            <a:avLst/>
+          </a:prstGeom>
+          <a:noFill/>
+          <a:extLst>
+            <a:ext uri="{909E8E84-426E-40DD-AFC4-6F175D3DCCD1}">
+              <a14:hiddenFill xmlns:a14="http://schemas.microsoft.com/office/drawing/2010/main">
+                <a:solidFill>
+                  <a:srgbClr val="FFFFFF"/>
+                </a:solidFill>
+              </a14:hiddenFill>
+            </a:ext>
+          </a:extLst>
+        </p:spPr>
+      </p:pic>
+    </p:spTree>
+    <p:extLst>
+      <p:ext uri="{BB962C8B-B14F-4D97-AF65-F5344CB8AC3E}">
+        <p14:creationId xmlns:p14="http://schemas.microsoft.com/office/powerpoint/2010/main" val="2990205779"/>
       </p:ext>
     </p:extLst>
   </p:cSld>
@@ -8951,7 +8015,7 @@
           <a:p>
             <a:r>
               <a:rPr lang="en-US" b="1" dirty="0" smtClean="0"/>
-              <a:t>Pitfall !!!</a:t>
+              <a:t>How do we talk to Ports? Do I/O?</a:t>
             </a:r>
             <a:endParaRPr lang="en-US" dirty="0"/>
           </a:p>
@@ -8977,10 +8041,134 @@
           <a:bodyPr/>
           <a:lstStyle/>
           <a:p>
-            <a:endParaRPr lang="en-US" sz="2000" dirty="0" smtClean="0">
-              <a:solidFill>
-                <a:schemeClr val="accent2"/>
-              </a:solidFill>
+            <a:r>
+              <a:rPr lang="en-US" sz="2000" dirty="0" smtClean="0">
+                <a:solidFill>
+                  <a:schemeClr val="accent2"/>
+                </a:solidFill>
+              </a:rPr>
+              <a:t>Port-Mapped </a:t>
+            </a:r>
+            <a:r>
+              <a:rPr lang="en-US" sz="2000" dirty="0">
+                <a:solidFill>
+                  <a:schemeClr val="accent2"/>
+                </a:solidFill>
+              </a:rPr>
+              <a:t>I/O </a:t>
+            </a:r>
+            <a:r>
+              <a:rPr lang="en-US" sz="2000" dirty="0" smtClean="0">
+                <a:solidFill>
+                  <a:schemeClr val="accent2"/>
+                </a:solidFill>
+              </a:rPr>
+              <a:t>   </a:t>
+            </a:r>
+            <a:r>
+              <a:rPr lang="en-US" sz="2000" dirty="0" smtClean="0"/>
+              <a:t>(Intel)</a:t>
+            </a:r>
+          </a:p>
+          <a:p>
+            <a:pPr lvl="1"/>
+            <a:r>
+              <a:rPr lang="en-US" sz="2000" dirty="0" smtClean="0"/>
+              <a:t>I/O and memory have their own separate address space</a:t>
+            </a:r>
+          </a:p>
+          <a:p>
+            <a:pPr lvl="1"/>
+            <a:r>
+              <a:rPr lang="en-US" sz="2000" dirty="0" smtClean="0"/>
+              <a:t>Advantage</a:t>
+            </a:r>
+          </a:p>
+          <a:p>
+            <a:pPr lvl="2"/>
+            <a:r>
+              <a:rPr lang="en-US" sz="1800" dirty="0" smtClean="0"/>
+              <a:t>Don't </a:t>
+            </a:r>
+            <a:r>
+              <a:rPr lang="en-US" sz="1800" dirty="0"/>
+              <a:t>lose memory for IO.</a:t>
+            </a:r>
+          </a:p>
+          <a:p>
+            <a:pPr lvl="2"/>
+            <a:r>
+              <a:rPr lang="en-US" sz="1800" dirty="0" smtClean="0"/>
+              <a:t>Protects </a:t>
+            </a:r>
+            <a:r>
+              <a:rPr lang="en-US" sz="1800" dirty="0"/>
+              <a:t>coder from mistakes.</a:t>
+            </a:r>
+          </a:p>
+          <a:p>
+            <a:pPr lvl="1"/>
+            <a:r>
+              <a:rPr lang="en-US" sz="2200" dirty="0" smtClean="0"/>
+              <a:t>Disadvantage</a:t>
+            </a:r>
+          </a:p>
+          <a:p>
+            <a:pPr lvl="2"/>
+            <a:r>
+              <a:rPr lang="en-US" sz="1800" dirty="0" smtClean="0"/>
+              <a:t>Need More Instructions (like In/Out)</a:t>
+            </a:r>
+          </a:p>
+          <a:p>
+            <a:pPr lvl="2"/>
+            <a:r>
+              <a:rPr lang="en-US" sz="1800" dirty="0" smtClean="0"/>
+              <a:t>More restrictive addressing </a:t>
+            </a:r>
+            <a:r>
+              <a:rPr lang="en-US" sz="1800" dirty="0" smtClean="0"/>
+              <a:t>modes</a:t>
+            </a:r>
+          </a:p>
+          <a:p>
+            <a:pPr lvl="2"/>
+            <a:r>
+              <a:rPr lang="en-US" sz="1800" dirty="0" smtClean="0"/>
+              <a:t>Works only with </a:t>
+            </a:r>
+            <a:r>
+              <a:rPr lang="en-US" sz="1800" smtClean="0"/>
+              <a:t>limited registers</a:t>
+            </a:r>
+            <a:endParaRPr lang="en-US" sz="1800" dirty="0" smtClean="0"/>
+          </a:p>
+          <a:p>
+            <a:pPr lvl="1"/>
+            <a:r>
+              <a:rPr lang="en-US" sz="2200" dirty="0" smtClean="0"/>
+              <a:t>How to use</a:t>
+            </a:r>
+          </a:p>
+          <a:p>
+            <a:pPr lvl="2"/>
+            <a:r>
+              <a:rPr lang="en-US" sz="1800" dirty="0" smtClean="0">
+                <a:latin typeface="Courier New" panose="02070309020205020404" pitchFamily="49" charset="0"/>
+                <a:cs typeface="Courier New" panose="02070309020205020404" pitchFamily="49" charset="0"/>
+              </a:rPr>
+              <a:t>Out #0x55, &amp;</a:t>
+            </a:r>
+            <a:r>
+              <a:rPr lang="en-US" sz="1800" dirty="0" smtClean="0">
+                <a:latin typeface="Courier New" panose="02070309020205020404" pitchFamily="49" charset="0"/>
+                <a:cs typeface="Courier New" panose="02070309020205020404" pitchFamily="49" charset="0"/>
+              </a:rPr>
+              <a:t>PORT1</a:t>
+            </a:r>
+            <a:endParaRPr lang="en-US" sz="2200" dirty="0">
+              <a:latin typeface="Courier New" panose="02070309020205020404" pitchFamily="49" charset="0"/>
+              <a:cs typeface="Courier New" panose="02070309020205020404" pitchFamily="49" charset="0"/>
             </a:endParaRPr>
           </a:p>
           <a:p>
@@ -8990,237 +8178,12 @@
               </a:solidFill>
             </a:endParaRPr>
           </a:p>
-          <a:p>
-            <a:endParaRPr lang="en-US" sz="2000" dirty="0" smtClean="0">
-              <a:solidFill>
-                <a:schemeClr val="accent2"/>
-              </a:solidFill>
-            </a:endParaRPr>
-          </a:p>
-          <a:p>
-            <a:endParaRPr lang="en-US" sz="2000" dirty="0">
-              <a:solidFill>
-                <a:schemeClr val="accent2"/>
-              </a:solidFill>
-            </a:endParaRPr>
-          </a:p>
-          <a:p>
-            <a:endParaRPr lang="en-US" sz="2000" dirty="0" smtClean="0">
-              <a:solidFill>
-                <a:schemeClr val="accent2"/>
-              </a:solidFill>
-            </a:endParaRPr>
-          </a:p>
-          <a:p>
-            <a:endParaRPr lang="en-US" sz="2000" dirty="0">
-              <a:solidFill>
-                <a:schemeClr val="accent2"/>
-              </a:solidFill>
-            </a:endParaRPr>
-          </a:p>
-          <a:p>
-            <a:endParaRPr lang="en-US" sz="2000" dirty="0" smtClean="0">
-              <a:solidFill>
-                <a:schemeClr val="accent2"/>
-              </a:solidFill>
-            </a:endParaRPr>
-          </a:p>
-          <a:p>
-            <a:endParaRPr lang="en-US" sz="2000" dirty="0" smtClean="0">
-              <a:solidFill>
-                <a:schemeClr val="accent2"/>
-              </a:solidFill>
-            </a:endParaRPr>
-          </a:p>
-          <a:p>
-            <a:endParaRPr lang="en-US" sz="2000" dirty="0" smtClean="0">
-              <a:solidFill>
-                <a:schemeClr val="accent2"/>
-              </a:solidFill>
-            </a:endParaRPr>
-          </a:p>
-          <a:p>
-            <a:endParaRPr lang="en-US" sz="2000" dirty="0" smtClean="0">
-              <a:solidFill>
-                <a:schemeClr val="accent2"/>
-              </a:solidFill>
-            </a:endParaRPr>
-          </a:p>
-          <a:p>
-            <a:endParaRPr lang="en-US" sz="2000" dirty="0">
-              <a:solidFill>
-                <a:schemeClr val="accent2"/>
-              </a:solidFill>
-            </a:endParaRPr>
-          </a:p>
-          <a:p>
-            <a:endParaRPr lang="en-US" sz="2000" dirty="0" smtClean="0">
-              <a:solidFill>
-                <a:schemeClr val="accent2"/>
-              </a:solidFill>
-            </a:endParaRPr>
-          </a:p>
-          <a:p>
-            <a:pPr marL="0" indent="0">
-              <a:buNone/>
-            </a:pPr>
-            <a:r>
-              <a:rPr lang="en-US" sz="1800" dirty="0" smtClean="0"/>
-              <a:t>Let's </a:t>
-            </a:r>
-            <a:r>
-              <a:rPr lang="en-US" sz="1800" dirty="0"/>
-              <a:t>say I wanted to make the UCA0SOMI function available on </a:t>
-            </a:r>
-            <a:r>
-              <a:rPr lang="en-US" sz="1800" dirty="0" smtClean="0"/>
-              <a:t>P1.1:</a:t>
-            </a:r>
-          </a:p>
-          <a:p>
-            <a:pPr lvl="1"/>
-            <a:r>
-              <a:rPr lang="en-US" sz="1200" dirty="0">
-                <a:solidFill>
-                  <a:srgbClr val="00B050"/>
-                </a:solidFill>
-                <a:latin typeface="Courier New" pitchFamily="49" charset="0"/>
-                <a:cs typeface="Courier New" pitchFamily="49" charset="0"/>
-              </a:rPr>
-              <a:t>; 'from USCI' means this bit is set automatically by the USCI when enabled</a:t>
-            </a:r>
-          </a:p>
-          <a:p>
-            <a:pPr lvl="1"/>
-            <a:r>
-              <a:rPr lang="en-US" sz="1200" dirty="0">
-                <a:latin typeface="Courier New" pitchFamily="49" charset="0"/>
-                <a:cs typeface="Courier New" pitchFamily="49" charset="0"/>
-              </a:rPr>
-              <a:t>    </a:t>
-            </a:r>
-            <a:r>
-              <a:rPr lang="en-US" sz="1200" dirty="0" err="1">
-                <a:latin typeface="Courier New" pitchFamily="49" charset="0"/>
-                <a:cs typeface="Courier New" pitchFamily="49" charset="0"/>
-              </a:rPr>
-              <a:t>bis.b</a:t>
-            </a:r>
-            <a:r>
-              <a:rPr lang="en-US" sz="1200" dirty="0">
-                <a:latin typeface="Courier New" pitchFamily="49" charset="0"/>
-                <a:cs typeface="Courier New" pitchFamily="49" charset="0"/>
-              </a:rPr>
-              <a:t>   #BIT1, P1SEL   </a:t>
-            </a:r>
-          </a:p>
-          <a:p>
-            <a:pPr lvl="1"/>
-            <a:r>
-              <a:rPr lang="en-US" sz="1200" dirty="0">
-                <a:latin typeface="Courier New" pitchFamily="49" charset="0"/>
-                <a:cs typeface="Courier New" pitchFamily="49" charset="0"/>
-              </a:rPr>
-              <a:t>    </a:t>
-            </a:r>
-            <a:r>
-              <a:rPr lang="en-US" sz="1200" dirty="0" err="1">
-                <a:latin typeface="Courier New" pitchFamily="49" charset="0"/>
-                <a:cs typeface="Courier New" pitchFamily="49" charset="0"/>
-              </a:rPr>
-              <a:t>bis.b</a:t>
-            </a:r>
-            <a:r>
-              <a:rPr lang="en-US" sz="1200" dirty="0">
-                <a:latin typeface="Courier New" pitchFamily="49" charset="0"/>
-                <a:cs typeface="Courier New" pitchFamily="49" charset="0"/>
-              </a:rPr>
-              <a:t>   #BIT1, </a:t>
-            </a:r>
-            <a:r>
-              <a:rPr lang="en-US" sz="1200" dirty="0" smtClean="0">
-                <a:latin typeface="Courier New" pitchFamily="49" charset="0"/>
-                <a:cs typeface="Courier New" pitchFamily="49" charset="0"/>
-              </a:rPr>
-              <a:t>P1SEL2</a:t>
-            </a:r>
-            <a:endParaRPr lang="en-US" sz="1600" dirty="0"/>
-          </a:p>
-          <a:p>
-            <a:endParaRPr lang="en-US" sz="2000" dirty="0">
-              <a:solidFill>
-                <a:schemeClr val="accent2"/>
-              </a:solidFill>
-            </a:endParaRPr>
-          </a:p>
-          <a:p>
-            <a:pPr lvl="1"/>
-            <a:endParaRPr lang="en-US" sz="2000" dirty="0" smtClean="0"/>
-          </a:p>
-          <a:p>
-            <a:endParaRPr lang="en-US" sz="2000" dirty="0">
-              <a:solidFill>
-                <a:schemeClr val="accent2"/>
-              </a:solidFill>
-            </a:endParaRPr>
-          </a:p>
-          <a:p>
-            <a:endParaRPr lang="en-US" sz="2000" dirty="0" smtClean="0">
-              <a:solidFill>
-                <a:schemeClr val="accent2"/>
-              </a:solidFill>
-            </a:endParaRPr>
-          </a:p>
-          <a:p>
-            <a:endParaRPr lang="en-US" sz="2000" dirty="0"/>
-          </a:p>
         </p:txBody>
       </p:sp>
-      <p:pic>
-        <p:nvPicPr>
-          <p:cNvPr id="3074" name="Picture 2" descr="P1.0-2 Multiplexing Control Bits / Signals"/>
-          <p:cNvPicPr>
-            <a:picLocks noChangeAspect="1" noChangeArrowheads="1"/>
-          </p:cNvPicPr>
-          <p:nvPr/>
-        </p:nvPicPr>
-        <p:blipFill>
-          <a:blip r:embed="rId2">
-            <a:extLst>
-              <a:ext uri="{28A0092B-C50C-407E-A947-70E740481C1C}">
-                <a14:useLocalDpi xmlns:a14="http://schemas.microsoft.com/office/drawing/2010/main" val="0"/>
-              </a:ext>
-            </a:extLst>
-          </a:blip>
-          <a:srcRect/>
-          <a:stretch>
-            <a:fillRect/>
-          </a:stretch>
-        </p:blipFill>
-        <p:spPr bwMode="auto">
-          <a:xfrm>
-            <a:off x="1183264" y="119695"/>
-            <a:ext cx="6753225" cy="4848225"/>
-          </a:xfrm>
-          <a:prstGeom prst="rect">
-            <a:avLst/>
-          </a:prstGeom>
-          <a:noFill/>
-          <a:extLst>
-            <a:ext uri="{909E8E84-426E-40DD-AFC4-6F175D3DCCD1}">
-              <a14:hiddenFill xmlns:a14="http://schemas.microsoft.com/office/drawing/2010/main">
-                <a:solidFill>
-                  <a:srgbClr val="FFFFFF"/>
-                </a:solidFill>
-              </a14:hiddenFill>
-            </a:ext>
-          </a:extLst>
-        </p:spPr>
-      </p:pic>
     </p:spTree>
     <p:extLst>
       <p:ext uri="{BB962C8B-B14F-4D97-AF65-F5344CB8AC3E}">
-        <p14:creationId xmlns:p14="http://schemas.microsoft.com/office/powerpoint/2010/main" val="307478788"/>
+        <p14:creationId xmlns:p14="http://schemas.microsoft.com/office/powerpoint/2010/main" val="645359394"/>
       </p:ext>
     </p:extLst>
   </p:cSld>
@@ -9270,8 +8233,8 @@
           <a:lstStyle/>
           <a:p>
             <a:r>
-              <a:rPr lang="en-US" b="1" dirty="0" smtClean="0"/>
-              <a:t>How do we talk to Ports? Do I/O?</a:t>
+              <a:rPr lang="en-US" b="1" dirty="0"/>
+              <a:t>General Purpose Input Output (GPIO)</a:t>
             </a:r>
             <a:endParaRPr lang="en-US" dirty="0"/>
           </a:p>
@@ -9298,231 +8261,705 @@
           <a:lstStyle/>
           <a:p>
             <a:r>
+              <a:rPr lang="en-US" sz="2000" dirty="0">
+                <a:solidFill>
+                  <a:schemeClr val="accent2"/>
+                </a:solidFill>
+              </a:rPr>
+              <a:t>The registers used to configure GPIO are </a:t>
+            </a:r>
+            <a:r>
+              <a:rPr lang="en-US" sz="2000" dirty="0" err="1">
+                <a:solidFill>
+                  <a:schemeClr val="accent2"/>
+                </a:solidFill>
+              </a:rPr>
+              <a:t>PxDIR</a:t>
+            </a:r>
+            <a:r>
               <a:rPr lang="en-US" sz="2000" dirty="0" smtClean="0">
                 <a:solidFill>
                   <a:schemeClr val="accent2"/>
                 </a:solidFill>
               </a:rPr>
-              <a:t>Two classic methods</a:t>
-            </a:r>
+              <a:t>, </a:t>
+            </a:r>
+            <a:r>
+              <a:rPr lang="en-US" sz="2000" dirty="0" err="1" smtClean="0">
+                <a:solidFill>
+                  <a:schemeClr val="accent2"/>
+                </a:solidFill>
+              </a:rPr>
+              <a:t>PxREN</a:t>
+            </a:r>
+            <a:r>
+              <a:rPr lang="en-US" sz="2000" dirty="0" smtClean="0">
+                <a:solidFill>
+                  <a:schemeClr val="accent2"/>
+                </a:solidFill>
+              </a:rPr>
+              <a:t>, </a:t>
+            </a:r>
+            <a:r>
+              <a:rPr lang="en-US" sz="2000" dirty="0" err="1">
+                <a:solidFill>
+                  <a:schemeClr val="accent2"/>
+                </a:solidFill>
+              </a:rPr>
+              <a:t>PxOUT</a:t>
+            </a:r>
+            <a:r>
+              <a:rPr lang="en-US" sz="2000" dirty="0">
+                <a:solidFill>
+                  <a:schemeClr val="accent2"/>
+                </a:solidFill>
+              </a:rPr>
+              <a:t>, and </a:t>
+            </a:r>
+            <a:r>
+              <a:rPr lang="en-US" sz="2000" dirty="0" err="1" smtClean="0">
+                <a:solidFill>
+                  <a:schemeClr val="accent2"/>
+                </a:solidFill>
+              </a:rPr>
+              <a:t>PxIN</a:t>
+            </a:r>
+            <a:endParaRPr lang="en-US" sz="2000" dirty="0" smtClean="0">
+              <a:solidFill>
+                <a:schemeClr val="accent2"/>
+              </a:solidFill>
+            </a:endParaRPr>
+          </a:p>
+          <a:p>
+            <a:pPr lvl="1"/>
+            <a:r>
+              <a:rPr lang="en-US" sz="1800" dirty="0" err="1" smtClean="0"/>
+              <a:t>PxDIR</a:t>
+            </a:r>
+            <a:r>
+              <a:rPr lang="en-US" sz="1800" dirty="0" smtClean="0"/>
+              <a:t> </a:t>
+            </a:r>
+            <a:r>
+              <a:rPr lang="en-US" sz="1800" dirty="0"/>
+              <a:t>configures which pins are input and which pins are output </a:t>
+            </a:r>
+          </a:p>
+          <a:p>
+            <a:pPr lvl="2"/>
+            <a:r>
+              <a:rPr lang="en-US" sz="1400" dirty="0" smtClean="0"/>
+              <a:t>1 </a:t>
+            </a:r>
+            <a:r>
+              <a:rPr lang="en-US" sz="1400" dirty="0"/>
+              <a:t>corresponds to output, 0 to input</a:t>
+            </a:r>
+          </a:p>
+          <a:p>
+            <a:pPr lvl="1"/>
+            <a:r>
+              <a:rPr lang="en-US" sz="1800" dirty="0" err="1"/>
+              <a:t>PxREN</a:t>
+            </a:r>
+            <a:r>
+              <a:rPr lang="en-US" sz="1800" dirty="0"/>
+              <a:t> controls pull up / pull down resistors to avoid floating inputs</a:t>
+            </a:r>
+            <a:r>
+              <a:rPr lang="en-US" sz="1800" dirty="0" smtClean="0"/>
+              <a:t>.</a:t>
+            </a:r>
+          </a:p>
+          <a:p>
+            <a:pPr lvl="1"/>
+            <a:r>
+              <a:rPr lang="en-US" sz="1800" dirty="0" smtClean="0"/>
+              <a:t>Writing </a:t>
+            </a:r>
+            <a:r>
+              <a:rPr lang="en-US" sz="1800" dirty="0"/>
+              <a:t>to </a:t>
+            </a:r>
+            <a:r>
+              <a:rPr lang="en-US" sz="1800" dirty="0" err="1"/>
+              <a:t>PxOUT</a:t>
+            </a:r>
+            <a:r>
+              <a:rPr lang="en-US" sz="1800" dirty="0"/>
+              <a:t> controls the output of each pin</a:t>
+            </a:r>
+          </a:p>
+          <a:p>
+            <a:pPr lvl="1"/>
+            <a:r>
+              <a:rPr lang="en-US" sz="1800" dirty="0" err="1" smtClean="0"/>
+              <a:t>PxIN</a:t>
+            </a:r>
+            <a:r>
+              <a:rPr lang="en-US" sz="1800" dirty="0" smtClean="0"/>
+              <a:t> </a:t>
+            </a:r>
+            <a:r>
+              <a:rPr lang="en-US" sz="1800" dirty="0"/>
+              <a:t>allows you to read the values on these </a:t>
+            </a:r>
+            <a:r>
+              <a:rPr lang="en-US" sz="1800" dirty="0" smtClean="0"/>
+              <a:t>pins</a:t>
+            </a:r>
+          </a:p>
+          <a:p>
+            <a:pPr lvl="1"/>
+            <a:endParaRPr lang="en-US" sz="1800" dirty="0"/>
+          </a:p>
+          <a:p>
+            <a:pPr marL="0" indent="0">
+              <a:buNone/>
+            </a:pPr>
+            <a:r>
+              <a:rPr lang="en-US" sz="1800" dirty="0"/>
+              <a:t>Let's write a program that controls the onboard LEDs with the onboard push button</a:t>
+            </a:r>
+            <a:r>
+              <a:rPr lang="en-US" sz="1800" dirty="0">
+                <a:solidFill>
+                  <a:schemeClr val="accent2"/>
+                </a:solidFill>
+                <a:latin typeface="Courier New" pitchFamily="49" charset="0"/>
+                <a:cs typeface="Courier New" pitchFamily="49" charset="0"/>
+              </a:rPr>
+              <a:t>  </a:t>
+            </a:r>
+          </a:p>
+          <a:p>
+            <a:pPr marL="0" indent="0">
+              <a:buNone/>
+            </a:pPr>
+            <a:endParaRPr lang="en-US" sz="1400" dirty="0">
+              <a:solidFill>
+                <a:schemeClr val="accent2"/>
+              </a:solidFill>
+              <a:latin typeface="Courier New" pitchFamily="49" charset="0"/>
+              <a:cs typeface="Courier New" pitchFamily="49" charset="0"/>
+            </a:endParaRPr>
+          </a:p>
+          <a:p>
+            <a:pPr marL="0" indent="0">
+              <a:buNone/>
+            </a:pPr>
+            <a:r>
+              <a:rPr lang="en-US" sz="1400" dirty="0">
+                <a:solidFill>
+                  <a:schemeClr val="accent2"/>
+                </a:solidFill>
+                <a:latin typeface="Courier New" pitchFamily="49" charset="0"/>
+                <a:cs typeface="Courier New" pitchFamily="49" charset="0"/>
+              </a:rPr>
+              <a:t>              </a:t>
+            </a:r>
+            <a:r>
+              <a:rPr lang="en-US" sz="1400" dirty="0" err="1">
+                <a:solidFill>
+                  <a:schemeClr val="accent2"/>
+                </a:solidFill>
+                <a:latin typeface="Courier New" pitchFamily="49" charset="0"/>
+                <a:cs typeface="Courier New" pitchFamily="49" charset="0"/>
+              </a:rPr>
+              <a:t>bis.b</a:t>
+            </a:r>
+            <a:r>
+              <a:rPr lang="en-US" sz="1400" dirty="0">
+                <a:solidFill>
+                  <a:schemeClr val="accent2"/>
+                </a:solidFill>
+                <a:latin typeface="Courier New" pitchFamily="49" charset="0"/>
+                <a:cs typeface="Courier New" pitchFamily="49" charset="0"/>
+              </a:rPr>
+              <a:t>  #BIT0|BIT6, &amp;P1DIR</a:t>
+            </a:r>
+          </a:p>
+          <a:p>
+            <a:pPr marL="0" indent="0">
+              <a:buNone/>
+            </a:pPr>
+            <a:r>
+              <a:rPr lang="en-US" sz="1400" dirty="0">
+                <a:solidFill>
+                  <a:schemeClr val="accent2"/>
+                </a:solidFill>
+                <a:latin typeface="Courier New" pitchFamily="49" charset="0"/>
+                <a:cs typeface="Courier New" pitchFamily="49" charset="0"/>
+              </a:rPr>
+              <a:t>              </a:t>
+            </a:r>
+            <a:r>
+              <a:rPr lang="en-US" sz="1400" dirty="0" err="1">
+                <a:solidFill>
+                  <a:schemeClr val="accent2"/>
+                </a:solidFill>
+                <a:latin typeface="Courier New" pitchFamily="49" charset="0"/>
+                <a:cs typeface="Courier New" pitchFamily="49" charset="0"/>
+              </a:rPr>
+              <a:t>bic.b</a:t>
+            </a:r>
+            <a:r>
+              <a:rPr lang="en-US" sz="1400" dirty="0">
+                <a:solidFill>
+                  <a:schemeClr val="accent2"/>
+                </a:solidFill>
+                <a:latin typeface="Courier New" pitchFamily="49" charset="0"/>
+                <a:cs typeface="Courier New" pitchFamily="49" charset="0"/>
+              </a:rPr>
+              <a:t>  #BIT3, &amp;P1DIR</a:t>
+            </a:r>
+          </a:p>
+          <a:p>
+            <a:pPr marL="0" indent="0">
+              <a:buNone/>
+            </a:pPr>
+            <a:endParaRPr lang="en-US" sz="1400" dirty="0">
+              <a:solidFill>
+                <a:schemeClr val="accent2"/>
+              </a:solidFill>
+              <a:latin typeface="Courier New" pitchFamily="49" charset="0"/>
+              <a:cs typeface="Courier New" pitchFamily="49" charset="0"/>
+            </a:endParaRPr>
+          </a:p>
+          <a:p>
+            <a:pPr marL="0" indent="0">
+              <a:buNone/>
+            </a:pPr>
+            <a:r>
+              <a:rPr lang="en-US" sz="1400" dirty="0" err="1">
+                <a:solidFill>
+                  <a:schemeClr val="accent2"/>
+                </a:solidFill>
+                <a:latin typeface="Courier New" pitchFamily="49" charset="0"/>
+                <a:cs typeface="Courier New" pitchFamily="49" charset="0"/>
+              </a:rPr>
+              <a:t>check_btn</a:t>
+            </a:r>
+            <a:r>
+              <a:rPr lang="en-US" sz="1400" dirty="0">
+                <a:solidFill>
+                  <a:schemeClr val="accent2"/>
+                </a:solidFill>
+                <a:latin typeface="Courier New" pitchFamily="49" charset="0"/>
+                <a:cs typeface="Courier New" pitchFamily="49" charset="0"/>
+              </a:rPr>
+              <a:t>:    </a:t>
+            </a:r>
+            <a:r>
+              <a:rPr lang="en-US" sz="1400" dirty="0" err="1">
+                <a:solidFill>
+                  <a:schemeClr val="accent2"/>
+                </a:solidFill>
+                <a:latin typeface="Courier New" pitchFamily="49" charset="0"/>
+                <a:cs typeface="Courier New" pitchFamily="49" charset="0"/>
+              </a:rPr>
+              <a:t>bit.b</a:t>
+            </a:r>
+            <a:r>
+              <a:rPr lang="en-US" sz="1400" dirty="0">
+                <a:solidFill>
+                  <a:schemeClr val="accent2"/>
+                </a:solidFill>
+                <a:latin typeface="Courier New" pitchFamily="49" charset="0"/>
+                <a:cs typeface="Courier New" pitchFamily="49" charset="0"/>
+              </a:rPr>
+              <a:t>  #BIT3, &amp;</a:t>
+            </a:r>
+            <a:r>
+              <a:rPr lang="en-US" sz="1400" dirty="0" smtClean="0">
+                <a:solidFill>
+                  <a:schemeClr val="accent2"/>
+                </a:solidFill>
+                <a:latin typeface="Courier New" pitchFamily="49" charset="0"/>
+                <a:cs typeface="Courier New" pitchFamily="49" charset="0"/>
+              </a:rPr>
+              <a:t>P1IN</a:t>
+            </a:r>
+            <a:r>
+              <a:rPr lang="en-US" sz="1400" dirty="0">
+                <a:solidFill>
+                  <a:schemeClr val="accent2"/>
+                </a:solidFill>
+                <a:latin typeface="Courier New" pitchFamily="49" charset="0"/>
+                <a:cs typeface="Courier New" pitchFamily="49" charset="0"/>
+              </a:rPr>
+              <a:t> </a:t>
+            </a:r>
+            <a:r>
+              <a:rPr lang="en-US" sz="1400" dirty="0" smtClean="0">
+                <a:solidFill>
+                  <a:schemeClr val="accent2"/>
+                </a:solidFill>
+                <a:latin typeface="Courier New" pitchFamily="49" charset="0"/>
+                <a:cs typeface="Courier New" pitchFamily="49" charset="0"/>
+              </a:rPr>
+              <a:t>          </a:t>
+            </a:r>
+            <a:r>
+              <a:rPr lang="en-US" sz="1400" dirty="0" smtClean="0">
+                <a:solidFill>
+                  <a:srgbClr val="00B050"/>
+                </a:solidFill>
+                <a:latin typeface="Courier New" pitchFamily="49" charset="0"/>
+                <a:cs typeface="Courier New" pitchFamily="49" charset="0"/>
+              </a:rPr>
+              <a:t>;</a:t>
+            </a:r>
+            <a:r>
+              <a:rPr lang="en-US" sz="1400" dirty="0">
+                <a:solidFill>
+                  <a:srgbClr val="00B050"/>
+                </a:solidFill>
+                <a:latin typeface="Courier New" pitchFamily="49" charset="0"/>
+                <a:cs typeface="Courier New" pitchFamily="49" charset="0"/>
+              </a:rPr>
+              <a:t>push button is LOW on push</a:t>
+            </a:r>
+            <a:endParaRPr lang="en-US" sz="1400" dirty="0">
+              <a:solidFill>
+                <a:schemeClr val="accent2"/>
+              </a:solidFill>
+              <a:latin typeface="Courier New" pitchFamily="49" charset="0"/>
+              <a:cs typeface="Courier New" pitchFamily="49" charset="0"/>
+            </a:endParaRPr>
+          </a:p>
+          <a:p>
+            <a:pPr marL="0" indent="0">
+              <a:buNone/>
+            </a:pPr>
+            <a:r>
+              <a:rPr lang="en-US" sz="1400" dirty="0">
+                <a:solidFill>
+                  <a:schemeClr val="accent2"/>
+                </a:solidFill>
+                <a:latin typeface="Courier New" pitchFamily="49" charset="0"/>
+                <a:cs typeface="Courier New" pitchFamily="49" charset="0"/>
+              </a:rPr>
+              <a:t>              </a:t>
+            </a:r>
+            <a:r>
+              <a:rPr lang="en-US" sz="1400" dirty="0" err="1">
+                <a:solidFill>
+                  <a:schemeClr val="accent2"/>
+                </a:solidFill>
+                <a:latin typeface="Courier New" pitchFamily="49" charset="0"/>
+                <a:cs typeface="Courier New" pitchFamily="49" charset="0"/>
+              </a:rPr>
+              <a:t>jz</a:t>
+            </a:r>
+            <a:r>
+              <a:rPr lang="en-US" sz="1400" dirty="0">
+                <a:solidFill>
+                  <a:schemeClr val="accent2"/>
+                </a:solidFill>
+                <a:latin typeface="Courier New" pitchFamily="49" charset="0"/>
+                <a:cs typeface="Courier New" pitchFamily="49" charset="0"/>
+              </a:rPr>
+              <a:t>     </a:t>
+            </a:r>
+            <a:r>
+              <a:rPr lang="en-US" sz="1400" dirty="0" err="1">
+                <a:solidFill>
+                  <a:schemeClr val="accent2"/>
+                </a:solidFill>
+                <a:latin typeface="Courier New" pitchFamily="49" charset="0"/>
+                <a:cs typeface="Courier New" pitchFamily="49" charset="0"/>
+              </a:rPr>
+              <a:t>set_lights</a:t>
+            </a:r>
+            <a:endParaRPr lang="en-US" sz="1400" dirty="0">
+              <a:solidFill>
+                <a:schemeClr val="accent2"/>
+              </a:solidFill>
+              <a:latin typeface="Courier New" pitchFamily="49" charset="0"/>
+              <a:cs typeface="Courier New" pitchFamily="49" charset="0"/>
+            </a:endParaRPr>
+          </a:p>
+          <a:p>
+            <a:pPr marL="0" indent="0">
+              <a:buNone/>
+            </a:pPr>
+            <a:r>
+              <a:rPr lang="en-US" sz="1400" dirty="0">
+                <a:solidFill>
+                  <a:schemeClr val="accent2"/>
+                </a:solidFill>
+                <a:latin typeface="Courier New" pitchFamily="49" charset="0"/>
+                <a:cs typeface="Courier New" pitchFamily="49" charset="0"/>
+              </a:rPr>
+              <a:t>              </a:t>
+            </a:r>
+            <a:r>
+              <a:rPr lang="en-US" sz="1400" dirty="0" err="1">
+                <a:solidFill>
+                  <a:schemeClr val="accent2"/>
+                </a:solidFill>
+                <a:latin typeface="Courier New" pitchFamily="49" charset="0"/>
+                <a:cs typeface="Courier New" pitchFamily="49" charset="0"/>
+              </a:rPr>
+              <a:t>bic.b</a:t>
+            </a:r>
+            <a:r>
+              <a:rPr lang="en-US" sz="1400" dirty="0">
+                <a:solidFill>
+                  <a:schemeClr val="accent2"/>
+                </a:solidFill>
+                <a:latin typeface="Courier New" pitchFamily="49" charset="0"/>
+                <a:cs typeface="Courier New" pitchFamily="49" charset="0"/>
+              </a:rPr>
+              <a:t>  #BIT0|BIT6, &amp;P1OUT</a:t>
+            </a:r>
+          </a:p>
+          <a:p>
+            <a:pPr marL="0" indent="0">
+              <a:buNone/>
+            </a:pPr>
+            <a:r>
+              <a:rPr lang="en-US" sz="1400" dirty="0">
+                <a:solidFill>
+                  <a:schemeClr val="accent2"/>
+                </a:solidFill>
+                <a:latin typeface="Courier New" pitchFamily="49" charset="0"/>
+                <a:cs typeface="Courier New" pitchFamily="49" charset="0"/>
+              </a:rPr>
+              <a:t>              </a:t>
+            </a:r>
+            <a:r>
+              <a:rPr lang="en-US" sz="1400" dirty="0" err="1">
+                <a:solidFill>
+                  <a:schemeClr val="accent2"/>
+                </a:solidFill>
+                <a:latin typeface="Courier New" pitchFamily="49" charset="0"/>
+                <a:cs typeface="Courier New" pitchFamily="49" charset="0"/>
+              </a:rPr>
+              <a:t>jmp</a:t>
+            </a:r>
+            <a:r>
+              <a:rPr lang="en-US" sz="1400" dirty="0">
+                <a:solidFill>
+                  <a:schemeClr val="accent2"/>
+                </a:solidFill>
+                <a:latin typeface="Courier New" pitchFamily="49" charset="0"/>
+                <a:cs typeface="Courier New" pitchFamily="49" charset="0"/>
+              </a:rPr>
+              <a:t>    </a:t>
+            </a:r>
+            <a:r>
+              <a:rPr lang="en-US" sz="1400" dirty="0" err="1">
+                <a:solidFill>
+                  <a:schemeClr val="accent2"/>
+                </a:solidFill>
+                <a:latin typeface="Courier New" pitchFamily="49" charset="0"/>
+                <a:cs typeface="Courier New" pitchFamily="49" charset="0"/>
+              </a:rPr>
+              <a:t>check_btn</a:t>
+            </a:r>
+            <a:endParaRPr lang="en-US" sz="1400" dirty="0">
+              <a:solidFill>
+                <a:schemeClr val="accent2"/>
+              </a:solidFill>
+              <a:latin typeface="Courier New" pitchFamily="49" charset="0"/>
+              <a:cs typeface="Courier New" pitchFamily="49" charset="0"/>
+            </a:endParaRPr>
+          </a:p>
+          <a:p>
+            <a:pPr marL="0" indent="0">
+              <a:buNone/>
+            </a:pPr>
+            <a:r>
+              <a:rPr lang="en-US" sz="1400" dirty="0" err="1">
+                <a:solidFill>
+                  <a:schemeClr val="accent2"/>
+                </a:solidFill>
+                <a:latin typeface="Courier New" pitchFamily="49" charset="0"/>
+                <a:cs typeface="Courier New" pitchFamily="49" charset="0"/>
+              </a:rPr>
+              <a:t>set_lights</a:t>
+            </a:r>
+            <a:r>
+              <a:rPr lang="en-US" sz="1400" dirty="0">
+                <a:solidFill>
+                  <a:schemeClr val="accent2"/>
+                </a:solidFill>
+                <a:latin typeface="Courier New" pitchFamily="49" charset="0"/>
+                <a:cs typeface="Courier New" pitchFamily="49" charset="0"/>
+              </a:rPr>
+              <a:t>:   </a:t>
+            </a:r>
+            <a:r>
+              <a:rPr lang="en-US" sz="1400" dirty="0" err="1">
+                <a:solidFill>
+                  <a:schemeClr val="accent2"/>
+                </a:solidFill>
+                <a:latin typeface="Courier New" pitchFamily="49" charset="0"/>
+                <a:cs typeface="Courier New" pitchFamily="49" charset="0"/>
+              </a:rPr>
+              <a:t>bis.b</a:t>
+            </a:r>
+            <a:r>
+              <a:rPr lang="en-US" sz="1400" dirty="0">
+                <a:solidFill>
+                  <a:schemeClr val="accent2"/>
+                </a:solidFill>
+                <a:latin typeface="Courier New" pitchFamily="49" charset="0"/>
+                <a:cs typeface="Courier New" pitchFamily="49" charset="0"/>
+              </a:rPr>
+              <a:t>  #BIT0|BIT6, &amp;P1OUT</a:t>
+            </a:r>
+          </a:p>
+          <a:p>
+            <a:pPr marL="0" indent="0">
+              <a:buNone/>
+            </a:pPr>
+            <a:r>
+              <a:rPr lang="en-US" sz="1400" dirty="0">
+                <a:solidFill>
+                  <a:schemeClr val="accent2"/>
+                </a:solidFill>
+                <a:latin typeface="Courier New" pitchFamily="49" charset="0"/>
+                <a:cs typeface="Courier New" pitchFamily="49" charset="0"/>
+              </a:rPr>
+              <a:t>              </a:t>
+            </a:r>
+            <a:r>
+              <a:rPr lang="en-US" sz="1400" dirty="0" err="1">
+                <a:solidFill>
+                  <a:schemeClr val="accent2"/>
+                </a:solidFill>
+                <a:latin typeface="Courier New" pitchFamily="49" charset="0"/>
+                <a:cs typeface="Courier New" pitchFamily="49" charset="0"/>
+              </a:rPr>
+              <a:t>jmp</a:t>
+            </a:r>
+            <a:r>
+              <a:rPr lang="en-US" sz="1400" dirty="0">
+                <a:solidFill>
+                  <a:schemeClr val="accent2"/>
+                </a:solidFill>
+                <a:latin typeface="Courier New" pitchFamily="49" charset="0"/>
+                <a:cs typeface="Courier New" pitchFamily="49" charset="0"/>
+              </a:rPr>
+              <a:t>    </a:t>
+            </a:r>
+            <a:r>
+              <a:rPr lang="en-US" sz="1400" dirty="0" err="1">
+                <a:solidFill>
+                  <a:schemeClr val="accent2"/>
+                </a:solidFill>
+                <a:latin typeface="Courier New" pitchFamily="49" charset="0"/>
+                <a:cs typeface="Courier New" pitchFamily="49" charset="0"/>
+              </a:rPr>
+              <a:t>check_btn</a:t>
+            </a:r>
+            <a:endParaRPr lang="en-US" sz="1400" dirty="0">
+              <a:solidFill>
+                <a:schemeClr val="accent2"/>
+              </a:solidFill>
+              <a:latin typeface="Courier New" pitchFamily="49" charset="0"/>
+              <a:cs typeface="Courier New" pitchFamily="49" charset="0"/>
+            </a:endParaRPr>
+          </a:p>
+          <a:p>
+            <a:pPr marL="0" indent="0">
+              <a:buNone/>
+            </a:pPr>
+            <a:endParaRPr lang="en-US" sz="1400" dirty="0">
+              <a:solidFill>
+                <a:schemeClr val="accent2"/>
+              </a:solidFill>
+              <a:latin typeface="Courier New" pitchFamily="49" charset="0"/>
+              <a:cs typeface="Courier New" pitchFamily="49" charset="0"/>
+            </a:endParaRPr>
+          </a:p>
+          <a:p>
+            <a:pPr marL="0" indent="0">
+              <a:buNone/>
+            </a:pPr>
+            <a:endParaRPr lang="en-US" sz="1400" dirty="0">
+              <a:solidFill>
+                <a:schemeClr val="accent2"/>
+              </a:solidFill>
+              <a:latin typeface="Courier New" pitchFamily="49" charset="0"/>
+              <a:cs typeface="Courier New" pitchFamily="49" charset="0"/>
+            </a:endParaRPr>
+          </a:p>
+          <a:p>
+            <a:pPr marL="0" indent="0">
+              <a:buNone/>
+            </a:pPr>
+            <a:r>
+              <a:rPr lang="en-US" sz="2000" dirty="0"/>
+              <a:t>Any problem with this code?</a:t>
+            </a:r>
+            <a:endParaRPr lang="en-US" sz="2000" dirty="0">
+              <a:solidFill>
+                <a:schemeClr val="accent2"/>
+              </a:solidFill>
+              <a:latin typeface="Courier New" pitchFamily="49" charset="0"/>
+              <a:cs typeface="Courier New" pitchFamily="49" charset="0"/>
+            </a:endParaRPr>
+          </a:p>
+          <a:p>
+            <a:pPr lvl="1"/>
+            <a:endParaRPr lang="en-US" sz="1600" dirty="0"/>
+          </a:p>
+          <a:p>
+            <a:pPr lvl="1"/>
+            <a:endParaRPr lang="en-US" sz="2200" dirty="0"/>
+          </a:p>
+          <a:p>
             <a:endParaRPr lang="en-US" sz="2000" dirty="0">
               <a:solidFill>
                 <a:schemeClr val="accent2"/>
               </a:solidFill>
             </a:endParaRPr>
           </a:p>
-          <a:p>
-            <a:pPr lvl="1"/>
-            <a:r>
-              <a:rPr lang="en-US" sz="2000" dirty="0" smtClean="0"/>
-              <a:t>Memory-Mapped I/O                        (Motorola)</a:t>
-            </a:r>
-          </a:p>
-          <a:p>
-            <a:pPr lvl="1"/>
-            <a:r>
-              <a:rPr lang="en-US" sz="2000" dirty="0" smtClean="0"/>
-              <a:t>Port-Mapped I/O [or Isolated IO]     (Intel)</a:t>
-            </a:r>
-            <a:endParaRPr lang="en-US" sz="1800" dirty="0" smtClean="0"/>
-          </a:p>
-          <a:p>
-            <a:r>
-              <a:rPr lang="en-US" sz="2000" dirty="0">
-                <a:solidFill>
-                  <a:schemeClr val="accent2"/>
-                </a:solidFill>
-              </a:rPr>
-              <a:t>Memory-Mapped I/O </a:t>
-            </a:r>
-            <a:endParaRPr lang="en-US" sz="2000" dirty="0" smtClean="0">
-              <a:solidFill>
-                <a:schemeClr val="accent2"/>
-              </a:solidFill>
-            </a:endParaRPr>
-          </a:p>
-          <a:p>
-            <a:pPr lvl="1"/>
-            <a:r>
-              <a:rPr lang="en-US" sz="2000" dirty="0" smtClean="0"/>
-              <a:t>I/O and memory SHARE the same address space</a:t>
-            </a:r>
-          </a:p>
-          <a:p>
-            <a:pPr lvl="1"/>
-            <a:r>
-              <a:rPr lang="en-US" sz="2000" dirty="0" smtClean="0"/>
-              <a:t>Advantage</a:t>
-            </a:r>
-          </a:p>
-          <a:p>
-            <a:pPr lvl="2"/>
-            <a:r>
-              <a:rPr lang="en-US" sz="1800" dirty="0" smtClean="0"/>
-              <a:t>Fewer </a:t>
-            </a:r>
-            <a:r>
-              <a:rPr lang="en-US" sz="1800" dirty="0"/>
-              <a:t>instructions</a:t>
-            </a:r>
-          </a:p>
-          <a:p>
-            <a:pPr lvl="2"/>
-            <a:r>
-              <a:rPr lang="en-US" sz="1800" dirty="0" smtClean="0"/>
-              <a:t>Can </a:t>
-            </a:r>
-            <a:r>
-              <a:rPr lang="en-US" sz="1800" dirty="0"/>
-              <a:t>use </a:t>
-            </a:r>
-            <a:r>
-              <a:rPr lang="en-US" sz="1800" dirty="0" smtClean="0"/>
-              <a:t>all addressing modes</a:t>
-            </a:r>
-          </a:p>
-          <a:p>
-            <a:pPr lvl="1"/>
-            <a:r>
-              <a:rPr lang="en-US" sz="2200" dirty="0" smtClean="0"/>
-              <a:t>Disadvantage</a:t>
-            </a:r>
-          </a:p>
-          <a:p>
-            <a:pPr lvl="2"/>
-            <a:r>
-              <a:rPr lang="en-US" sz="1800" dirty="0" smtClean="0"/>
-              <a:t>Lose </a:t>
-            </a:r>
-            <a:r>
-              <a:rPr lang="en-US" sz="1800" dirty="0"/>
-              <a:t>memory to </a:t>
-            </a:r>
-            <a:r>
-              <a:rPr lang="en-US" sz="1800" dirty="0" smtClean="0"/>
-              <a:t>IO</a:t>
-            </a:r>
-          </a:p>
-          <a:p>
-            <a:pPr lvl="2"/>
-            <a:r>
-              <a:rPr lang="en-US" sz="1800" dirty="0" smtClean="0"/>
-              <a:t>Programmer mistakes</a:t>
-            </a:r>
-          </a:p>
-          <a:p>
-            <a:pPr lvl="1"/>
-            <a:r>
-              <a:rPr lang="en-US" sz="2200" dirty="0" smtClean="0"/>
-              <a:t>How to use</a:t>
-            </a:r>
-          </a:p>
-          <a:p>
-            <a:pPr lvl="2"/>
-            <a:r>
-              <a:rPr lang="en-US" sz="1800" dirty="0" err="1" smtClean="0"/>
-              <a:t>Mov</a:t>
-            </a:r>
-            <a:r>
-              <a:rPr lang="en-US" sz="1800" dirty="0" smtClean="0"/>
-              <a:t> #0x55, &amp;P1OUT</a:t>
-            </a:r>
-          </a:p>
-          <a:p>
-            <a:pPr lvl="2"/>
-            <a:r>
-              <a:rPr lang="en-US" sz="1800" dirty="0" err="1"/>
-              <a:t>Mov</a:t>
-            </a:r>
-            <a:r>
-              <a:rPr lang="en-US" sz="1800" dirty="0"/>
-              <a:t> #0x55, </a:t>
-            </a:r>
-            <a:r>
-              <a:rPr lang="en-US" sz="1800" dirty="0" smtClean="0"/>
-              <a:t>&amp;0x0021</a:t>
-            </a:r>
-          </a:p>
-          <a:p>
-            <a:pPr lvl="1"/>
-            <a:r>
-              <a:rPr lang="en-US" sz="2200" dirty="0" smtClean="0">
-                <a:solidFill>
-                  <a:schemeClr val="accent2"/>
-                </a:solidFill>
-              </a:rPr>
-              <a:t>User’s Guide p 333, Table 8-2 (BB pp 41)</a:t>
-            </a:r>
-          </a:p>
-          <a:p>
-            <a:pPr lvl="1"/>
-            <a:r>
-              <a:rPr lang="en-US" sz="2200" dirty="0" smtClean="0">
-                <a:solidFill>
-                  <a:schemeClr val="accent2"/>
-                </a:solidFill>
-              </a:rPr>
-              <a:t>Watchdog Timer, page 341 (BB pp 42)</a:t>
-            </a:r>
-          </a:p>
-          <a:p>
-            <a:pPr lvl="1"/>
-            <a:endParaRPr lang="en-US" sz="2200" dirty="0"/>
-          </a:p>
-          <a:p>
-            <a:endParaRPr lang="en-US" sz="2000" dirty="0">
-              <a:solidFill>
-                <a:schemeClr val="accent2"/>
-              </a:solidFill>
-            </a:endParaRPr>
-          </a:p>
         </p:txBody>
       </p:sp>
-      <p:pic>
-        <p:nvPicPr>
-          <p:cNvPr id="2050" name="Picture 2" descr="MSP430 Memory Map"/>
-          <p:cNvPicPr>
-            <a:picLocks noChangeAspect="1" noChangeArrowheads="1"/>
-          </p:cNvPicPr>
+      <p:sp>
+        <p:nvSpPr>
+          <p:cNvPr id="4" name="TextBox 3"/>
+          <p:cNvSpPr txBox="1"/>
           <p:nvPr/>
-        </p:nvPicPr>
-        <p:blipFill>
-          <a:blip r:embed="rId2">
-            <a:extLst>
-              <a:ext uri="{28A0092B-C50C-407E-A947-70E740481C1C}">
-                <a14:useLocalDpi xmlns:a14="http://schemas.microsoft.com/office/drawing/2010/main" val="0"/>
-              </a:ext>
-            </a:extLst>
-          </a:blip>
-          <a:srcRect/>
-          <a:stretch>
-            <a:fillRect/>
-          </a:stretch>
-        </p:blipFill>
-        <p:spPr bwMode="auto">
+        </p:nvSpPr>
+        <p:spPr>
           <a:xfrm>
-            <a:off x="6018663" y="2513628"/>
-            <a:ext cx="3110914" cy="4343722"/>
+            <a:off x="5813949" y="1940673"/>
+            <a:ext cx="3616657" cy="1015663"/>
           </a:xfrm>
           <a:prstGeom prst="rect">
             <a:avLst/>
           </a:prstGeom>
           <a:noFill/>
-          <a:extLst>
-            <a:ext uri="{909E8E84-426E-40DD-AFC4-6F175D3DCCD1}">
-              <a14:hiddenFill xmlns:a14="http://schemas.microsoft.com/office/drawing/2010/main">
-                <a:solidFill>
-                  <a:srgbClr val="FFFFFF"/>
-                </a:solidFill>
-              </a14:hiddenFill>
-            </a:ext>
-          </a:extLst>
         </p:spPr>
-      </p:pic>
+        <p:txBody>
+          <a:bodyPr wrap="square" rtlCol="0">
+            <a:spAutoFit/>
+          </a:bodyPr>
+          <a:lstStyle/>
+          <a:p>
+            <a:r>
+              <a:rPr lang="en-US" dirty="0" smtClean="0"/>
+              <a:t>Family Users Guide p 328</a:t>
+            </a:r>
+          </a:p>
+          <a:p>
+            <a:r>
+              <a:rPr lang="en-US" dirty="0" smtClean="0"/>
+              <a:t>Blue Book pp 38</a:t>
+            </a:r>
+          </a:p>
+        </p:txBody>
+      </p:sp>
     </p:spTree>
     <p:extLst>
       <p:ext uri="{BB962C8B-B14F-4D97-AF65-F5344CB8AC3E}">
-        <p14:creationId xmlns:p14="http://schemas.microsoft.com/office/powerpoint/2010/main" val="2990205779"/>
+        <p14:creationId xmlns:p14="http://schemas.microsoft.com/office/powerpoint/2010/main" val="2697282666"/>
       </p:ext>
     </p:extLst>
   </p:cSld>
@@ -9532,9 +8969,80 @@
   <p:timing>
     <p:tnLst>
       <p:par>
-        <p:cTn id="1" dur="indefinite" restart="never" nodeType="tmRoot"/>
+        <p:cTn id="1" dur="indefinite" restart="never" nodeType="tmRoot">
+          <p:childTnLst>
+            <p:seq concurrent="1" nextAc="seek">
+              <p:cTn id="2" dur="indefinite" nodeType="mainSeq">
+                <p:childTnLst>
+                  <p:par>
+                    <p:cTn id="3" fill="hold">
+                      <p:stCondLst>
+                        <p:cond delay="indefinite"/>
+                      </p:stCondLst>
+                      <p:childTnLst>
+                        <p:par>
+                          <p:cTn id="4" fill="hold">
+                            <p:stCondLst>
+                              <p:cond delay="0"/>
+                            </p:stCondLst>
+                            <p:childTnLst>
+                              <p:par>
+                                <p:cTn id="5" presetID="1" presetClass="entr" presetSubtype="0" fill="hold" grpId="0" nodeType="clickEffect">
+                                  <p:stCondLst>
+                                    <p:cond delay="0"/>
+                                  </p:stCondLst>
+                                  <p:childTnLst>
+                                    <p:set>
+                                      <p:cBhvr>
+                                        <p:cTn id="6" dur="1" fill="hold">
+                                          <p:stCondLst>
+                                            <p:cond delay="0"/>
+                                          </p:stCondLst>
+                                        </p:cTn>
+                                        <p:tgtEl>
+                                          <p:spTgt spid="4"/>
+                                        </p:tgtEl>
+                                        <p:attrNameLst>
+                                          <p:attrName>style.visibility</p:attrName>
+                                        </p:attrNameLst>
+                                      </p:cBhvr>
+                                      <p:to>
+                                        <p:strVal val="visible"/>
+                                      </p:to>
+                                    </p:set>
+                                  </p:childTnLst>
+                                </p:cTn>
+                              </p:par>
+                            </p:childTnLst>
+                          </p:cTn>
+                        </p:par>
+                      </p:childTnLst>
+                    </p:cTn>
+                  </p:par>
+                </p:childTnLst>
+              </p:cTn>
+              <p:prevCondLst>
+                <p:cond evt="onPrev" delay="0">
+                  <p:tgtEl>
+                    <p:sldTgt/>
+                  </p:tgtEl>
+                </p:cond>
+              </p:prevCondLst>
+              <p:nextCondLst>
+                <p:cond evt="onNext" delay="0">
+                  <p:tgtEl>
+                    <p:sldTgt/>
+                  </p:tgtEl>
+                </p:cond>
+              </p:nextCondLst>
+            </p:seq>
+          </p:childTnLst>
+        </p:cTn>
       </p:par>
     </p:tnLst>
+    <p:bldLst>
+      <p:bldP spid="4" grpId="0"/>
+    </p:bldLst>
   </p:timing>
 </p:sld>
 </file>

</xml_diff>